<commit_message>
Fix repeated demo number in presentation
</commit_message>
<xml_diff>
--- a/6-biojava/MMTF2017-BioJava.pptx
+++ b/6-biojava/MMTF2017-BioJava.pptx
@@ -2255,6 +2255,13 @@
         </dgm:presLayoutVars>
       </dgm:prSet>
       <dgm:spPr/>
+      <dgm:t>
+        <a:bodyPr/>
+        <a:lstStyle/>
+        <a:p>
+          <a:endParaRPr lang="en-US"/>
+        </a:p>
+      </dgm:t>
     </dgm:pt>
     <dgm:pt modelId="{7DDD7003-5D9E-F24A-B6A8-9BB767D5E2B6}" type="pres">
       <dgm:prSet presAssocID="{18AC6E4B-00D9-6346-86FD-C0265D7E0E62}" presName="composite" presStyleCnt="0"/>
@@ -2269,6 +2276,13 @@
         </dgm:presLayoutVars>
       </dgm:prSet>
       <dgm:spPr/>
+      <dgm:t>
+        <a:bodyPr/>
+        <a:lstStyle/>
+        <a:p>
+          <a:endParaRPr lang="en-US"/>
+        </a:p>
+      </dgm:t>
     </dgm:pt>
     <dgm:pt modelId="{F34E6FA3-4CDC-D94C-816B-788381727C98}" type="pres">
       <dgm:prSet presAssocID="{18AC6E4B-00D9-6346-86FD-C0265D7E0E62}" presName="desTx" presStyleLbl="alignAccFollowNode1" presStyleIdx="0" presStyleCnt="4">
@@ -2302,6 +2316,13 @@
         </dgm:presLayoutVars>
       </dgm:prSet>
       <dgm:spPr/>
+      <dgm:t>
+        <a:bodyPr/>
+        <a:lstStyle/>
+        <a:p>
+          <a:endParaRPr lang="en-US"/>
+        </a:p>
+      </dgm:t>
     </dgm:pt>
     <dgm:pt modelId="{7DDBBFA9-C26D-FC4A-9586-66102CD6571D}" type="pres">
       <dgm:prSet presAssocID="{878CBE02-A429-7D47-97D2-385CE9E0585E}" presName="desTx" presStyleLbl="alignAccFollowNode1" presStyleIdx="1" presStyleCnt="4">
@@ -2335,6 +2356,13 @@
         </dgm:presLayoutVars>
       </dgm:prSet>
       <dgm:spPr/>
+      <dgm:t>
+        <a:bodyPr/>
+        <a:lstStyle/>
+        <a:p>
+          <a:endParaRPr lang="en-US"/>
+        </a:p>
+      </dgm:t>
     </dgm:pt>
     <dgm:pt modelId="{B08101D8-0B15-BB4F-9D7D-ABCDF707CD56}" type="pres">
       <dgm:prSet presAssocID="{78E37A11-9239-F148-B9E8-501B5B81F3DC}" presName="desTx" presStyleLbl="alignAccFollowNode1" presStyleIdx="2" presStyleCnt="4">
@@ -2368,6 +2396,13 @@
         </dgm:presLayoutVars>
       </dgm:prSet>
       <dgm:spPr/>
+      <dgm:t>
+        <a:bodyPr/>
+        <a:lstStyle/>
+        <a:p>
+          <a:endParaRPr lang="en-US"/>
+        </a:p>
+      </dgm:t>
     </dgm:pt>
     <dgm:pt modelId="{55296B8D-DCDE-1D4F-BA89-096C53F30EED}" type="pres">
       <dgm:prSet presAssocID="{CC4A5CC0-E8B3-5148-9B2D-EE03CA3C4A9B}" presName="desTx" presStyleLbl="alignAccFollowNode1" presStyleIdx="3" presStyleCnt="4">
@@ -2386,37 +2421,37 @@
     </dgm:pt>
   </dgm:ptLst>
   <dgm:cxnLst>
-    <dgm:cxn modelId="{6A4D2E28-1C51-774E-ABCB-9CA5D06D06C1}" type="presOf" srcId="{FCD5E913-ED82-0046-BF51-2749DD46C81D}" destId="{7DDBBFA9-C26D-FC4A-9586-66102CD6571D}" srcOrd="0" destOrd="0" presId="urn:microsoft.com/office/officeart/2005/8/layout/hList1"/>
-    <dgm:cxn modelId="{77DB55B3-9D07-824D-9C39-EE12FFBD3A18}" type="presOf" srcId="{6C036F71-03C6-5849-9C4E-0BCE3F642BA2}" destId="{B08101D8-0B15-BB4F-9D7D-ABCDF707CD56}" srcOrd="0" destOrd="2" presId="urn:microsoft.com/office/officeart/2005/8/layout/hList1"/>
-    <dgm:cxn modelId="{6E8C54D4-4D8D-864B-9D2E-DC74D8137EB9}" type="presOf" srcId="{58691472-3B56-3142-89E4-74869F9B130B}" destId="{55296B8D-DCDE-1D4F-BA89-096C53F30EED}" srcOrd="0" destOrd="0" presId="urn:microsoft.com/office/officeart/2005/8/layout/hList1"/>
+    <dgm:cxn modelId="{BBC05CE6-15C9-A144-A673-CE0D0242397D}" type="presOf" srcId="{CC4A5CC0-E8B3-5148-9B2D-EE03CA3C4A9B}" destId="{6AD646BF-4E54-3546-9DCA-0C92931BF5CA}" srcOrd="0" destOrd="0" presId="urn:microsoft.com/office/officeart/2005/8/layout/hList1"/>
+    <dgm:cxn modelId="{8F3BFB4D-E79B-E242-8814-5F8816AEBE93}" srcId="{0257A1A7-8897-1745-BF60-AFFD09986075}" destId="{878CBE02-A429-7D47-97D2-385CE9E0585E}" srcOrd="1" destOrd="0" parTransId="{4FFA2FB6-A2D1-9447-ABF2-7B3D90F1B14D}" sibTransId="{9DD38D3E-4F52-7349-A663-02585EF422DC}"/>
     <dgm:cxn modelId="{F54A9AA2-CB89-5542-96FB-2881D7EA1E96}" srcId="{78E37A11-9239-F148-B9E8-501B5B81F3DC}" destId="{2898DA40-9716-6B4E-BABA-221B338744FD}" srcOrd="1" destOrd="0" parTransId="{BA4A2FFF-5141-5C4D-B370-CC5F5889CC67}" sibTransId="{2EA4842B-DF8E-AB46-84F8-ECB639910694}"/>
-    <dgm:cxn modelId="{E1E251BF-6396-CC41-A423-13D5E5DADAF1}" srcId="{0257A1A7-8897-1745-BF60-AFFD09986075}" destId="{78E37A11-9239-F148-B9E8-501B5B81F3DC}" srcOrd="2" destOrd="0" parTransId="{84B505AF-E8B8-0B49-BB4D-6E24A9FC191F}" sibTransId="{483A219E-25A3-1A41-9C45-774A43F99EFA}"/>
-    <dgm:cxn modelId="{78BD1BFA-507B-E148-AC8E-115E2D200F4C}" type="presOf" srcId="{D17DF8DF-A0BA-5341-9CC4-1DDE1CC8DCDD}" destId="{55296B8D-DCDE-1D4F-BA89-096C53F30EED}" srcOrd="0" destOrd="1" presId="urn:microsoft.com/office/officeart/2005/8/layout/hList1"/>
-    <dgm:cxn modelId="{88010529-26E6-AF4B-A288-26C7DCDD0EF6}" srcId="{0257A1A7-8897-1745-BF60-AFFD09986075}" destId="{18AC6E4B-00D9-6346-86FD-C0265D7E0E62}" srcOrd="0" destOrd="0" parTransId="{54864680-E9A6-2640-BF2B-BCE3895E7201}" sibTransId="{4B40E773-0DB7-9C44-A648-A2D0E5166E97}"/>
-    <dgm:cxn modelId="{6663527F-FCB1-C443-B537-3F9C8310C7ED}" type="presOf" srcId="{78E37A11-9239-F148-B9E8-501B5B81F3DC}" destId="{9F23902F-45C2-0845-A6D4-3BEE3C292019}" srcOrd="0" destOrd="0" presId="urn:microsoft.com/office/officeart/2005/8/layout/hList1"/>
-    <dgm:cxn modelId="{E009942C-CFAC-3148-AE2E-D95643060FF2}" srcId="{0257A1A7-8897-1745-BF60-AFFD09986075}" destId="{CC4A5CC0-E8B3-5148-9B2D-EE03CA3C4A9B}" srcOrd="3" destOrd="0" parTransId="{041CEE44-76D8-9F40-9B91-F2BF07DDD5B1}" sibTransId="{211E702A-3A8E-814C-BD3A-2B70CB54E56E}"/>
-    <dgm:cxn modelId="{A755D150-1B69-2746-B62F-AC5D6490EB6B}" srcId="{CC4A5CC0-E8B3-5148-9B2D-EE03CA3C4A9B}" destId="{D17DF8DF-A0BA-5341-9CC4-1DDE1CC8DCDD}" srcOrd="1" destOrd="0" parTransId="{CBF510A9-7B52-EC44-AC87-1A18A7CFEECF}" sibTransId="{1809485C-3A2D-7940-8565-3A5DECA988CE}"/>
+    <dgm:cxn modelId="{8D9BB5E8-B6E4-484E-9223-5E49799E25F9}" srcId="{18AC6E4B-00D9-6346-86FD-C0265D7E0E62}" destId="{B2D3DAEB-659E-2347-AC79-E8601C3EBF4D}" srcOrd="0" destOrd="0" parTransId="{61A2375C-C531-7440-996A-8108331EC411}" sibTransId="{73D7677F-D311-5E46-B341-6A16240694DB}"/>
+    <dgm:cxn modelId="{757F4643-06B2-FB49-B82C-13BD5332429F}" srcId="{878CBE02-A429-7D47-97D2-385CE9E0585E}" destId="{FCD5E913-ED82-0046-BF51-2749DD46C81D}" srcOrd="0" destOrd="0" parTransId="{D364A93D-DF31-F04E-BCB5-D75CED0E08FA}" sibTransId="{540DCC8C-B2DE-AE43-9F86-200AE99060C5}"/>
+    <dgm:cxn modelId="{12E96172-4A45-EA4E-A4C9-EE1D05A4B7DB}" srcId="{78E37A11-9239-F148-B9E8-501B5B81F3DC}" destId="{71E209EB-D03B-5444-A108-603B8887C14B}" srcOrd="0" destOrd="0" parTransId="{52C7654C-FDE7-6A41-87B4-7B21F85E09AE}" sibTransId="{83FEB9FA-433F-D645-B3C0-78F6D709554C}"/>
     <dgm:cxn modelId="{5403E880-8AD4-7B49-9DE7-2625B90D74C3}" srcId="{78E37A11-9239-F148-B9E8-501B5B81F3DC}" destId="{6C036F71-03C6-5849-9C4E-0BCE3F642BA2}" srcOrd="2" destOrd="0" parTransId="{458BDAB9-A585-2844-BDCC-78F8EDFD327E}" sibTransId="{541F357A-8A8F-DE49-8D15-C7956D0384BA}"/>
-    <dgm:cxn modelId="{2524F22C-7837-FF49-A73F-AACA614DCCB8}" type="presOf" srcId="{878CBE02-A429-7D47-97D2-385CE9E0585E}" destId="{53D6EFFA-9045-CF4D-AF5A-F2E9A3FA87AC}" srcOrd="0" destOrd="0" presId="urn:microsoft.com/office/officeart/2005/8/layout/hList1"/>
-    <dgm:cxn modelId="{2B7A4181-C8B4-3D4C-846D-FFFFA07357F5}" srcId="{18AC6E4B-00D9-6346-86FD-C0265D7E0E62}" destId="{3E647CB2-98BA-884B-989D-DFBEB1ACF261}" srcOrd="3" destOrd="0" parTransId="{4CA0E955-31D0-D141-89B0-CF297BEED716}" sibTransId="{6EA9668E-3814-4F4A-ABCC-541544AC0483}"/>
-    <dgm:cxn modelId="{BB1DAAB0-DC9E-7545-BB5E-FF9891BD662C}" type="presOf" srcId="{8DA030CB-BBF1-7A4F-B095-08DC59A02CEC}" destId="{F34E6FA3-4CDC-D94C-816B-788381727C98}" srcOrd="0" destOrd="1" presId="urn:microsoft.com/office/officeart/2005/8/layout/hList1"/>
     <dgm:cxn modelId="{1F1DBEBD-4361-954B-9234-3326BACA7D5B}" type="presOf" srcId="{18AC6E4B-00D9-6346-86FD-C0265D7E0E62}" destId="{C14C5764-50FA-F640-BD99-AEC6B5DD4C3D}" srcOrd="0" destOrd="0" presId="urn:microsoft.com/office/officeart/2005/8/layout/hList1"/>
-    <dgm:cxn modelId="{05A4AEDB-41E7-6049-AF31-2B50D926DA32}" type="presOf" srcId="{651B914A-E500-3346-A49D-A791BBCE7BE0}" destId="{F34E6FA3-4CDC-D94C-816B-788381727C98}" srcOrd="0" destOrd="2" presId="urn:microsoft.com/office/officeart/2005/8/layout/hList1"/>
-    <dgm:cxn modelId="{8D9BB5E8-B6E4-484E-9223-5E49799E25F9}" srcId="{18AC6E4B-00D9-6346-86FD-C0265D7E0E62}" destId="{B2D3DAEB-659E-2347-AC79-E8601C3EBF4D}" srcOrd="0" destOrd="0" parTransId="{61A2375C-C531-7440-996A-8108331EC411}" sibTransId="{73D7677F-D311-5E46-B341-6A16240694DB}"/>
-    <dgm:cxn modelId="{BBC05CE6-15C9-A144-A673-CE0D0242397D}" type="presOf" srcId="{CC4A5CC0-E8B3-5148-9B2D-EE03CA3C4A9B}" destId="{6AD646BF-4E54-3546-9DCA-0C92931BF5CA}" srcOrd="0" destOrd="0" presId="urn:microsoft.com/office/officeart/2005/8/layout/hList1"/>
-    <dgm:cxn modelId="{6AF5A0F9-8E15-BF40-9981-1620443A1656}" srcId="{18AC6E4B-00D9-6346-86FD-C0265D7E0E62}" destId="{651B914A-E500-3346-A49D-A791BBCE7BE0}" srcOrd="2" destOrd="0" parTransId="{A878DED3-B47D-3F4D-8974-265C6AFC8BDA}" sibTransId="{C9F436BD-B084-C649-AD20-25AC37730A31}"/>
-    <dgm:cxn modelId="{9DD181C2-28C3-B14C-8DBD-382A6CAFC453}" type="presOf" srcId="{B2D3DAEB-659E-2347-AC79-E8601C3EBF4D}" destId="{F34E6FA3-4CDC-D94C-816B-788381727C98}" srcOrd="0" destOrd="0" presId="urn:microsoft.com/office/officeart/2005/8/layout/hList1"/>
-    <dgm:cxn modelId="{FCD7A460-B8E9-6745-A7A3-2CC89BE81199}" type="presOf" srcId="{0257A1A7-8897-1745-BF60-AFFD09986075}" destId="{7A612EDE-CEA2-4244-B8D2-23818C6B4748}" srcOrd="0" destOrd="0" presId="urn:microsoft.com/office/officeart/2005/8/layout/hList1"/>
-    <dgm:cxn modelId="{AC698868-CB7D-B947-933D-D8BE5048E451}" type="presOf" srcId="{2898DA40-9716-6B4E-BABA-221B338744FD}" destId="{B08101D8-0B15-BB4F-9D7D-ABCDF707CD56}" srcOrd="0" destOrd="1" presId="urn:microsoft.com/office/officeart/2005/8/layout/hList1"/>
-    <dgm:cxn modelId="{FC105972-086E-AC48-AB7A-BBB8F7244568}" srcId="{CC4A5CC0-E8B3-5148-9B2D-EE03CA3C4A9B}" destId="{58691472-3B56-3142-89E4-74869F9B130B}" srcOrd="0" destOrd="0" parTransId="{687F6750-6EEB-194C-942B-CDF09084BEEF}" sibTransId="{8C71E6D8-1DFA-7549-8740-54EC0DAC020D}"/>
     <dgm:cxn modelId="{0526B62E-F5EB-9246-AD46-A969B96B1877}" type="presOf" srcId="{71E209EB-D03B-5444-A108-603B8887C14B}" destId="{B08101D8-0B15-BB4F-9D7D-ABCDF707CD56}" srcOrd="0" destOrd="0" presId="urn:microsoft.com/office/officeart/2005/8/layout/hList1"/>
     <dgm:cxn modelId="{C27723FE-3B17-1249-8F3D-CB95FA3638B9}" srcId="{878CBE02-A429-7D47-97D2-385CE9E0585E}" destId="{B33AD59D-BB84-4D4D-B345-ABEC5BBC9B22}" srcOrd="1" destOrd="0" parTransId="{E9BA22AD-69AB-0F49-AA95-3E24C117DC25}" sibTransId="{68C09E06-B347-3E46-A5AC-DB81798BAE69}"/>
+    <dgm:cxn modelId="{FC105972-086E-AC48-AB7A-BBB8F7244568}" srcId="{CC4A5CC0-E8B3-5148-9B2D-EE03CA3C4A9B}" destId="{58691472-3B56-3142-89E4-74869F9B130B}" srcOrd="0" destOrd="0" parTransId="{687F6750-6EEB-194C-942B-CDF09084BEEF}" sibTransId="{8C71E6D8-1DFA-7549-8740-54EC0DAC020D}"/>
+    <dgm:cxn modelId="{FCD7A460-B8E9-6745-A7A3-2CC89BE81199}" type="presOf" srcId="{0257A1A7-8897-1745-BF60-AFFD09986075}" destId="{7A612EDE-CEA2-4244-B8D2-23818C6B4748}" srcOrd="0" destOrd="0" presId="urn:microsoft.com/office/officeart/2005/8/layout/hList1"/>
+    <dgm:cxn modelId="{2B7A4181-C8B4-3D4C-846D-FFFFA07357F5}" srcId="{18AC6E4B-00D9-6346-86FD-C0265D7E0E62}" destId="{3E647CB2-98BA-884B-989D-DFBEB1ACF261}" srcOrd="3" destOrd="0" parTransId="{4CA0E955-31D0-D141-89B0-CF297BEED716}" sibTransId="{6EA9668E-3814-4F4A-ABCC-541544AC0483}"/>
+    <dgm:cxn modelId="{E009942C-CFAC-3148-AE2E-D95643060FF2}" srcId="{0257A1A7-8897-1745-BF60-AFFD09986075}" destId="{CC4A5CC0-E8B3-5148-9B2D-EE03CA3C4A9B}" srcOrd="3" destOrd="0" parTransId="{041CEE44-76D8-9F40-9B91-F2BF07DDD5B1}" sibTransId="{211E702A-3A8E-814C-BD3A-2B70CB54E56E}"/>
+    <dgm:cxn modelId="{78BD1BFA-507B-E148-AC8E-115E2D200F4C}" type="presOf" srcId="{D17DF8DF-A0BA-5341-9CC4-1DDE1CC8DCDD}" destId="{55296B8D-DCDE-1D4F-BA89-096C53F30EED}" srcOrd="0" destOrd="1" presId="urn:microsoft.com/office/officeart/2005/8/layout/hList1"/>
+    <dgm:cxn modelId="{E1E251BF-6396-CC41-A423-13D5E5DADAF1}" srcId="{0257A1A7-8897-1745-BF60-AFFD09986075}" destId="{78E37A11-9239-F148-B9E8-501B5B81F3DC}" srcOrd="2" destOrd="0" parTransId="{84B505AF-E8B8-0B49-BB4D-6E24A9FC191F}" sibTransId="{483A219E-25A3-1A41-9C45-774A43F99EFA}"/>
+    <dgm:cxn modelId="{05A4AEDB-41E7-6049-AF31-2B50D926DA32}" type="presOf" srcId="{651B914A-E500-3346-A49D-A791BBCE7BE0}" destId="{F34E6FA3-4CDC-D94C-816B-788381727C98}" srcOrd="0" destOrd="2" presId="urn:microsoft.com/office/officeart/2005/8/layout/hList1"/>
     <dgm:cxn modelId="{85FBA721-B987-FA4D-BDB9-4E14DEBA06E7}" srcId="{18AC6E4B-00D9-6346-86FD-C0265D7E0E62}" destId="{8DA030CB-BBF1-7A4F-B095-08DC59A02CEC}" srcOrd="1" destOrd="0" parTransId="{BD97039B-DA95-EF42-B10A-F8D1A1F96285}" sibTransId="{4FEF15B2-5247-604C-82FB-00287474EE02}"/>
-    <dgm:cxn modelId="{757F4643-06B2-FB49-B82C-13BD5332429F}" srcId="{878CBE02-A429-7D47-97D2-385CE9E0585E}" destId="{FCD5E913-ED82-0046-BF51-2749DD46C81D}" srcOrd="0" destOrd="0" parTransId="{D364A93D-DF31-F04E-BCB5-D75CED0E08FA}" sibTransId="{540DCC8C-B2DE-AE43-9F86-200AE99060C5}"/>
-    <dgm:cxn modelId="{12E96172-4A45-EA4E-A4C9-EE1D05A4B7DB}" srcId="{78E37A11-9239-F148-B9E8-501B5B81F3DC}" destId="{71E209EB-D03B-5444-A108-603B8887C14B}" srcOrd="0" destOrd="0" parTransId="{52C7654C-FDE7-6A41-87B4-7B21F85E09AE}" sibTransId="{83FEB9FA-433F-D645-B3C0-78F6D709554C}"/>
-    <dgm:cxn modelId="{8F3BFB4D-E79B-E242-8814-5F8816AEBE93}" srcId="{0257A1A7-8897-1745-BF60-AFFD09986075}" destId="{878CBE02-A429-7D47-97D2-385CE9E0585E}" srcOrd="1" destOrd="0" parTransId="{4FFA2FB6-A2D1-9447-ABF2-7B3D90F1B14D}" sibTransId="{9DD38D3E-4F52-7349-A663-02585EF422DC}"/>
+    <dgm:cxn modelId="{AC698868-CB7D-B947-933D-D8BE5048E451}" type="presOf" srcId="{2898DA40-9716-6B4E-BABA-221B338744FD}" destId="{B08101D8-0B15-BB4F-9D7D-ABCDF707CD56}" srcOrd="0" destOrd="1" presId="urn:microsoft.com/office/officeart/2005/8/layout/hList1"/>
+    <dgm:cxn modelId="{1706FD25-C284-FF4A-92E3-94446ECD1279}" type="presOf" srcId="{B33AD59D-BB84-4D4D-B345-ABEC5BBC9B22}" destId="{7DDBBFA9-C26D-FC4A-9586-66102CD6571D}" srcOrd="0" destOrd="1" presId="urn:microsoft.com/office/officeart/2005/8/layout/hList1"/>
+    <dgm:cxn modelId="{6A4D2E28-1C51-774E-ABCB-9CA5D06D06C1}" type="presOf" srcId="{FCD5E913-ED82-0046-BF51-2749DD46C81D}" destId="{7DDBBFA9-C26D-FC4A-9586-66102CD6571D}" srcOrd="0" destOrd="0" presId="urn:microsoft.com/office/officeart/2005/8/layout/hList1"/>
+    <dgm:cxn modelId="{BB1DAAB0-DC9E-7545-BB5E-FF9891BD662C}" type="presOf" srcId="{8DA030CB-BBF1-7A4F-B095-08DC59A02CEC}" destId="{F34E6FA3-4CDC-D94C-816B-788381727C98}" srcOrd="0" destOrd="1" presId="urn:microsoft.com/office/officeart/2005/8/layout/hList1"/>
+    <dgm:cxn modelId="{6E8C54D4-4D8D-864B-9D2E-DC74D8137EB9}" type="presOf" srcId="{58691472-3B56-3142-89E4-74869F9B130B}" destId="{55296B8D-DCDE-1D4F-BA89-096C53F30EED}" srcOrd="0" destOrd="0" presId="urn:microsoft.com/office/officeart/2005/8/layout/hList1"/>
+    <dgm:cxn modelId="{9DD181C2-28C3-B14C-8DBD-382A6CAFC453}" type="presOf" srcId="{B2D3DAEB-659E-2347-AC79-E8601C3EBF4D}" destId="{F34E6FA3-4CDC-D94C-816B-788381727C98}" srcOrd="0" destOrd="0" presId="urn:microsoft.com/office/officeart/2005/8/layout/hList1"/>
+    <dgm:cxn modelId="{6663527F-FCB1-C443-B537-3F9C8310C7ED}" type="presOf" srcId="{78E37A11-9239-F148-B9E8-501B5B81F3DC}" destId="{9F23902F-45C2-0845-A6D4-3BEE3C292019}" srcOrd="0" destOrd="0" presId="urn:microsoft.com/office/officeart/2005/8/layout/hList1"/>
+    <dgm:cxn modelId="{88010529-26E6-AF4B-A288-26C7DCDD0EF6}" srcId="{0257A1A7-8897-1745-BF60-AFFD09986075}" destId="{18AC6E4B-00D9-6346-86FD-C0265D7E0E62}" srcOrd="0" destOrd="0" parTransId="{54864680-E9A6-2640-BF2B-BCE3895E7201}" sibTransId="{4B40E773-0DB7-9C44-A648-A2D0E5166E97}"/>
     <dgm:cxn modelId="{1BE4FD25-5EF0-984A-8094-490F73F4B299}" type="presOf" srcId="{3E647CB2-98BA-884B-989D-DFBEB1ACF261}" destId="{F34E6FA3-4CDC-D94C-816B-788381727C98}" srcOrd="0" destOrd="3" presId="urn:microsoft.com/office/officeart/2005/8/layout/hList1"/>
-    <dgm:cxn modelId="{1706FD25-C284-FF4A-92E3-94446ECD1279}" type="presOf" srcId="{B33AD59D-BB84-4D4D-B345-ABEC5BBC9B22}" destId="{7DDBBFA9-C26D-FC4A-9586-66102CD6571D}" srcOrd="0" destOrd="1" presId="urn:microsoft.com/office/officeart/2005/8/layout/hList1"/>
+    <dgm:cxn modelId="{2524F22C-7837-FF49-A73F-AACA614DCCB8}" type="presOf" srcId="{878CBE02-A429-7D47-97D2-385CE9E0585E}" destId="{53D6EFFA-9045-CF4D-AF5A-F2E9A3FA87AC}" srcOrd="0" destOrd="0" presId="urn:microsoft.com/office/officeart/2005/8/layout/hList1"/>
+    <dgm:cxn modelId="{77DB55B3-9D07-824D-9C39-EE12FFBD3A18}" type="presOf" srcId="{6C036F71-03C6-5849-9C4E-0BCE3F642BA2}" destId="{B08101D8-0B15-BB4F-9D7D-ABCDF707CD56}" srcOrd="0" destOrd="2" presId="urn:microsoft.com/office/officeart/2005/8/layout/hList1"/>
+    <dgm:cxn modelId="{A755D150-1B69-2746-B62F-AC5D6490EB6B}" srcId="{CC4A5CC0-E8B3-5148-9B2D-EE03CA3C4A9B}" destId="{D17DF8DF-A0BA-5341-9CC4-1DDE1CC8DCDD}" srcOrd="1" destOrd="0" parTransId="{CBF510A9-7B52-EC44-AC87-1A18A7CFEECF}" sibTransId="{1809485C-3A2D-7940-8565-3A5DECA988CE}"/>
+    <dgm:cxn modelId="{6AF5A0F9-8E15-BF40-9981-1620443A1656}" srcId="{18AC6E4B-00D9-6346-86FD-C0265D7E0E62}" destId="{651B914A-E500-3346-A49D-A791BBCE7BE0}" srcOrd="2" destOrd="0" parTransId="{A878DED3-B47D-3F4D-8974-265C6AFC8BDA}" sibTransId="{C9F436BD-B084-C649-AD20-25AC37730A31}"/>
     <dgm:cxn modelId="{2AC92530-25C6-9E41-8236-BCEB902E1D1A}" type="presParOf" srcId="{7A612EDE-CEA2-4244-B8D2-23818C6B4748}" destId="{7DDD7003-5D9E-F24A-B6A8-9BB767D5E2B6}" srcOrd="0" destOrd="0" presId="urn:microsoft.com/office/officeart/2005/8/layout/hList1"/>
     <dgm:cxn modelId="{D66CCB80-26FB-1948-A1D6-8F6B03D39C09}" type="presParOf" srcId="{7DDD7003-5D9E-F24A-B6A8-9BB767D5E2B6}" destId="{C14C5764-50FA-F640-BD99-AEC6B5DD4C3D}" srcOrd="0" destOrd="0" presId="urn:microsoft.com/office/officeart/2005/8/layout/hList1"/>
     <dgm:cxn modelId="{1D67455D-9731-7E41-AD29-AF9196467E52}" type="presParOf" srcId="{7DDD7003-5D9E-F24A-B6A8-9BB767D5E2B6}" destId="{F34E6FA3-4CDC-D94C-816B-788381727C98}" srcOrd="1" destOrd="0" presId="urn:microsoft.com/office/officeart/2005/8/layout/hList1"/>
@@ -2688,8 +2723,8 @@
     <dgm:cxn modelId="{F5D0CD49-AB77-8B4F-8CB5-DFB84FC0BC2E}" type="presOf" srcId="{AA7B22EF-7D44-9149-BA85-CA9AAC700273}" destId="{342335D6-2D4F-8A48-8BC9-2E071A425694}" srcOrd="0" destOrd="0" presId="urn:microsoft.com/office/officeart/2005/8/layout/radial4"/>
     <dgm:cxn modelId="{BA4DF081-C3DC-0745-8D7D-B63968CCA093}" type="presOf" srcId="{8DD6AA12-332F-4A44-86FE-58EF61B650AB}" destId="{0C135850-8CA7-D744-9015-4910385635D9}" srcOrd="0" destOrd="0" presId="urn:microsoft.com/office/officeart/2005/8/layout/radial4"/>
     <dgm:cxn modelId="{3A4CF16D-753A-B04F-9C68-C8771ADE6C9D}" srcId="{458C5AAA-3180-8143-8A66-E8F6305CBF1E}" destId="{05368E80-97D5-134E-8805-DB6D38859002}" srcOrd="0" destOrd="0" parTransId="{22B078F6-A54A-9D43-989A-F9551BEED226}" sibTransId="{A64B0585-B595-1948-9C4D-907BD122110B}"/>
+    <dgm:cxn modelId="{DA6BE6E8-BEE7-4A44-A8A7-16554C38B02D}" type="presOf" srcId="{82563652-A87D-414D-AC76-EB8ED8D26905}" destId="{CF7472BA-5F5A-364D-9A5C-8D7E73C2FAC4}" srcOrd="0" destOrd="0" presId="urn:microsoft.com/office/officeart/2005/8/layout/radial4"/>
     <dgm:cxn modelId="{3E610010-35E2-554C-97D4-ECCCFFEF357F}" srcId="{05368E80-97D5-134E-8805-DB6D38859002}" destId="{82563652-A87D-414D-AC76-EB8ED8D26905}" srcOrd="1" destOrd="0" parTransId="{B0846F2F-5829-3144-BA74-31AAA9E721A5}" sibTransId="{11BCD724-55A6-A242-850E-DD3FC8B344BE}"/>
-    <dgm:cxn modelId="{DA6BE6E8-BEE7-4A44-A8A7-16554C38B02D}" type="presOf" srcId="{82563652-A87D-414D-AC76-EB8ED8D26905}" destId="{CF7472BA-5F5A-364D-9A5C-8D7E73C2FAC4}" srcOrd="0" destOrd="0" presId="urn:microsoft.com/office/officeart/2005/8/layout/radial4"/>
     <dgm:cxn modelId="{66B638D0-F514-1545-A720-DEE19D9EB487}" type="presParOf" srcId="{54C7C454-F2C9-2140-9AB9-C59DE691EC45}" destId="{B435FFF6-DBAF-9D47-A498-DC697168E028}" srcOrd="0" destOrd="0" presId="urn:microsoft.com/office/officeart/2005/8/layout/radial4"/>
     <dgm:cxn modelId="{C706F890-602F-1F44-A9EF-0B73E7A8CF68}" type="presParOf" srcId="{54C7C454-F2C9-2140-9AB9-C59DE691EC45}" destId="{342335D6-2D4F-8A48-8BC9-2E071A425694}" srcOrd="1" destOrd="0" presId="urn:microsoft.com/office/officeart/2005/8/layout/radial4"/>
     <dgm:cxn modelId="{452A1C52-E8D6-7144-8191-9DF5736C3215}" type="presParOf" srcId="{54C7C454-F2C9-2140-9AB9-C59DE691EC45}" destId="{0C135850-8CA7-D744-9015-4910385635D9}" srcOrd="2" destOrd="0" presId="urn:microsoft.com/office/officeart/2005/8/layout/radial4"/>
@@ -6607,14 +6642,14 @@
           <a:effectLst/>
           <a:extLst>
             <a:ext uri="{909E8E84-426E-40dd-AFC4-6F175D3DCCD1}">
-              <a14:hiddenFill xmlns="" xmlns:a14="http://schemas.microsoft.com/office/drawing/2010/main">
+              <a14:hiddenFill xmlns:a14="http://schemas.microsoft.com/office/drawing/2010/main" xmlns="">
                 <a:solidFill>
                   <a:schemeClr val="accent1"/>
                 </a:solidFill>
               </a14:hiddenFill>
             </a:ext>
             <a:ext uri="{91240B29-F687-4f45-9708-019B960494DF}">
-              <a14:hiddenLine xmlns="" xmlns:a14="http://schemas.microsoft.com/office/drawing/2010/main" w="9525">
+              <a14:hiddenLine xmlns:a14="http://schemas.microsoft.com/office/drawing/2010/main" xmlns="" w="9525">
                 <a:solidFill>
                   <a:schemeClr val="tx1"/>
                 </a:solidFill>
@@ -6624,7 +6659,7 @@
               </a14:hiddenLine>
             </a:ext>
             <a:ext uri="{AF507438-7753-43e0-B8FC-AC1667EBCBE1}">
-              <a14:hiddenEffects xmlns="" xmlns:a14="http://schemas.microsoft.com/office/drawing/2010/main">
+              <a14:hiddenEffects xmlns:a14="http://schemas.microsoft.com/office/drawing/2010/main" xmlns="">
                 <a:effectLst>
                   <a:outerShdw dist="35921" dir="2700000" algn="ctr" rotWithShape="0">
                     <a:schemeClr val="bg2"/>
@@ -6675,14 +6710,14 @@
           <a:effectLst/>
           <a:extLst>
             <a:ext uri="{909E8E84-426E-40dd-AFC4-6F175D3DCCD1}">
-              <a14:hiddenFill xmlns="" xmlns:a14="http://schemas.microsoft.com/office/drawing/2010/main">
+              <a14:hiddenFill xmlns:a14="http://schemas.microsoft.com/office/drawing/2010/main" xmlns="">
                 <a:solidFill>
                   <a:schemeClr val="accent1"/>
                 </a:solidFill>
               </a14:hiddenFill>
             </a:ext>
             <a:ext uri="{91240B29-F687-4f45-9708-019B960494DF}">
-              <a14:hiddenLine xmlns="" xmlns:a14="http://schemas.microsoft.com/office/drawing/2010/main" w="9525">
+              <a14:hiddenLine xmlns:a14="http://schemas.microsoft.com/office/drawing/2010/main" xmlns="" w="9525">
                 <a:solidFill>
                   <a:schemeClr val="tx1"/>
                 </a:solidFill>
@@ -6692,7 +6727,7 @@
               </a14:hiddenLine>
             </a:ext>
             <a:ext uri="{AF507438-7753-43e0-B8FC-AC1667EBCBE1}">
-              <a14:hiddenEffects xmlns="" xmlns:a14="http://schemas.microsoft.com/office/drawing/2010/main">
+              <a14:hiddenEffects xmlns:a14="http://schemas.microsoft.com/office/drawing/2010/main" xmlns="">
                 <a:effectLst>
                   <a:outerShdw dist="35921" dir="2700000" algn="ctr" rotWithShape="0">
                     <a:schemeClr val="bg2"/>
@@ -6743,14 +6778,14 @@
           <a:effectLst/>
           <a:extLst>
             <a:ext uri="{909E8E84-426E-40dd-AFC4-6F175D3DCCD1}">
-              <a14:hiddenFill xmlns="" xmlns:a14="http://schemas.microsoft.com/office/drawing/2010/main">
+              <a14:hiddenFill xmlns:a14="http://schemas.microsoft.com/office/drawing/2010/main" xmlns="">
                 <a:solidFill>
                   <a:schemeClr val="accent1"/>
                 </a:solidFill>
               </a14:hiddenFill>
             </a:ext>
             <a:ext uri="{91240B29-F687-4f45-9708-019B960494DF}">
-              <a14:hiddenLine xmlns="" xmlns:a14="http://schemas.microsoft.com/office/drawing/2010/main" w="9525">
+              <a14:hiddenLine xmlns:a14="http://schemas.microsoft.com/office/drawing/2010/main" xmlns="" w="9525">
                 <a:solidFill>
                   <a:schemeClr val="tx1"/>
                 </a:solidFill>
@@ -6760,7 +6795,7 @@
               </a14:hiddenLine>
             </a:ext>
             <a:ext uri="{AF507438-7753-43e0-B8FC-AC1667EBCBE1}">
-              <a14:hiddenEffects xmlns="" xmlns:a14="http://schemas.microsoft.com/office/drawing/2010/main">
+              <a14:hiddenEffects xmlns:a14="http://schemas.microsoft.com/office/drawing/2010/main" xmlns="">
                 <a:effectLst>
                   <a:outerShdw dist="35921" dir="2700000" algn="ctr" rotWithShape="0">
                     <a:schemeClr val="bg2"/>
@@ -6811,14 +6846,14 @@
           <a:effectLst/>
           <a:extLst>
             <a:ext uri="{909E8E84-426E-40dd-AFC4-6F175D3DCCD1}">
-              <a14:hiddenFill xmlns="" xmlns:a14="http://schemas.microsoft.com/office/drawing/2010/main">
+              <a14:hiddenFill xmlns:a14="http://schemas.microsoft.com/office/drawing/2010/main" xmlns="">
                 <a:solidFill>
                   <a:schemeClr val="accent1"/>
                 </a:solidFill>
               </a14:hiddenFill>
             </a:ext>
             <a:ext uri="{91240B29-F687-4f45-9708-019B960494DF}">
-              <a14:hiddenLine xmlns="" xmlns:a14="http://schemas.microsoft.com/office/drawing/2010/main" w="9525">
+              <a14:hiddenLine xmlns:a14="http://schemas.microsoft.com/office/drawing/2010/main" xmlns="" w="9525">
                 <a:solidFill>
                   <a:schemeClr val="tx1"/>
                 </a:solidFill>
@@ -6828,7 +6863,7 @@
               </a14:hiddenLine>
             </a:ext>
             <a:ext uri="{AF507438-7753-43e0-B8FC-AC1667EBCBE1}">
-              <a14:hiddenEffects xmlns="" xmlns:a14="http://schemas.microsoft.com/office/drawing/2010/main">
+              <a14:hiddenEffects xmlns:a14="http://schemas.microsoft.com/office/drawing/2010/main" xmlns="">
                 <a:effectLst>
                   <a:outerShdw dist="35921" dir="2700000" algn="ctr" rotWithShape="0">
                     <a:schemeClr val="bg2"/>
@@ -6920,14 +6955,14 @@
           <a:effectLst/>
           <a:extLst>
             <a:ext uri="{909E8E84-426E-40dd-AFC4-6F175D3DCCD1}">
-              <a14:hiddenFill xmlns="" xmlns:a14="http://schemas.microsoft.com/office/drawing/2010/main">
+              <a14:hiddenFill xmlns:a14="http://schemas.microsoft.com/office/drawing/2010/main" xmlns="">
                 <a:solidFill>
                   <a:schemeClr val="accent1"/>
                 </a:solidFill>
               </a14:hiddenFill>
             </a:ext>
             <a:ext uri="{91240B29-F687-4f45-9708-019B960494DF}">
-              <a14:hiddenLine xmlns="" xmlns:a14="http://schemas.microsoft.com/office/drawing/2010/main" w="12700">
+              <a14:hiddenLine xmlns:a14="http://schemas.microsoft.com/office/drawing/2010/main" xmlns="" w="12700">
                 <a:solidFill>
                   <a:schemeClr val="tx1"/>
                 </a:solidFill>
@@ -6937,7 +6972,7 @@
               </a14:hiddenLine>
             </a:ext>
             <a:ext uri="{AF507438-7753-43e0-B8FC-AC1667EBCBE1}">
-              <a14:hiddenEffects xmlns="" xmlns:a14="http://schemas.microsoft.com/office/drawing/2010/main">
+              <a14:hiddenEffects xmlns:a14="http://schemas.microsoft.com/office/drawing/2010/main" xmlns="">
                 <a:effectLst>
                   <a:outerShdw dist="35921" dir="2700000" algn="ctr" rotWithShape="0">
                     <a:schemeClr val="bg2"/>
@@ -7021,12 +7056,12 @@
           <a:effectLst/>
           <a:extLst>
             <a:ext uri="{909E8E84-426E-40dd-AFC4-6F175D3DCCD1}">
-              <a14:hiddenFill xmlns="" xmlns:a14="http://schemas.microsoft.com/office/drawing/2010/main">
+              <a14:hiddenFill xmlns:a14="http://schemas.microsoft.com/office/drawing/2010/main" xmlns="">
                 <a:noFill/>
               </a14:hiddenFill>
             </a:ext>
             <a:ext uri="{AF507438-7753-43e0-B8FC-AC1667EBCBE1}">
-              <a14:hiddenEffects xmlns="" xmlns:a14="http://schemas.microsoft.com/office/drawing/2010/main">
+              <a14:hiddenEffects xmlns:a14="http://schemas.microsoft.com/office/drawing/2010/main" xmlns="">
                 <a:effectLst>
                   <a:outerShdw dist="35921" dir="2700000" algn="ctr" rotWithShape="0">
                     <a:srgbClr val="808080"/>
@@ -7035,7 +7070,7 @@
               </a14:hiddenEffects>
             </a:ext>
             <a:ext uri="{53640926-AAD7-44d8-BBD7-CCE9431645EC}">
-              <a14:shadowObscured xmlns="" xmlns:a14="http://schemas.microsoft.com/office/drawing/2010/main" val="1"/>
+              <a14:shadowObscured xmlns:a14="http://schemas.microsoft.com/office/drawing/2010/main" xmlns="" val="1"/>
             </a:ext>
           </a:extLst>
         </p:spPr>
@@ -8886,14 +8921,14 @@
           <a:effectLst/>
           <a:extLst>
             <a:ext uri="{909E8E84-426E-40dd-AFC4-6F175D3DCCD1}">
-              <a14:hiddenFill xmlns="" xmlns:a14="http://schemas.microsoft.com/office/drawing/2010/main">
+              <a14:hiddenFill xmlns:a14="http://schemas.microsoft.com/office/drawing/2010/main" xmlns="">
                 <a:solidFill>
                   <a:schemeClr val="bg1"/>
                 </a:solidFill>
               </a14:hiddenFill>
             </a:ext>
             <a:ext uri="{91240B29-F687-4f45-9708-019B960494DF}">
-              <a14:hiddenLine xmlns="" xmlns:a14="http://schemas.microsoft.com/office/drawing/2010/main" w="12700">
+              <a14:hiddenLine xmlns:a14="http://schemas.microsoft.com/office/drawing/2010/main" xmlns="" w="12700">
                 <a:solidFill>
                   <a:schemeClr val="tx1"/>
                 </a:solidFill>
@@ -8903,7 +8938,7 @@
               </a14:hiddenLine>
             </a:ext>
             <a:ext uri="{AF507438-7753-43e0-B8FC-AC1667EBCBE1}">
-              <a14:hiddenEffects xmlns="" xmlns:a14="http://schemas.microsoft.com/office/drawing/2010/main">
+              <a14:hiddenEffects xmlns:a14="http://schemas.microsoft.com/office/drawing/2010/main" xmlns="">
                 <a:effectLst>
                   <a:outerShdw dist="35921" dir="2700000" algn="ctr" rotWithShape="0">
                     <a:schemeClr val="bg2"/>
@@ -8954,14 +8989,14 @@
           <a:effectLst/>
           <a:extLst>
             <a:ext uri="{909E8E84-426E-40dd-AFC4-6F175D3DCCD1}">
-              <a14:hiddenFill xmlns="" xmlns:a14="http://schemas.microsoft.com/office/drawing/2010/main">
+              <a14:hiddenFill xmlns:a14="http://schemas.microsoft.com/office/drawing/2010/main" xmlns="">
                 <a:solidFill>
                   <a:schemeClr val="accent1"/>
                 </a:solidFill>
               </a14:hiddenFill>
             </a:ext>
             <a:ext uri="{91240B29-F687-4f45-9708-019B960494DF}">
-              <a14:hiddenLine xmlns="" xmlns:a14="http://schemas.microsoft.com/office/drawing/2010/main" w="12700">
+              <a14:hiddenLine xmlns:a14="http://schemas.microsoft.com/office/drawing/2010/main" xmlns="" w="12700">
                 <a:solidFill>
                   <a:schemeClr val="tx1"/>
                 </a:solidFill>
@@ -8971,7 +9006,7 @@
               </a14:hiddenLine>
             </a:ext>
             <a:ext uri="{AF507438-7753-43e0-B8FC-AC1667EBCBE1}">
-              <a14:hiddenEffects xmlns="" xmlns:a14="http://schemas.microsoft.com/office/drawing/2010/main">
+              <a14:hiddenEffects xmlns:a14="http://schemas.microsoft.com/office/drawing/2010/main" xmlns="">
                 <a:effectLst>
                   <a:outerShdw dist="35921" dir="2700000" algn="ctr" rotWithShape="0">
                     <a:schemeClr val="bg2"/>
@@ -9759,14 +9794,14 @@
           <a:effectLst/>
           <a:extLst>
             <a:ext uri="{909E8E84-426E-40dd-AFC4-6F175D3DCCD1}">
-              <a14:hiddenFill xmlns="" xmlns:a14="http://schemas.microsoft.com/office/drawing/2010/main">
+              <a14:hiddenFill xmlns:a14="http://schemas.microsoft.com/office/drawing/2010/main" xmlns="">
                 <a:solidFill>
                   <a:schemeClr val="bg1"/>
                 </a:solidFill>
               </a14:hiddenFill>
             </a:ext>
             <a:ext uri="{91240B29-F687-4f45-9708-019B960494DF}">
-              <a14:hiddenLine xmlns="" xmlns:a14="http://schemas.microsoft.com/office/drawing/2010/main" w="12700">
+              <a14:hiddenLine xmlns:a14="http://schemas.microsoft.com/office/drawing/2010/main" xmlns="" w="12700">
                 <a:solidFill>
                   <a:schemeClr val="tx1"/>
                 </a:solidFill>
@@ -9776,7 +9811,7 @@
               </a14:hiddenLine>
             </a:ext>
             <a:ext uri="{AF507438-7753-43e0-B8FC-AC1667EBCBE1}">
-              <a14:hiddenEffects xmlns="" xmlns:a14="http://schemas.microsoft.com/office/drawing/2010/main">
+              <a14:hiddenEffects xmlns:a14="http://schemas.microsoft.com/office/drawing/2010/main" xmlns="">
                 <a:effectLst>
                   <a:outerShdw dist="35921" dir="2700000" algn="ctr" rotWithShape="0">
                     <a:schemeClr val="bg2"/>
@@ -10429,23 +10464,7 @@
           <a:p>
             <a:r>
               <a:rPr lang="en-US" dirty="0" smtClean="0"/>
-              <a:t>Create </a:t>
-            </a:r>
-            <a:r>
-              <a:rPr lang="en-US" dirty="0" smtClean="0"/>
-              <a:t>a new Maven </a:t>
-            </a:r>
-            <a:r>
-              <a:rPr lang="en-US" dirty="0" smtClean="0"/>
-              <a:t>repository </a:t>
-            </a:r>
-            <a:r>
-              <a:rPr lang="en-US" dirty="0" smtClean="0"/>
-              <a:t>in </a:t>
-            </a:r>
-            <a:r>
-              <a:rPr lang="en-US" dirty="0" smtClean="0"/>
-              <a:t>Eclipse</a:t>
+              <a:t>Create a new Maven repository in Eclipse</a:t>
             </a:r>
           </a:p>
           <a:p>
@@ -10622,7 +10641,6 @@
               <a:rPr lang="en-US" sz="2400" dirty="0" smtClean="0"/>
               <a:t> dependency</a:t>
             </a:r>
-            <a:endParaRPr lang="en-US" sz="2400" dirty="0" smtClean="0"/>
           </a:p>
           <a:p>
             <a:pPr lvl="1"/>
@@ -11024,8 +11042,12 @@
           <a:lstStyle/>
           <a:p>
             <a:r>
-              <a:rPr lang="en-US" dirty="0" smtClean="0"/>
-              <a:t>Demo 2</a:t>
+              <a:rPr lang="en-US" dirty="0"/>
+              <a:t>Setting up </a:t>
+            </a:r>
+            <a:r>
+              <a:rPr lang="en-US" dirty="0" err="1"/>
+              <a:t>BioJava</a:t>
             </a:r>
             <a:endParaRPr lang="en-US" dirty="0"/>
           </a:p>
@@ -11058,7 +11080,6 @@
               <a:rPr lang="en-US" sz="2400" dirty="0" smtClean="0"/>
               <a:t> environment</a:t>
             </a:r>
-            <a:endParaRPr lang="en-US" sz="2400" dirty="0" smtClean="0"/>
           </a:p>
           <a:p>
             <a:pPr marL="914400" lvl="1" indent="-457200">
@@ -11178,8 +11199,12 @@
           <a:lstStyle/>
           <a:p>
             <a:r>
-              <a:rPr lang="en-US" dirty="0" smtClean="0"/>
-              <a:t>Demo 2</a:t>
+              <a:rPr lang="en-US" dirty="0"/>
+              <a:t>Setting up </a:t>
+            </a:r>
+            <a:r>
+              <a:rPr lang="en-US" dirty="0" err="1"/>
+              <a:t>BioJava</a:t>
             </a:r>
             <a:endParaRPr lang="en-US" dirty="0"/>
           </a:p>
@@ -11212,7 +11237,6 @@
               <a:rPr lang="en-US" sz="2400" dirty="0" smtClean="0"/>
               <a:t> environment</a:t>
             </a:r>
-            <a:endParaRPr lang="en-US" sz="2400" dirty="0" smtClean="0"/>
           </a:p>
           <a:p>
             <a:pPr marL="914400" lvl="1" indent="-457200">
@@ -11387,27 +11411,20 @@
           <a:p>
             <a:r>
               <a:rPr lang="en-US" dirty="0" smtClean="0"/>
-              <a:t>Structure </a:t>
-            </a:r>
-            <a:r>
-              <a:rPr lang="en-US" dirty="0" smtClean="0"/>
-              <a:t>Objects</a:t>
-            </a:r>
-            <a:endParaRPr lang="en-US" dirty="0" smtClean="0"/>
+              <a:t>Structure Objects</a:t>
+            </a:r>
           </a:p>
           <a:p>
             <a:r>
               <a:rPr lang="en-US" dirty="0" smtClean="0"/>
               <a:t>Loading and writing</a:t>
             </a:r>
-            <a:endParaRPr lang="en-US" dirty="0" smtClean="0"/>
           </a:p>
           <a:p>
             <a:r>
               <a:rPr lang="en-US" dirty="0" smtClean="0"/>
               <a:t>Operations</a:t>
             </a:r>
-            <a:endParaRPr lang="en-US" dirty="0" smtClean="0"/>
           </a:p>
         </p:txBody>
       </p:sp>
@@ -11469,7 +11486,7 @@
           </a:ln>
           <a:extLst>
             <a:ext uri="{AF507438-7753-43e0-B8FC-AC1667EBCBE1}">
-              <a14:hiddenEffects xmlns="" xmlns:a14="http://schemas.microsoft.com/office/drawing/2010/main">
+              <a14:hiddenEffects xmlns:a14="http://schemas.microsoft.com/office/drawing/2010/main" xmlns="">
                 <a:effectLst>
                   <a:outerShdw dist="17961" dir="2700000" algn="ctr" rotWithShape="0">
                     <a:schemeClr val="bg2"/>
@@ -11547,11 +11564,7 @@
           <a:p>
             <a:r>
               <a:rPr lang="en-US" dirty="0" smtClean="0"/>
-              <a:t>Structure </a:t>
-            </a:r>
-            <a:r>
-              <a:rPr lang="en-US" dirty="0" smtClean="0"/>
-              <a:t>Objects</a:t>
+              <a:t>Structure Objects</a:t>
             </a:r>
             <a:endParaRPr lang="en-US" dirty="0"/>
           </a:p>
@@ -11577,7 +11590,7 @@
           </a:ln>
           <a:extLst>
             <a:ext uri="{AF507438-7753-43e0-B8FC-AC1667EBCBE1}">
-              <a14:hiddenEffects xmlns="" xmlns:a14="http://schemas.microsoft.com/office/drawing/2010/main">
+              <a14:hiddenEffects xmlns:a14="http://schemas.microsoft.com/office/drawing/2010/main" xmlns="">
                 <a:effectLst>
                   <a:outerShdw dist="17961" dir="2700000" algn="ctr" rotWithShape="0">
                     <a:schemeClr val="bg2"/>
@@ -11661,7 +11674,7 @@
           </a:ln>
           <a:extLst>
             <a:ext uri="{AF507438-7753-43e0-B8FC-AC1667EBCBE1}">
-              <a14:hiddenEffects xmlns="" xmlns:a14="http://schemas.microsoft.com/office/drawing/2010/main">
+              <a14:hiddenEffects xmlns:a14="http://schemas.microsoft.com/office/drawing/2010/main" xmlns="">
                 <a:effectLst>
                   <a:outerShdw dist="17961" dir="2700000" algn="ctr" rotWithShape="0">
                     <a:schemeClr val="bg2"/>
@@ -11745,7 +11758,7 @@
           </a:ln>
           <a:extLst>
             <a:ext uri="{AF507438-7753-43e0-B8FC-AC1667EBCBE1}">
-              <a14:hiddenEffects xmlns="" xmlns:a14="http://schemas.microsoft.com/office/drawing/2010/main">
+              <a14:hiddenEffects xmlns:a14="http://schemas.microsoft.com/office/drawing/2010/main" xmlns="">
                 <a:effectLst>
                   <a:outerShdw dist="17961" dir="2700000" algn="ctr" rotWithShape="0">
                     <a:schemeClr val="bg2"/>
@@ -11832,7 +11845,7 @@
           </a:ln>
           <a:extLst>
             <a:ext uri="{AF507438-7753-43e0-B8FC-AC1667EBCBE1}">
-              <a14:hiddenEffects xmlns="" xmlns:a14="http://schemas.microsoft.com/office/drawing/2010/main">
+              <a14:hiddenEffects xmlns:a14="http://schemas.microsoft.com/office/drawing/2010/main" xmlns="">
                 <a:effectLst>
                   <a:outerShdw dist="17961" dir="2700000" algn="ctr" rotWithShape="0">
                     <a:schemeClr val="bg2"/>
@@ -11919,7 +11932,7 @@
           </a:ln>
           <a:extLst>
             <a:ext uri="{AF507438-7753-43e0-B8FC-AC1667EBCBE1}">
-              <a14:hiddenEffects xmlns="" xmlns:a14="http://schemas.microsoft.com/office/drawing/2010/main">
+              <a14:hiddenEffects xmlns:a14="http://schemas.microsoft.com/office/drawing/2010/main" xmlns="">
                 <a:effectLst>
                   <a:outerShdw dist="17961" dir="2700000" algn="ctr" rotWithShape="0">
                     <a:schemeClr val="bg2"/>
@@ -12006,7 +12019,7 @@
           </a:ln>
           <a:extLst>
             <a:ext uri="{AF507438-7753-43e0-B8FC-AC1667EBCBE1}">
-              <a14:hiddenEffects xmlns="" xmlns:a14="http://schemas.microsoft.com/office/drawing/2010/main">
+              <a14:hiddenEffects xmlns:a14="http://schemas.microsoft.com/office/drawing/2010/main" xmlns="">
                 <a:effectLst>
                   <a:outerShdw dist="17961" dir="2700000" algn="ctr" rotWithShape="0">
                     <a:schemeClr val="bg2"/>
@@ -12159,7 +12172,7 @@
           <a:effectLst/>
           <a:extLst>
             <a:ext uri="{AF507438-7753-43e0-B8FC-AC1667EBCBE1}">
-              <a14:hiddenEffects xmlns="" xmlns:a14="http://schemas.microsoft.com/office/drawing/2010/main">
+              <a14:hiddenEffects xmlns:a14="http://schemas.microsoft.com/office/drawing/2010/main" xmlns="">
                 <a:effectLst>
                   <a:outerShdw dist="17961" dir="2700000" algn="ctr" rotWithShape="0">
                     <a:schemeClr val="bg2"/>
@@ -12195,7 +12208,7 @@
           </a:ln>
           <a:extLst>
             <a:ext uri="{AF507438-7753-43e0-B8FC-AC1667EBCBE1}">
-              <a14:hiddenEffects xmlns="" xmlns:a14="http://schemas.microsoft.com/office/drawing/2010/main">
+              <a14:hiddenEffects xmlns:a14="http://schemas.microsoft.com/office/drawing/2010/main" xmlns="">
                 <a:effectLst>
                   <a:outerShdw dist="17961" dir="2700000" algn="ctr" rotWithShape="0">
                     <a:schemeClr val="bg2"/>
@@ -12279,7 +12292,7 @@
           </a:ln>
           <a:extLst>
             <a:ext uri="{AF507438-7753-43e0-B8FC-AC1667EBCBE1}">
-              <a14:hiddenEffects xmlns="" xmlns:a14="http://schemas.microsoft.com/office/drawing/2010/main">
+              <a14:hiddenEffects xmlns:a14="http://schemas.microsoft.com/office/drawing/2010/main" xmlns="">
                 <a:effectLst>
                   <a:outerShdw dist="17961" dir="2700000" algn="ctr" rotWithShape="0">
                     <a:schemeClr val="bg2"/>
@@ -12365,7 +12378,7 @@
           </a:ln>
           <a:extLst>
             <a:ext uri="{AF507438-7753-43e0-B8FC-AC1667EBCBE1}">
-              <a14:hiddenEffects xmlns="" xmlns:a14="http://schemas.microsoft.com/office/drawing/2010/main">
+              <a14:hiddenEffects xmlns:a14="http://schemas.microsoft.com/office/drawing/2010/main" xmlns="">
                 <a:effectLst>
                   <a:outerShdw dist="17961" dir="2700000" algn="ctr" rotWithShape="0">
                     <a:schemeClr val="bg2"/>
@@ -12456,7 +12469,7 @@
           </a:ln>
           <a:extLst>
             <a:ext uri="{AF507438-7753-43e0-B8FC-AC1667EBCBE1}">
-              <a14:hiddenEffects xmlns="" xmlns:a14="http://schemas.microsoft.com/office/drawing/2010/main">
+              <a14:hiddenEffects xmlns:a14="http://schemas.microsoft.com/office/drawing/2010/main" xmlns="">
                 <a:effectLst>
                   <a:outerShdw dist="17961" dir="2700000" algn="ctr" rotWithShape="0">
                     <a:schemeClr val="bg2"/>
@@ -12552,7 +12565,7 @@
           <a:effectLst/>
           <a:extLst>
             <a:ext uri="{AF507438-7753-43e0-B8FC-AC1667EBCBE1}">
-              <a14:hiddenEffects xmlns="" xmlns:a14="http://schemas.microsoft.com/office/drawing/2010/main">
+              <a14:hiddenEffects xmlns:a14="http://schemas.microsoft.com/office/drawing/2010/main" xmlns="">
                 <a:effectLst>
                   <a:outerShdw dist="17961" dir="2700000" algn="ctr" rotWithShape="0">
                     <a:schemeClr val="bg2"/>
@@ -12595,7 +12608,7 @@
           <a:effectLst/>
           <a:extLst>
             <a:ext uri="{AF507438-7753-43e0-B8FC-AC1667EBCBE1}">
-              <a14:hiddenEffects xmlns="" xmlns:a14="http://schemas.microsoft.com/office/drawing/2010/main">
+              <a14:hiddenEffects xmlns:a14="http://schemas.microsoft.com/office/drawing/2010/main" xmlns="">
                 <a:effectLst>
                   <a:outerShdw dist="17961" dir="2700000" algn="ctr" rotWithShape="0">
                     <a:schemeClr val="bg2"/>
@@ -12638,7 +12651,7 @@
           <a:effectLst/>
           <a:extLst>
             <a:ext uri="{AF507438-7753-43e0-B8FC-AC1667EBCBE1}">
-              <a14:hiddenEffects xmlns="" xmlns:a14="http://schemas.microsoft.com/office/drawing/2010/main">
+              <a14:hiddenEffects xmlns:a14="http://schemas.microsoft.com/office/drawing/2010/main" xmlns="">
                 <a:effectLst>
                   <a:outerShdw dist="17961" dir="2700000" algn="ctr" rotWithShape="0">
                     <a:schemeClr val="bg2"/>
@@ -12681,7 +12694,7 @@
           <a:effectLst/>
           <a:extLst>
             <a:ext uri="{AF507438-7753-43e0-B8FC-AC1667EBCBE1}">
-              <a14:hiddenEffects xmlns="" xmlns:a14="http://schemas.microsoft.com/office/drawing/2010/main">
+              <a14:hiddenEffects xmlns:a14="http://schemas.microsoft.com/office/drawing/2010/main" xmlns="">
                 <a:effectLst>
                   <a:outerShdw dist="17961" dir="2700000" algn="ctr" rotWithShape="0">
                     <a:schemeClr val="bg2"/>
@@ -12724,7 +12737,7 @@
           <a:effectLst/>
           <a:extLst>
             <a:ext uri="{AF507438-7753-43e0-B8FC-AC1667EBCBE1}">
-              <a14:hiddenEffects xmlns="" xmlns:a14="http://schemas.microsoft.com/office/drawing/2010/main">
+              <a14:hiddenEffects xmlns:a14="http://schemas.microsoft.com/office/drawing/2010/main" xmlns="">
                 <a:effectLst>
                   <a:outerShdw dist="17961" dir="2700000" algn="ctr" rotWithShape="0">
                     <a:schemeClr val="bg2"/>
@@ -12831,7 +12844,6 @@
               <a:rPr lang="en-US" sz="2000" i="0" dirty="0"/>
               <a:t>(X,Y,Z) </a:t>
             </a:r>
-            <a:endParaRPr lang="en-US" sz="2000" i="0" dirty="0"/>
           </a:p>
         </p:txBody>
       </p:sp>
@@ -13222,13 +13234,8 @@
             <a:pPr lvl="1"/>
             <a:r>
               <a:rPr lang="en-US" sz="2800" dirty="0" smtClean="0"/>
-              <a:t>SCOP, CATH &amp; ECOD ids (</a:t>
-            </a:r>
-            <a:r>
-              <a:rPr lang="en-US" sz="2800" dirty="0" smtClean="0"/>
-              <a:t>d2hhba_)</a:t>
-            </a:r>
-            <a:endParaRPr lang="en-US" sz="2800" dirty="0" smtClean="0"/>
+              <a:t>SCOP, CATH &amp; ECOD ids (d2hhba_)</a:t>
+            </a:r>
           </a:p>
           <a:p>
             <a:pPr lvl="1"/>
@@ -13236,7 +13243,6 @@
               <a:rPr lang="en-US" sz="2800" dirty="0" smtClean="0"/>
               <a:t>Many configuration options</a:t>
             </a:r>
-            <a:endParaRPr lang="en-US" sz="2800" dirty="0" smtClean="0"/>
           </a:p>
           <a:p>
             <a:pPr lvl="1"/>
@@ -13325,11 +13331,7 @@
           <a:p>
             <a:r>
               <a:rPr lang="en-US" dirty="0" smtClean="0"/>
-              <a:t>Load a structure in </a:t>
-            </a:r>
-            <a:r>
-              <a:rPr lang="en-US" dirty="0" smtClean="0"/>
-              <a:t>different formats</a:t>
+              <a:t>Load a structure in different formats</a:t>
             </a:r>
           </a:p>
           <a:p>
@@ -13569,6 +13571,13 @@
     <a:masterClrMapping/>
   </p:clrMapOvr>
   <p:transition/>
+  <p:timing>
+    <p:tnLst>
+      <p:par>
+        <p:cTn id="1" dur="indefinite" restart="never" nodeType="tmRoot"/>
+      </p:par>
+    </p:tnLst>
+  </p:timing>
 </p:sld>
 </file>
 
@@ -13621,11 +13630,7 @@
             </a:r>
             <a:r>
               <a:rPr lang="en-US" sz="4800" dirty="0" smtClean="0"/>
-              <a:t> </a:t>
-            </a:r>
-            <a:r>
-              <a:rPr lang="en-US" sz="4800" dirty="0" smtClean="0"/>
-              <a:t>Project</a:t>
+              <a:t> Project</a:t>
             </a:r>
             <a:endParaRPr lang="en-US" dirty="0"/>
           </a:p>
@@ -13656,14 +13661,12 @@
               <a:rPr lang="en-US" dirty="0" smtClean="0"/>
               <a:t>Resources</a:t>
             </a:r>
-            <a:endParaRPr lang="en-US" dirty="0" smtClean="0"/>
           </a:p>
           <a:p>
             <a:r>
               <a:rPr lang="en-US" dirty="0" smtClean="0"/>
               <a:t>Setup</a:t>
             </a:r>
-            <a:endParaRPr lang="en-US" dirty="0" smtClean="0"/>
           </a:p>
           <a:p>
             <a:endParaRPr lang="en-US" dirty="0" smtClean="0"/>
@@ -13767,14 +13770,12 @@
               <a:rPr lang="en-US" dirty="0" smtClean="0"/>
               <a:t>Structure alignments</a:t>
             </a:r>
-            <a:endParaRPr lang="en-US" dirty="0" smtClean="0"/>
           </a:p>
           <a:p>
             <a:r>
               <a:rPr lang="en-US" dirty="0" smtClean="0"/>
               <a:t>Solvent accessible surface</a:t>
             </a:r>
-            <a:endParaRPr lang="en-US" dirty="0" smtClean="0"/>
           </a:p>
         </p:txBody>
       </p:sp>
@@ -13789,6 +13790,13 @@
     <a:masterClrMapping/>
   </p:clrMapOvr>
   <p:transition/>
+  <p:timing>
+    <p:tnLst>
+      <p:par>
+        <p:cTn id="1" dur="indefinite" restart="never" nodeType="tmRoot"/>
+      </p:par>
+    </p:tnLst>
+  </p:timing>
 </p:sld>
 </file>
 
@@ -13858,6 +13866,13 @@
     <a:masterClrMapping/>
   </p:clrMapOvr>
   <p:transition/>
+  <p:timing>
+    <p:tnLst>
+      <p:par>
+        <p:cTn id="1" dur="indefinite" restart="never" nodeType="tmRoot"/>
+      </p:par>
+    </p:tnLst>
+  </p:timing>
 </p:sld>
 </file>
 
@@ -13925,11 +13940,7 @@
             </a:r>
             <a:r>
               <a:rPr lang="en-US" sz="2400" b="0" dirty="0" smtClean="0"/>
-              <a:t> </a:t>
-            </a:r>
-            <a:r>
-              <a:rPr lang="en-US" sz="2400" b="0" dirty="0" smtClean="0"/>
-              <a:t>is an </a:t>
+              <a:t> is an </a:t>
             </a:r>
             <a:r>
               <a:rPr lang="en-US" sz="2400" dirty="0" smtClean="0"/>
@@ -13939,7 +13950,6 @@
               <a:rPr lang="en-US" sz="2400" b="0" dirty="0" smtClean="0"/>
               <a:t>project dedicated to </a:t>
             </a:r>
-            <a:endParaRPr lang="en-US" sz="2400" b="0" dirty="0" smtClean="0"/>
           </a:p>
           <a:p>
             <a:pPr marL="0" indent="0" algn="ctr">
@@ -13947,11 +13957,7 @@
             </a:pPr>
             <a:r>
               <a:rPr lang="en-US" sz="2400" b="0" dirty="0" smtClean="0"/>
-              <a:t>providing </a:t>
-            </a:r>
-            <a:r>
-              <a:rPr lang="en-US" sz="2400" b="0" dirty="0" smtClean="0"/>
-              <a:t>a </a:t>
+              <a:t>providing a </a:t>
             </a:r>
             <a:r>
               <a:rPr lang="en-US" sz="2400" dirty="0" smtClean="0"/>
@@ -13961,7 +13967,6 @@
               <a:rPr lang="en-US" sz="2400" b="0" dirty="0" smtClean="0"/>
               <a:t>for </a:t>
             </a:r>
-            <a:endParaRPr lang="en-US" sz="2400" b="0" dirty="0" smtClean="0"/>
           </a:p>
           <a:p>
             <a:pPr marL="0" indent="0" algn="ctr">
@@ -13977,11 +13982,7 @@
             </a:r>
             <a:r>
               <a:rPr lang="en-US" sz="2400" dirty="0" smtClean="0"/>
-              <a:t>biological </a:t>
-            </a:r>
-            <a:r>
-              <a:rPr lang="en-US" sz="2400" dirty="0" smtClean="0"/>
-              <a:t>data</a:t>
+              <a:t>biological data</a:t>
             </a:r>
             <a:endParaRPr lang="en-US" sz="2400" dirty="0"/>
           </a:p>
@@ -15376,7 +15377,7 @@
           </a:ln>
           <a:extLst>
             <a:ext uri="{AF507438-7753-43e0-B8FC-AC1667EBCBE1}">
-              <a14:hiddenEffects xmlns="" xmlns:a14="http://schemas.microsoft.com/office/drawing/2010/main">
+              <a14:hiddenEffects xmlns:a14="http://schemas.microsoft.com/office/drawing/2010/main" xmlns="">
                 <a:effectLst>
                   <a:outerShdw dist="17961" dir="2700000" algn="ctr" rotWithShape="0">
                     <a:schemeClr val="bg2"/>
@@ -15550,7 +15551,7 @@
           <a:effectLst/>
           <a:extLst>
             <a:ext uri="{AF507438-7753-43e0-B8FC-AC1667EBCBE1}">
-              <a14:hiddenEffects xmlns="" xmlns:a14="http://schemas.microsoft.com/office/drawing/2010/main">
+              <a14:hiddenEffects xmlns:a14="http://schemas.microsoft.com/office/drawing/2010/main" xmlns="">
                 <a:effectLst>
                   <a:outerShdw dist="17961" dir="2700000" algn="ctr" rotWithShape="0">
                     <a:schemeClr val="bg2"/>
@@ -15635,11 +15636,7 @@
             </a:r>
             <a:r>
               <a:rPr lang="en-US" sz="1800" dirty="0" smtClean="0"/>
-              <a:t> </a:t>
-            </a:r>
-            <a:r>
-              <a:rPr lang="en-US" sz="1800" dirty="0" smtClean="0"/>
-              <a:t>5</a:t>
+              <a:t> 5</a:t>
             </a:r>
             <a:endParaRPr lang="en-US" sz="1800" dirty="0"/>
           </a:p>
@@ -15674,7 +15671,7 @@
           <a:effectLst/>
           <a:extLst>
             <a:ext uri="{AF507438-7753-43e0-B8FC-AC1667EBCBE1}">
-              <a14:hiddenEffects xmlns="" xmlns:a14="http://schemas.microsoft.com/office/drawing/2010/main">
+              <a14:hiddenEffects xmlns:a14="http://schemas.microsoft.com/office/drawing/2010/main" xmlns="">
                 <a:effectLst>
                   <a:outerShdw dist="17961" dir="2700000" algn="ctr" rotWithShape="0">
                     <a:schemeClr val="bg2"/>
@@ -15714,7 +15711,7 @@
           <a:effectLst/>
           <a:extLst>
             <a:ext uri="{AF507438-7753-43e0-B8FC-AC1667EBCBE1}">
-              <a14:hiddenEffects xmlns="" xmlns:a14="http://schemas.microsoft.com/office/drawing/2010/main">
+              <a14:hiddenEffects xmlns:a14="http://schemas.microsoft.com/office/drawing/2010/main" xmlns="">
                 <a:effectLst>
                   <a:outerShdw dist="17961" dir="2700000" algn="ctr" rotWithShape="0">
                     <a:schemeClr val="bg2"/>
@@ -15751,7 +15748,6 @@
               <a:rPr lang="en-US" sz="1800" b="1" dirty="0" smtClean="0"/>
               <a:t>2013</a:t>
             </a:r>
-            <a:endParaRPr lang="en-US" sz="1800" b="1" dirty="0" smtClean="0"/>
           </a:p>
           <a:p>
             <a:r>
@@ -15764,11 +15760,7 @@
             </a:r>
             <a:r>
               <a:rPr lang="en-US" sz="1800" dirty="0" smtClean="0"/>
-              <a:t> (Git</a:t>
-            </a:r>
-            <a:r>
-              <a:rPr lang="en-US" sz="1800" dirty="0" smtClean="0"/>
-              <a:t>Hub)</a:t>
+              <a:t> (GitHub)</a:t>
             </a:r>
           </a:p>
         </p:txBody>
@@ -15809,11 +15801,7 @@
             </a:r>
             <a:r>
               <a:rPr lang="en-US" sz="1800" dirty="0" smtClean="0"/>
-              <a:t> </a:t>
-            </a:r>
-            <a:r>
-              <a:rPr lang="en-US" sz="1800" dirty="0" smtClean="0"/>
-              <a:t>3</a:t>
+              <a:t> 3</a:t>
             </a:r>
           </a:p>
           <a:p>
@@ -15844,11 +15832,6 @@
               </a:rPr>
               <a:t>et al</a:t>
             </a:r>
-            <a:endParaRPr lang="en-US" sz="1800" i="0" dirty="0" smtClean="0">
-              <a:solidFill>
-                <a:schemeClr val="accent2"/>
-              </a:solidFill>
-            </a:endParaRPr>
           </a:p>
         </p:txBody>
       </p:sp>
@@ -15881,7 +15864,7 @@
           <a:effectLst/>
           <a:extLst>
             <a:ext uri="{AF507438-7753-43e0-B8FC-AC1667EBCBE1}">
-              <a14:hiddenEffects xmlns="" xmlns:a14="http://schemas.microsoft.com/office/drawing/2010/main">
+              <a14:hiddenEffects xmlns:a14="http://schemas.microsoft.com/office/drawing/2010/main" xmlns="">
                 <a:effectLst>
                   <a:outerShdw dist="17961" dir="2700000" algn="ctr" rotWithShape="0">
                     <a:schemeClr val="bg2"/>
@@ -15918,7 +15901,6 @@
               <a:rPr lang="en-US" sz="1800" b="1" dirty="0" smtClean="0"/>
               <a:t>2009</a:t>
             </a:r>
-            <a:endParaRPr lang="en-US" sz="1800" b="1" dirty="0" smtClean="0"/>
           </a:p>
           <a:p>
             <a:r>
@@ -16031,7 +16013,7 @@
           <a:effectLst/>
           <a:extLst>
             <a:ext uri="{AF507438-7753-43e0-B8FC-AC1667EBCBE1}">
-              <a14:hiddenEffects xmlns="" xmlns:a14="http://schemas.microsoft.com/office/drawing/2010/main">
+              <a14:hiddenEffects xmlns:a14="http://schemas.microsoft.com/office/drawing/2010/main" xmlns="">
                 <a:effectLst>
                   <a:outerShdw dist="17961" dir="2700000" algn="ctr" rotWithShape="0">
                     <a:schemeClr val="bg2"/>
@@ -16071,7 +16053,7 @@
           <a:effectLst/>
           <a:extLst>
             <a:ext uri="{AF507438-7753-43e0-B8FC-AC1667EBCBE1}">
-              <a14:hiddenEffects xmlns="" xmlns:a14="http://schemas.microsoft.com/office/drawing/2010/main">
+              <a14:hiddenEffects xmlns:a14="http://schemas.microsoft.com/office/drawing/2010/main" xmlns="">
                 <a:effectLst>
                   <a:outerShdw dist="17961" dir="2700000" algn="ctr" rotWithShape="0">
                     <a:schemeClr val="bg2"/>
@@ -16113,7 +16095,7 @@
           <a:effectLst/>
           <a:extLst>
             <a:ext uri="{AF507438-7753-43e0-B8FC-AC1667EBCBE1}">
-              <a14:hiddenEffects xmlns="" xmlns:a14="http://schemas.microsoft.com/office/drawing/2010/main">
+              <a14:hiddenEffects xmlns:a14="http://schemas.microsoft.com/office/drawing/2010/main" xmlns="">
                 <a:effectLst>
                   <a:outerShdw dist="17961" dir="2700000" algn="ctr" rotWithShape="0">
                     <a:schemeClr val="bg2"/>
@@ -16153,7 +16135,7 @@
           <a:effectLst/>
           <a:extLst>
             <a:ext uri="{AF507438-7753-43e0-B8FC-AC1667EBCBE1}">
-              <a14:hiddenEffects xmlns="" xmlns:a14="http://schemas.microsoft.com/office/drawing/2010/main">
+              <a14:hiddenEffects xmlns:a14="http://schemas.microsoft.com/office/drawing/2010/main" xmlns="">
                 <a:effectLst>
                   <a:outerShdw dist="17961" dir="2700000" algn="ctr" rotWithShape="0">
                     <a:schemeClr val="bg2"/>
@@ -16200,16 +16182,6 @@
               </a:rPr>
               <a:t>Java 4</a:t>
             </a:r>
-            <a:endParaRPr kumimoji="0" lang="en-US" sz="1600" b="0" i="1" u="none" strike="noStrike" cap="none" normalizeH="0" baseline="0" smtClean="0">
-              <a:ln>
-                <a:noFill/>
-              </a:ln>
-              <a:solidFill>
-                <a:schemeClr val="tx1"/>
-              </a:solidFill>
-              <a:effectLst/>
-              <a:latin typeface="Helvetica" panose="020B0604020202020204" pitchFamily="34" charset="0"/>
-            </a:endParaRPr>
           </a:p>
         </p:txBody>
       </p:sp>
@@ -16242,7 +16214,7 @@
           <a:effectLst/>
           <a:extLst>
             <a:ext uri="{AF507438-7753-43e0-B8FC-AC1667EBCBE1}">
-              <a14:hiddenEffects xmlns="" xmlns:a14="http://schemas.microsoft.com/office/drawing/2010/main">
+              <a14:hiddenEffects xmlns:a14="http://schemas.microsoft.com/office/drawing/2010/main" xmlns="">
                 <a:effectLst>
                   <a:outerShdw dist="17961" dir="2700000" algn="ctr" rotWithShape="0">
                     <a:schemeClr val="bg2"/>
@@ -16289,16 +16261,6 @@
               </a:rPr>
               <a:t>Java 5</a:t>
             </a:r>
-            <a:endParaRPr kumimoji="0" lang="en-US" sz="1600" b="0" i="1" u="none" strike="noStrike" cap="none" normalizeH="0" baseline="0" dirty="0" smtClean="0">
-              <a:ln>
-                <a:noFill/>
-              </a:ln>
-              <a:solidFill>
-                <a:schemeClr val="tx1"/>
-              </a:solidFill>
-              <a:effectLst/>
-              <a:latin typeface="Helvetica" panose="020B0604020202020204" pitchFamily="34" charset="0"/>
-            </a:endParaRPr>
           </a:p>
         </p:txBody>
       </p:sp>
@@ -16331,7 +16293,7 @@
           <a:effectLst/>
           <a:extLst>
             <a:ext uri="{AF507438-7753-43e0-B8FC-AC1667EBCBE1}">
-              <a14:hiddenEffects xmlns="" xmlns:a14="http://schemas.microsoft.com/office/drawing/2010/main">
+              <a14:hiddenEffects xmlns:a14="http://schemas.microsoft.com/office/drawing/2010/main" xmlns="">
                 <a:effectLst>
                   <a:outerShdw dist="17961" dir="2700000" algn="ctr" rotWithShape="0">
                     <a:schemeClr val="bg2"/>
@@ -16378,16 +16340,6 @@
               </a:rPr>
               <a:t>Java 6</a:t>
             </a:r>
-            <a:endParaRPr kumimoji="0" lang="en-US" sz="1600" b="0" i="1" u="none" strike="noStrike" cap="none" normalizeH="0" baseline="0" dirty="0" smtClean="0">
-              <a:ln>
-                <a:noFill/>
-              </a:ln>
-              <a:solidFill>
-                <a:schemeClr val="tx1"/>
-              </a:solidFill>
-              <a:effectLst/>
-              <a:latin typeface="Helvetica" panose="020B0604020202020204" pitchFamily="34" charset="0"/>
-            </a:endParaRPr>
           </a:p>
         </p:txBody>
       </p:sp>
@@ -16420,7 +16372,7 @@
           <a:effectLst/>
           <a:extLst>
             <a:ext uri="{AF507438-7753-43e0-B8FC-AC1667EBCBE1}">
-              <a14:hiddenEffects xmlns="" xmlns:a14="http://schemas.microsoft.com/office/drawing/2010/main">
+              <a14:hiddenEffects xmlns:a14="http://schemas.microsoft.com/office/drawing/2010/main" xmlns="">
                 <a:effectLst>
                   <a:outerShdw dist="17961" dir="2700000" algn="ctr" rotWithShape="0">
                     <a:schemeClr val="bg2"/>
@@ -16509,7 +16461,7 @@
           <a:effectLst/>
           <a:extLst>
             <a:ext uri="{AF507438-7753-43e0-B8FC-AC1667EBCBE1}">
-              <a14:hiddenEffects xmlns="" xmlns:a14="http://schemas.microsoft.com/office/drawing/2010/main">
+              <a14:hiddenEffects xmlns:a14="http://schemas.microsoft.com/office/drawing/2010/main" xmlns="">
                 <a:effectLst>
                   <a:outerShdw dist="17961" dir="2700000" algn="ctr" rotWithShape="0">
                     <a:schemeClr val="bg2"/>
@@ -16556,16 +16508,6 @@
               </a:rPr>
               <a:t>Java 8</a:t>
             </a:r>
-            <a:endParaRPr kumimoji="0" lang="en-US" sz="1600" b="0" i="1" u="none" strike="noStrike" cap="none" normalizeH="0" baseline="0" dirty="0" smtClean="0">
-              <a:ln>
-                <a:noFill/>
-              </a:ln>
-              <a:solidFill>
-                <a:schemeClr val="tx1"/>
-              </a:solidFill>
-              <a:effectLst/>
-              <a:latin typeface="Helvetica" panose="020B0604020202020204" pitchFamily="34" charset="0"/>
-            </a:endParaRPr>
           </a:p>
         </p:txBody>
       </p:sp>
@@ -16920,14 +16862,14 @@
           <a:effectLst/>
           <a:extLst>
             <a:ext uri="{909E8E84-426E-40dd-AFC4-6F175D3DCCD1}">
-              <a14:hiddenFill xmlns="" xmlns:a14="http://schemas.microsoft.com/office/drawing/2010/main">
+              <a14:hiddenFill xmlns:a14="http://schemas.microsoft.com/office/drawing/2010/main" xmlns="">
                 <a:solidFill>
                   <a:schemeClr val="accent1"/>
                 </a:solidFill>
               </a14:hiddenFill>
             </a:ext>
             <a:ext uri="{91240B29-F687-4f45-9708-019B960494DF}">
-              <a14:hiddenLine xmlns="" xmlns:a14="http://schemas.microsoft.com/office/drawing/2010/main" w="12700">
+              <a14:hiddenLine xmlns:a14="http://schemas.microsoft.com/office/drawing/2010/main" xmlns="" w="12700">
                 <a:solidFill>
                   <a:schemeClr val="tx1"/>
                 </a:solidFill>
@@ -16937,7 +16879,7 @@
               </a14:hiddenLine>
             </a:ext>
             <a:ext uri="{AF507438-7753-43e0-B8FC-AC1667EBCBE1}">
-              <a14:hiddenEffects xmlns="" xmlns:a14="http://schemas.microsoft.com/office/drawing/2010/main">
+              <a14:hiddenEffects xmlns:a14="http://schemas.microsoft.com/office/drawing/2010/main" xmlns="">
                 <a:effectLst>
                   <a:outerShdw dist="35921" dir="2700000" algn="ctr" rotWithShape="0">
                     <a:schemeClr val="bg2"/>
@@ -17280,23 +17222,7 @@
           <a:p>
             <a:r>
               <a:rPr lang="en-US" dirty="0" smtClean="0"/>
-              <a:t>Create </a:t>
-            </a:r>
-            <a:r>
-              <a:rPr lang="en-US" dirty="0" smtClean="0"/>
-              <a:t>a new Maven </a:t>
-            </a:r>
-            <a:r>
-              <a:rPr lang="en-US" dirty="0" smtClean="0"/>
-              <a:t>repository </a:t>
-            </a:r>
-            <a:r>
-              <a:rPr lang="en-US" dirty="0" smtClean="0"/>
-              <a:t>in </a:t>
-            </a:r>
-            <a:r>
-              <a:rPr lang="en-US" dirty="0" smtClean="0"/>
-              <a:t>Eclipse</a:t>
+              <a:t>Create a new Maven repository in Eclipse</a:t>
             </a:r>
           </a:p>
         </p:txBody>
@@ -17379,23 +17305,7 @@
           <a:p>
             <a:r>
               <a:rPr lang="en-US" dirty="0" smtClean="0"/>
-              <a:t>Create </a:t>
-            </a:r>
-            <a:r>
-              <a:rPr lang="en-US" dirty="0" smtClean="0"/>
-              <a:t>a new Maven </a:t>
-            </a:r>
-            <a:r>
-              <a:rPr lang="en-US" dirty="0" smtClean="0"/>
-              <a:t>repository </a:t>
-            </a:r>
-            <a:r>
-              <a:rPr lang="en-US" dirty="0" smtClean="0"/>
-              <a:t>in </a:t>
-            </a:r>
-            <a:r>
-              <a:rPr lang="en-US" dirty="0" smtClean="0"/>
-              <a:t>Eclipse</a:t>
+              <a:t>Create a new Maven repository in Eclipse</a:t>
             </a:r>
           </a:p>
           <a:p>
@@ -17529,23 +17439,7 @@
           <a:p>
             <a:r>
               <a:rPr lang="en-US" dirty="0" smtClean="0"/>
-              <a:t>Create </a:t>
-            </a:r>
-            <a:r>
-              <a:rPr lang="en-US" dirty="0" smtClean="0"/>
-              <a:t>a new Maven </a:t>
-            </a:r>
-            <a:r>
-              <a:rPr lang="en-US" dirty="0" smtClean="0"/>
-              <a:t>repository </a:t>
-            </a:r>
-            <a:r>
-              <a:rPr lang="en-US" dirty="0" smtClean="0"/>
-              <a:t>in </a:t>
-            </a:r>
-            <a:r>
-              <a:rPr lang="en-US" dirty="0" smtClean="0"/>
-              <a:t>Eclipse</a:t>
+              <a:t>Create a new Maven repository in Eclipse</a:t>
             </a:r>
           </a:p>
           <a:p>
@@ -18046,7 +17940,7 @@
         <a:effectLst/>
         <a:extLst>
           <a:ext uri="{AF507438-7753-43e0-B8FC-AC1667EBCBE1}">
-            <a14:hiddenEffects xmlns="" xmlns:a14="http://schemas.microsoft.com/office/drawing/2010/main">
+            <a14:hiddenEffects xmlns:a14="http://schemas.microsoft.com/office/drawing/2010/main" xmlns="">
               <a:effectLst>
                 <a:outerShdw dist="17961" dir="2700000" algn="ctr" rotWithShape="0">
                   <a:schemeClr val="bg2"/>
@@ -18119,7 +18013,7 @@
         <a:effectLst/>
         <a:extLst>
           <a:ext uri="{AF507438-7753-43e0-B8FC-AC1667EBCBE1}">
-            <a14:hiddenEffects xmlns="" xmlns:a14="http://schemas.microsoft.com/office/drawing/2010/main">
+            <a14:hiddenEffects xmlns:a14="http://schemas.microsoft.com/office/drawing/2010/main" xmlns="">
               <a:effectLst>
                 <a:outerShdw dist="17961" dir="2700000" algn="ctr" rotWithShape="0">
                   <a:schemeClr val="bg2"/>

</xml_diff>

<commit_message>
Complete the biological assembly slides
</commit_message>
<xml_diff>
--- a/6-biojava/MMTF2017-BioJava.pptx
+++ b/6-biojava/MMTF2017-BioJava.pptx
@@ -5,10 +5,10 @@
     <p:sldMasterId id="2147483648" r:id="rId1"/>
   </p:sldMasterIdLst>
   <p:notesMasterIdLst>
-    <p:notesMasterId r:id="rId27"/>
+    <p:notesMasterId r:id="rId28"/>
   </p:notesMasterIdLst>
   <p:handoutMasterIdLst>
-    <p:handoutMasterId r:id="rId28"/>
+    <p:handoutMasterId r:id="rId29"/>
   </p:handoutMasterIdLst>
   <p:sldIdLst>
     <p:sldId id="977" r:id="rId2"/>
@@ -18,24 +18,25 @@
     <p:sldId id="981" r:id="rId6"/>
     <p:sldId id="991" r:id="rId7"/>
     <p:sldId id="993" r:id="rId8"/>
-    <p:sldId id="999" r:id="rId9"/>
-    <p:sldId id="996" r:id="rId10"/>
-    <p:sldId id="998" r:id="rId11"/>
-    <p:sldId id="992" r:id="rId12"/>
-    <p:sldId id="1000" r:id="rId13"/>
-    <p:sldId id="1001" r:id="rId14"/>
-    <p:sldId id="986" r:id="rId15"/>
-    <p:sldId id="983" r:id="rId16"/>
-    <p:sldId id="1003" r:id="rId17"/>
-    <p:sldId id="1004" r:id="rId18"/>
-    <p:sldId id="994" r:id="rId19"/>
-    <p:sldId id="995" r:id="rId20"/>
-    <p:sldId id="987" r:id="rId21"/>
-    <p:sldId id="988" r:id="rId22"/>
-    <p:sldId id="1005" r:id="rId23"/>
-    <p:sldId id="1007" r:id="rId24"/>
-    <p:sldId id="1008" r:id="rId25"/>
-    <p:sldId id="1010" r:id="rId26"/>
+    <p:sldId id="1011" r:id="rId9"/>
+    <p:sldId id="999" r:id="rId10"/>
+    <p:sldId id="996" r:id="rId11"/>
+    <p:sldId id="998" r:id="rId12"/>
+    <p:sldId id="992" r:id="rId13"/>
+    <p:sldId id="1000" r:id="rId14"/>
+    <p:sldId id="1001" r:id="rId15"/>
+    <p:sldId id="986" r:id="rId16"/>
+    <p:sldId id="983" r:id="rId17"/>
+    <p:sldId id="1003" r:id="rId18"/>
+    <p:sldId id="1004" r:id="rId19"/>
+    <p:sldId id="994" r:id="rId20"/>
+    <p:sldId id="995" r:id="rId21"/>
+    <p:sldId id="987" r:id="rId22"/>
+    <p:sldId id="988" r:id="rId23"/>
+    <p:sldId id="1005" r:id="rId24"/>
+    <p:sldId id="1007" r:id="rId25"/>
+    <p:sldId id="1008" r:id="rId26"/>
+    <p:sldId id="1010" r:id="rId27"/>
   </p:sldIdLst>
   <p:sldSz cx="9144000" cy="6858000" type="screen4x3"/>
   <p:notesSz cx="7251700" cy="9537700"/>
@@ -10506,6 +10507,156 @@
               <a:buFont typeface="+mj-lt"/>
               <a:buAutoNum type="arabicPeriod"/>
             </a:pPr>
+            <a:endParaRPr lang="en-US" dirty="0"/>
+          </a:p>
+        </p:txBody>
+      </p:sp>
+      <p:pic>
+        <p:nvPicPr>
+          <p:cNvPr id="5" name="Picture 4"/>
+          <p:cNvPicPr>
+            <a:picLocks noChangeAspect="1"/>
+          </p:cNvPicPr>
+          <p:nvPr/>
+        </p:nvPicPr>
+        <p:blipFill>
+          <a:blip r:embed="rId2">
+            <a:extLst>
+              <a:ext uri="{28A0092B-C50C-407E-A947-70E740481C1C}">
+                <a14:useLocalDpi xmlns:a14="http://schemas.microsoft.com/office/drawing/2010/main" val="0"/>
+              </a:ext>
+            </a:extLst>
+          </a:blip>
+          <a:stretch>
+            <a:fillRect/>
+          </a:stretch>
+        </p:blipFill>
+        <p:spPr>
+          <a:xfrm>
+            <a:off x="3528760" y="2231046"/>
+            <a:ext cx="5272339" cy="3862897"/>
+          </a:xfrm>
+          <a:prstGeom prst="rect">
+            <a:avLst/>
+          </a:prstGeom>
+        </p:spPr>
+      </p:pic>
+    </p:spTree>
+    <p:extLst>
+      <p:ext uri="{BB962C8B-B14F-4D97-AF65-F5344CB8AC3E}">
+        <p14:creationId xmlns:p14="http://schemas.microsoft.com/office/powerpoint/2010/main" val="959775454"/>
+      </p:ext>
+    </p:extLst>
+  </p:cSld>
+  <p:clrMapOvr>
+    <a:masterClrMapping/>
+  </p:clrMapOvr>
+  <p:transition/>
+  <p:timing>
+    <p:tnLst>
+      <p:par>
+        <p:cTn id="1" dur="indefinite" restart="never" nodeType="tmRoot"/>
+      </p:par>
+    </p:tnLst>
+  </p:timing>
+</p:sld>
+</file>
+
+<file path=ppt/slides/slide11.xml><?xml version="1.0" encoding="utf-8"?>
+<p:sld xmlns:a="http://schemas.openxmlformats.org/drawingml/2006/main" xmlns:r="http://schemas.openxmlformats.org/officeDocument/2006/relationships" xmlns:p="http://schemas.openxmlformats.org/presentationml/2006/main">
+  <p:cSld>
+    <p:spTree>
+      <p:nvGrpSpPr>
+        <p:cNvPr id="1" name=""/>
+        <p:cNvGrpSpPr/>
+        <p:nvPr/>
+      </p:nvGrpSpPr>
+      <p:grpSpPr>
+        <a:xfrm>
+          <a:off x="0" y="0"/>
+          <a:ext cx="0" cy="0"/>
+          <a:chOff x="0" y="0"/>
+          <a:chExt cx="0" cy="0"/>
+        </a:xfrm>
+      </p:grpSpPr>
+      <p:sp>
+        <p:nvSpPr>
+          <p:cNvPr id="2" name="Title 1"/>
+          <p:cNvSpPr>
+            <a:spLocks noGrp="1"/>
+          </p:cNvSpPr>
+          <p:nvPr>
+            <p:ph type="title"/>
+          </p:nvPr>
+        </p:nvSpPr>
+        <p:spPr/>
+        <p:txBody>
+          <a:bodyPr/>
+          <a:lstStyle/>
+          <a:p>
+            <a:r>
+              <a:rPr lang="en-US" dirty="0" smtClean="0"/>
+              <a:t>Demo 1</a:t>
+            </a:r>
+            <a:endParaRPr lang="en-US" dirty="0"/>
+          </a:p>
+        </p:txBody>
+      </p:sp>
+      <p:sp>
+        <p:nvSpPr>
+          <p:cNvPr id="3" name="Content Placeholder 2"/>
+          <p:cNvSpPr>
+            <a:spLocks noGrp="1"/>
+          </p:cNvSpPr>
+          <p:nvPr>
+            <p:ph idx="1"/>
+          </p:nvPr>
+        </p:nvSpPr>
+        <p:spPr/>
+        <p:txBody>
+          <a:bodyPr/>
+          <a:lstStyle/>
+          <a:p>
+            <a:r>
+              <a:rPr lang="en-US" dirty="0" smtClean="0"/>
+              <a:t>Create a new Maven repository in Eclipse</a:t>
+            </a:r>
+          </a:p>
+          <a:p>
+            <a:pPr marL="914400" lvl="1" indent="-457200">
+              <a:buFont typeface="+mj-lt"/>
+              <a:buAutoNum type="arabicPeriod"/>
+            </a:pPr>
+            <a:r>
+              <a:rPr lang="en-US" dirty="0" smtClean="0"/>
+              <a:t>File &gt; New &gt; Project</a:t>
+            </a:r>
+          </a:p>
+          <a:p>
+            <a:pPr marL="914400" lvl="1" indent="-457200">
+              <a:buFont typeface="+mj-lt"/>
+              <a:buAutoNum type="arabicPeriod"/>
+            </a:pPr>
+            <a:r>
+              <a:rPr lang="en-US" dirty="0"/>
+              <a:t>Maven Project</a:t>
+            </a:r>
+          </a:p>
+          <a:p>
+            <a:pPr marL="914400" lvl="1" indent="-457200">
+              <a:buFont typeface="+mj-lt"/>
+              <a:buAutoNum type="arabicPeriod"/>
+            </a:pPr>
+            <a:r>
+              <a:rPr lang="en-US" dirty="0" smtClean="0"/>
+              <a:t>Use defaults</a:t>
+            </a:r>
+          </a:p>
+          <a:p>
+            <a:pPr marL="914400" lvl="1" indent="-457200">
+              <a:buFont typeface="+mj-lt"/>
+              <a:buAutoNum type="arabicPeriod"/>
+            </a:pPr>
             <a:r>
               <a:rPr lang="en-US" dirty="0" smtClean="0"/>
               <a:t>Choose your group </a:t>
@@ -10578,441 +10729,6 @@
 </p:sld>
 </file>
 
-<file path=ppt/slides/slide11.xml><?xml version="1.0" encoding="utf-8"?>
-<p:sld xmlns:a="http://schemas.openxmlformats.org/drawingml/2006/main" xmlns:r="http://schemas.openxmlformats.org/officeDocument/2006/relationships" xmlns:p="http://schemas.openxmlformats.org/presentationml/2006/main">
-  <p:cSld>
-    <p:spTree>
-      <p:nvGrpSpPr>
-        <p:cNvPr id="1" name=""/>
-        <p:cNvGrpSpPr/>
-        <p:nvPr/>
-      </p:nvGrpSpPr>
-      <p:grpSpPr>
-        <a:xfrm>
-          <a:off x="0" y="0"/>
-          <a:ext cx="0" cy="0"/>
-          <a:chOff x="0" y="0"/>
-          <a:chExt cx="0" cy="0"/>
-        </a:xfrm>
-      </p:grpSpPr>
-      <p:sp>
-        <p:nvSpPr>
-          <p:cNvPr id="2" name="Title 1"/>
-          <p:cNvSpPr>
-            <a:spLocks noGrp="1"/>
-          </p:cNvSpPr>
-          <p:nvPr>
-            <p:ph type="title"/>
-          </p:nvPr>
-        </p:nvSpPr>
-        <p:spPr/>
-        <p:txBody>
-          <a:bodyPr/>
-          <a:lstStyle/>
-          <a:p>
-            <a:r>
-              <a:rPr lang="en-US" dirty="0" smtClean="0"/>
-              <a:t>Problem 1</a:t>
-            </a:r>
-            <a:endParaRPr lang="en-US" dirty="0"/>
-          </a:p>
-        </p:txBody>
-      </p:sp>
-      <p:sp>
-        <p:nvSpPr>
-          <p:cNvPr id="3" name="Content Placeholder 2"/>
-          <p:cNvSpPr>
-            <a:spLocks noGrp="1"/>
-          </p:cNvSpPr>
-          <p:nvPr>
-            <p:ph idx="1"/>
-          </p:nvPr>
-        </p:nvSpPr>
-        <p:spPr/>
-        <p:txBody>
-          <a:bodyPr/>
-          <a:lstStyle/>
-          <a:p>
-            <a:r>
-              <a:rPr lang="en-US" sz="2400" dirty="0" smtClean="0"/>
-              <a:t>Configure the new Maven repository and add the </a:t>
-            </a:r>
-            <a:r>
-              <a:rPr lang="en-US" sz="2400" dirty="0" err="1" smtClean="0"/>
-              <a:t>BioJava</a:t>
-            </a:r>
-            <a:r>
-              <a:rPr lang="en-US" sz="2400" dirty="0" smtClean="0"/>
-              <a:t> dependency</a:t>
-            </a:r>
-          </a:p>
-          <a:p>
-            <a:pPr lvl="1"/>
-            <a:endParaRPr lang="en-US" sz="2000" dirty="0" smtClean="0"/>
-          </a:p>
-          <a:p>
-            <a:pPr lvl="1"/>
-            <a:r>
-              <a:rPr lang="en-US" sz="2000" b="1" dirty="0" smtClean="0"/>
-              <a:t>Task 1</a:t>
-            </a:r>
-            <a:r>
-              <a:rPr lang="en-US" sz="2000" dirty="0" smtClean="0"/>
-              <a:t>: fill in the URL field (replace the default URL)</a:t>
-            </a:r>
-          </a:p>
-          <a:p>
-            <a:pPr lvl="1"/>
-            <a:r>
-              <a:rPr lang="en-US" sz="2000" b="1" dirty="0" smtClean="0"/>
-              <a:t>Task 2</a:t>
-            </a:r>
-            <a:r>
-              <a:rPr lang="en-US" sz="2000" dirty="0" smtClean="0"/>
-              <a:t>: configure the Java 8 JDK. Insert these properties in the POM:</a:t>
-            </a:r>
-          </a:p>
-          <a:p>
-            <a:pPr lvl="1"/>
-            <a:endParaRPr lang="en-US" sz="2000" dirty="0"/>
-          </a:p>
-          <a:p>
-            <a:pPr lvl="1"/>
-            <a:endParaRPr lang="en-US" sz="2000" dirty="0" smtClean="0"/>
-          </a:p>
-          <a:p>
-            <a:pPr lvl="1"/>
-            <a:endParaRPr lang="en-US" sz="2000" dirty="0"/>
-          </a:p>
-          <a:p>
-            <a:pPr lvl="1"/>
-            <a:endParaRPr lang="en-US" sz="2000" dirty="0" smtClean="0"/>
-          </a:p>
-          <a:p>
-            <a:pPr lvl="1"/>
-            <a:r>
-              <a:rPr lang="en-US" sz="2000" b="1" dirty="0" smtClean="0"/>
-              <a:t>Task 3</a:t>
-            </a:r>
-            <a:r>
-              <a:rPr lang="en-US" sz="2000" dirty="0" smtClean="0"/>
-              <a:t>: insert the </a:t>
-            </a:r>
-            <a:r>
-              <a:rPr lang="en-US" sz="2000" i="1" dirty="0" err="1" smtClean="0"/>
-              <a:t>biojava-stucture</a:t>
-            </a:r>
-            <a:r>
-              <a:rPr lang="en-US" sz="2000" i="1" dirty="0" smtClean="0"/>
-              <a:t> </a:t>
-            </a:r>
-            <a:r>
-              <a:rPr lang="en-US" sz="2000" dirty="0" smtClean="0"/>
-              <a:t>dependency </a:t>
-            </a:r>
-            <a:r>
-              <a:rPr lang="en-US" sz="2000" dirty="0"/>
-              <a:t>(hint: </a:t>
-            </a:r>
-            <a:r>
-              <a:rPr lang="en-US" sz="2000" dirty="0">
-                <a:hlinkClick r:id="rId2"/>
-              </a:rPr>
-              <a:t>https://</a:t>
-            </a:r>
-            <a:r>
-              <a:rPr lang="en-US" sz="2000" dirty="0" smtClean="0">
-                <a:hlinkClick r:id="rId2"/>
-              </a:rPr>
-              <a:t>github.com/biojava/biojava-tutorial/blob/master/installation.md)</a:t>
-            </a:r>
-            <a:endParaRPr lang="en-US" sz="2000" dirty="0" smtClean="0"/>
-          </a:p>
-          <a:p>
-            <a:pPr lvl="2"/>
-            <a:endParaRPr lang="en-US" sz="1600" dirty="0" smtClean="0"/>
-          </a:p>
-          <a:p>
-            <a:pPr lvl="1"/>
-            <a:r>
-              <a:rPr lang="en-US" sz="2000" b="1" dirty="0" smtClean="0"/>
-              <a:t>Task 4:</a:t>
-            </a:r>
-            <a:r>
-              <a:rPr lang="en-US" sz="2000" dirty="0" smtClean="0"/>
-              <a:t> ensure </a:t>
-            </a:r>
-            <a:r>
-              <a:rPr lang="en-US" sz="2000" dirty="0" err="1" smtClean="0"/>
-              <a:t>BioJava</a:t>
-            </a:r>
-            <a:r>
-              <a:rPr lang="en-US" sz="2000" dirty="0" smtClean="0"/>
-              <a:t> version is the latest (5.0.0-alpha8)</a:t>
-            </a:r>
-            <a:endParaRPr lang="en-US" sz="2000" b="1" dirty="0" smtClean="0"/>
-          </a:p>
-        </p:txBody>
-      </p:sp>
-      <p:sp>
-        <p:nvSpPr>
-          <p:cNvPr id="4" name="TextBox 3"/>
-          <p:cNvSpPr txBox="1"/>
-          <p:nvPr/>
-        </p:nvSpPr>
-        <p:spPr>
-          <a:xfrm>
-            <a:off x="952500" y="3302000"/>
-            <a:ext cx="5936497" cy="1077218"/>
-          </a:xfrm>
-          <a:prstGeom prst="rect">
-            <a:avLst/>
-          </a:prstGeom>
-          <a:noFill/>
-        </p:spPr>
-        <p:txBody>
-          <a:bodyPr wrap="none" rtlCol="0">
-            <a:spAutoFit/>
-          </a:bodyPr>
-          <a:lstStyle/>
-          <a:p>
-            <a:r>
-              <a:rPr lang="en-US" dirty="0">
-                <a:solidFill>
-                  <a:schemeClr val="accent1">
-                    <a:lumMod val="50000"/>
-                  </a:schemeClr>
-                </a:solidFill>
-              </a:rPr>
-              <a:t>&lt;</a:t>
-            </a:r>
-            <a:r>
-              <a:rPr lang="en-US" dirty="0" err="1">
-                <a:solidFill>
-                  <a:schemeClr val="accent1">
-                    <a:lumMod val="50000"/>
-                  </a:schemeClr>
-                </a:solidFill>
-              </a:rPr>
-              <a:t>jdk.version</a:t>
-            </a:r>
-            <a:r>
-              <a:rPr lang="en-US" dirty="0">
-                <a:solidFill>
-                  <a:schemeClr val="accent1">
-                    <a:lumMod val="50000"/>
-                  </a:schemeClr>
-                </a:solidFill>
-              </a:rPr>
-              <a:t>&gt;1.8&lt;/</a:t>
-            </a:r>
-            <a:r>
-              <a:rPr lang="en-US" dirty="0" err="1">
-                <a:solidFill>
-                  <a:schemeClr val="accent1">
-                    <a:lumMod val="50000"/>
-                  </a:schemeClr>
-                </a:solidFill>
-              </a:rPr>
-              <a:t>jdk.version</a:t>
-            </a:r>
-            <a:r>
-              <a:rPr lang="en-US" dirty="0">
-                <a:solidFill>
-                  <a:schemeClr val="accent1">
-                    <a:lumMod val="50000"/>
-                  </a:schemeClr>
-                </a:solidFill>
-              </a:rPr>
-              <a:t>&gt;</a:t>
-            </a:r>
-          </a:p>
-          <a:p>
-            <a:r>
-              <a:rPr lang="en-US" dirty="0">
-                <a:solidFill>
-                  <a:schemeClr val="accent1">
-                    <a:lumMod val="50000"/>
-                  </a:schemeClr>
-                </a:solidFill>
-              </a:rPr>
-              <a:t>&lt;</a:t>
-            </a:r>
-            <a:r>
-              <a:rPr lang="en-US" dirty="0" err="1">
-                <a:solidFill>
-                  <a:schemeClr val="accent1">
-                    <a:lumMod val="50000"/>
-                  </a:schemeClr>
-                </a:solidFill>
-              </a:rPr>
-              <a:t>maven.enforcer.jdk</a:t>
-            </a:r>
-            <a:r>
-              <a:rPr lang="en-US" dirty="0">
-                <a:solidFill>
-                  <a:schemeClr val="accent1">
-                    <a:lumMod val="50000"/>
-                  </a:schemeClr>
-                </a:solidFill>
-              </a:rPr>
-              <a:t>-version&gt;1.8&lt;/</a:t>
-            </a:r>
-            <a:r>
-              <a:rPr lang="en-US" dirty="0" err="1">
-                <a:solidFill>
-                  <a:schemeClr val="accent1">
-                    <a:lumMod val="50000"/>
-                  </a:schemeClr>
-                </a:solidFill>
-              </a:rPr>
-              <a:t>maven.enforcer.jdk</a:t>
-            </a:r>
-            <a:r>
-              <a:rPr lang="en-US" dirty="0">
-                <a:solidFill>
-                  <a:schemeClr val="accent1">
-                    <a:lumMod val="50000"/>
-                  </a:schemeClr>
-                </a:solidFill>
-              </a:rPr>
-              <a:t>-version&gt;</a:t>
-            </a:r>
-          </a:p>
-          <a:p>
-            <a:r>
-              <a:rPr lang="en-US" dirty="0">
-                <a:solidFill>
-                  <a:schemeClr val="accent1">
-                    <a:lumMod val="50000"/>
-                  </a:schemeClr>
-                </a:solidFill>
-              </a:rPr>
-              <a:t>&lt;</a:t>
-            </a:r>
-            <a:r>
-              <a:rPr lang="en-US" dirty="0" err="1">
-                <a:solidFill>
-                  <a:schemeClr val="accent1">
-                    <a:lumMod val="50000"/>
-                  </a:schemeClr>
-                </a:solidFill>
-              </a:rPr>
-              <a:t>maven.compiler.source</a:t>
-            </a:r>
-            <a:r>
-              <a:rPr lang="en-US" dirty="0">
-                <a:solidFill>
-                  <a:schemeClr val="accent1">
-                    <a:lumMod val="50000"/>
-                  </a:schemeClr>
-                </a:solidFill>
-              </a:rPr>
-              <a:t>&gt;1.8&lt;/</a:t>
-            </a:r>
-            <a:r>
-              <a:rPr lang="en-US" dirty="0" err="1">
-                <a:solidFill>
-                  <a:schemeClr val="accent1">
-                    <a:lumMod val="50000"/>
-                  </a:schemeClr>
-                </a:solidFill>
-              </a:rPr>
-              <a:t>maven.compiler.source</a:t>
-            </a:r>
-            <a:r>
-              <a:rPr lang="en-US" dirty="0">
-                <a:solidFill>
-                  <a:schemeClr val="accent1">
-                    <a:lumMod val="50000"/>
-                  </a:schemeClr>
-                </a:solidFill>
-              </a:rPr>
-              <a:t>&gt;</a:t>
-            </a:r>
-          </a:p>
-          <a:p>
-            <a:r>
-              <a:rPr lang="en-US" dirty="0">
-                <a:solidFill>
-                  <a:schemeClr val="accent1">
-                    <a:lumMod val="50000"/>
-                  </a:schemeClr>
-                </a:solidFill>
-              </a:rPr>
-              <a:t>&lt;</a:t>
-            </a:r>
-            <a:r>
-              <a:rPr lang="en-US" dirty="0" err="1">
-                <a:solidFill>
-                  <a:schemeClr val="accent1">
-                    <a:lumMod val="50000"/>
-                  </a:schemeClr>
-                </a:solidFill>
-              </a:rPr>
-              <a:t>maven.compiler.target</a:t>
-            </a:r>
-            <a:r>
-              <a:rPr lang="en-US" dirty="0">
-                <a:solidFill>
-                  <a:schemeClr val="accent1">
-                    <a:lumMod val="50000"/>
-                  </a:schemeClr>
-                </a:solidFill>
-              </a:rPr>
-              <a:t>&gt;1.8&lt;/</a:t>
-            </a:r>
-            <a:r>
-              <a:rPr lang="en-US" dirty="0" err="1">
-                <a:solidFill>
-                  <a:schemeClr val="accent1">
-                    <a:lumMod val="50000"/>
-                  </a:schemeClr>
-                </a:solidFill>
-              </a:rPr>
-              <a:t>maven.compiler.target</a:t>
-            </a:r>
-            <a:r>
-              <a:rPr lang="en-US" dirty="0" smtClean="0">
-                <a:solidFill>
-                  <a:schemeClr val="accent1">
-                    <a:lumMod val="50000"/>
-                  </a:schemeClr>
-                </a:solidFill>
-              </a:rPr>
-              <a:t>&gt;</a:t>
-            </a:r>
-            <a:endParaRPr lang="en-US" dirty="0">
-              <a:solidFill>
-                <a:schemeClr val="accent1">
-                  <a:lumMod val="50000"/>
-                </a:schemeClr>
-              </a:solidFill>
-            </a:endParaRPr>
-          </a:p>
-        </p:txBody>
-      </p:sp>
-    </p:spTree>
-    <p:extLst>
-      <p:ext uri="{BB962C8B-B14F-4D97-AF65-F5344CB8AC3E}">
-        <p14:creationId xmlns:p14="http://schemas.microsoft.com/office/powerpoint/2010/main" val="2029486214"/>
-      </p:ext>
-    </p:extLst>
-  </p:cSld>
-  <p:clrMapOvr>
-    <a:masterClrMapping/>
-  </p:clrMapOvr>
-  <p:transition/>
-  <p:timing>
-    <p:tnLst>
-      <p:par>
-        <p:cTn id="1" dur="indefinite" restart="never" nodeType="tmRoot"/>
-      </p:par>
-    </p:tnLst>
-  </p:timing>
-</p:sld>
-</file>
-
 <file path=ppt/slides/slide12.xml><?xml version="1.0" encoding="utf-8"?>
 <p:sld xmlns:a="http://schemas.openxmlformats.org/drawingml/2006/main" xmlns:r="http://schemas.openxmlformats.org/officeDocument/2006/relationships" xmlns:p="http://schemas.openxmlformats.org/presentationml/2006/main">
   <p:cSld>
@@ -11047,7 +10763,446 @@
           <a:p>
             <a:r>
               <a:rPr lang="en-US" dirty="0" smtClean="0"/>
-              <a:t>Demo 2</a:t>
+              <a:t>Problem 1</a:t>
+            </a:r>
+            <a:endParaRPr lang="en-US" dirty="0"/>
+          </a:p>
+        </p:txBody>
+      </p:sp>
+      <p:sp>
+        <p:nvSpPr>
+          <p:cNvPr id="3" name="Content Placeholder 2"/>
+          <p:cNvSpPr>
+            <a:spLocks noGrp="1"/>
+          </p:cNvSpPr>
+          <p:nvPr>
+            <p:ph idx="1"/>
+          </p:nvPr>
+        </p:nvSpPr>
+        <p:spPr/>
+        <p:txBody>
+          <a:bodyPr/>
+          <a:lstStyle/>
+          <a:p>
+            <a:r>
+              <a:rPr lang="en-US" sz="2400" dirty="0" smtClean="0"/>
+              <a:t>Configure the new Maven repository and add the </a:t>
+            </a:r>
+            <a:r>
+              <a:rPr lang="en-US" sz="2400" dirty="0" err="1" smtClean="0"/>
+              <a:t>BioJava</a:t>
+            </a:r>
+            <a:r>
+              <a:rPr lang="en-US" sz="2400" dirty="0" smtClean="0"/>
+              <a:t> dependency</a:t>
+            </a:r>
+          </a:p>
+          <a:p>
+            <a:pPr lvl="1"/>
+            <a:endParaRPr lang="en-US" sz="2000" dirty="0" smtClean="0"/>
+          </a:p>
+          <a:p>
+            <a:pPr lvl="1"/>
+            <a:r>
+              <a:rPr lang="en-US" sz="2000" b="1" dirty="0" smtClean="0"/>
+              <a:t>Task 1</a:t>
+            </a:r>
+            <a:r>
+              <a:rPr lang="en-US" sz="2000" dirty="0" smtClean="0"/>
+              <a:t>: fill in the URL field (replace the default URL)</a:t>
+            </a:r>
+          </a:p>
+          <a:p>
+            <a:pPr lvl="1"/>
+            <a:r>
+              <a:rPr lang="en-US" sz="2000" b="1" dirty="0" smtClean="0"/>
+              <a:t>Task 2</a:t>
+            </a:r>
+            <a:r>
+              <a:rPr lang="en-US" sz="2000" dirty="0" smtClean="0"/>
+              <a:t>: configure the Java 8 JDK. Insert these properties in the POM:</a:t>
+            </a:r>
+          </a:p>
+          <a:p>
+            <a:pPr lvl="1"/>
+            <a:endParaRPr lang="en-US" sz="2000" dirty="0"/>
+          </a:p>
+          <a:p>
+            <a:pPr lvl="1"/>
+            <a:endParaRPr lang="en-US" sz="2000" dirty="0" smtClean="0"/>
+          </a:p>
+          <a:p>
+            <a:pPr lvl="1"/>
+            <a:endParaRPr lang="en-US" sz="2000" dirty="0"/>
+          </a:p>
+          <a:p>
+            <a:pPr lvl="1"/>
+            <a:endParaRPr lang="en-US" sz="2000" dirty="0" smtClean="0"/>
+          </a:p>
+          <a:p>
+            <a:pPr lvl="1"/>
+            <a:r>
+              <a:rPr lang="en-US" sz="2000" b="1" dirty="0" smtClean="0"/>
+              <a:t>Task 3</a:t>
+            </a:r>
+            <a:r>
+              <a:rPr lang="en-US" sz="2000" dirty="0" smtClean="0"/>
+              <a:t>: insert the </a:t>
+            </a:r>
+            <a:r>
+              <a:rPr lang="en-US" sz="2000" i="1" dirty="0" err="1" smtClean="0"/>
+              <a:t>biojava-stucture-gui</a:t>
+            </a:r>
+            <a:r>
+              <a:rPr lang="en-US" sz="2000" i="1" dirty="0" smtClean="0"/>
+              <a:t> </a:t>
+            </a:r>
+            <a:r>
+              <a:rPr lang="en-US" sz="2000" dirty="0" smtClean="0"/>
+              <a:t>dependency </a:t>
+            </a:r>
+            <a:r>
+              <a:rPr lang="en-US" sz="2000" dirty="0"/>
+              <a:t>(hint: </a:t>
+            </a:r>
+            <a:r>
+              <a:rPr lang="en-US" sz="2000" dirty="0">
+                <a:hlinkClick r:id="rId2"/>
+              </a:rPr>
+              <a:t>https://</a:t>
+            </a:r>
+            <a:r>
+              <a:rPr lang="en-US" sz="2000" dirty="0" smtClean="0">
+                <a:hlinkClick r:id="rId2"/>
+              </a:rPr>
+              <a:t>github.com/biojava/biojava-tutorial/blob/master/installation.md)</a:t>
+            </a:r>
+            <a:endParaRPr lang="en-US" sz="2000" dirty="0" smtClean="0"/>
+          </a:p>
+          <a:p>
+            <a:pPr lvl="2"/>
+            <a:endParaRPr lang="en-US" sz="1600" dirty="0" smtClean="0"/>
+          </a:p>
+          <a:p>
+            <a:pPr lvl="1"/>
+            <a:r>
+              <a:rPr lang="en-US" sz="2000" b="1" dirty="0" smtClean="0"/>
+              <a:t>Task 4:</a:t>
+            </a:r>
+            <a:r>
+              <a:rPr lang="en-US" sz="2000" dirty="0" smtClean="0"/>
+              <a:t> ensure </a:t>
+            </a:r>
+            <a:r>
+              <a:rPr lang="en-US" sz="2000" dirty="0" err="1" smtClean="0"/>
+              <a:t>BioJava</a:t>
+            </a:r>
+            <a:r>
+              <a:rPr lang="en-US" sz="2000" dirty="0" smtClean="0"/>
+              <a:t> version is the latest (5.0.0-alpha8)</a:t>
+            </a:r>
+            <a:endParaRPr lang="en-US" sz="2000" b="1" dirty="0" smtClean="0"/>
+          </a:p>
+        </p:txBody>
+      </p:sp>
+      <p:sp>
+        <p:nvSpPr>
+          <p:cNvPr id="4" name="TextBox 3"/>
+          <p:cNvSpPr txBox="1"/>
+          <p:nvPr/>
+        </p:nvSpPr>
+        <p:spPr>
+          <a:xfrm>
+            <a:off x="952500" y="3302000"/>
+            <a:ext cx="5936497" cy="1077218"/>
+          </a:xfrm>
+          <a:prstGeom prst="rect">
+            <a:avLst/>
+          </a:prstGeom>
+          <a:noFill/>
+        </p:spPr>
+        <p:txBody>
+          <a:bodyPr wrap="none" rtlCol="0">
+            <a:spAutoFit/>
+          </a:bodyPr>
+          <a:lstStyle/>
+          <a:p>
+            <a:r>
+              <a:rPr lang="en-US" dirty="0">
+                <a:solidFill>
+                  <a:schemeClr val="accent1">
+                    <a:lumMod val="50000"/>
+                  </a:schemeClr>
+                </a:solidFill>
+              </a:rPr>
+              <a:t>&lt;</a:t>
+            </a:r>
+            <a:r>
+              <a:rPr lang="en-US" dirty="0" err="1">
+                <a:solidFill>
+                  <a:schemeClr val="accent1">
+                    <a:lumMod val="50000"/>
+                  </a:schemeClr>
+                </a:solidFill>
+              </a:rPr>
+              <a:t>jdk.version</a:t>
+            </a:r>
+            <a:r>
+              <a:rPr lang="en-US" dirty="0">
+                <a:solidFill>
+                  <a:schemeClr val="accent1">
+                    <a:lumMod val="50000"/>
+                  </a:schemeClr>
+                </a:solidFill>
+              </a:rPr>
+              <a:t>&gt;1.8&lt;/</a:t>
+            </a:r>
+            <a:r>
+              <a:rPr lang="en-US" dirty="0" err="1">
+                <a:solidFill>
+                  <a:schemeClr val="accent1">
+                    <a:lumMod val="50000"/>
+                  </a:schemeClr>
+                </a:solidFill>
+              </a:rPr>
+              <a:t>jdk.version</a:t>
+            </a:r>
+            <a:r>
+              <a:rPr lang="en-US" dirty="0">
+                <a:solidFill>
+                  <a:schemeClr val="accent1">
+                    <a:lumMod val="50000"/>
+                  </a:schemeClr>
+                </a:solidFill>
+              </a:rPr>
+              <a:t>&gt;</a:t>
+            </a:r>
+          </a:p>
+          <a:p>
+            <a:r>
+              <a:rPr lang="en-US" dirty="0">
+                <a:solidFill>
+                  <a:schemeClr val="accent1">
+                    <a:lumMod val="50000"/>
+                  </a:schemeClr>
+                </a:solidFill>
+              </a:rPr>
+              <a:t>&lt;</a:t>
+            </a:r>
+            <a:r>
+              <a:rPr lang="en-US" dirty="0" err="1">
+                <a:solidFill>
+                  <a:schemeClr val="accent1">
+                    <a:lumMod val="50000"/>
+                  </a:schemeClr>
+                </a:solidFill>
+              </a:rPr>
+              <a:t>maven.enforcer.jdk</a:t>
+            </a:r>
+            <a:r>
+              <a:rPr lang="en-US" dirty="0">
+                <a:solidFill>
+                  <a:schemeClr val="accent1">
+                    <a:lumMod val="50000"/>
+                  </a:schemeClr>
+                </a:solidFill>
+              </a:rPr>
+              <a:t>-version&gt;1.8&lt;/</a:t>
+            </a:r>
+            <a:r>
+              <a:rPr lang="en-US" dirty="0" err="1">
+                <a:solidFill>
+                  <a:schemeClr val="accent1">
+                    <a:lumMod val="50000"/>
+                  </a:schemeClr>
+                </a:solidFill>
+              </a:rPr>
+              <a:t>maven.enforcer.jdk</a:t>
+            </a:r>
+            <a:r>
+              <a:rPr lang="en-US" dirty="0">
+                <a:solidFill>
+                  <a:schemeClr val="accent1">
+                    <a:lumMod val="50000"/>
+                  </a:schemeClr>
+                </a:solidFill>
+              </a:rPr>
+              <a:t>-version&gt;</a:t>
+            </a:r>
+          </a:p>
+          <a:p>
+            <a:r>
+              <a:rPr lang="en-US" dirty="0">
+                <a:solidFill>
+                  <a:schemeClr val="accent1">
+                    <a:lumMod val="50000"/>
+                  </a:schemeClr>
+                </a:solidFill>
+              </a:rPr>
+              <a:t>&lt;</a:t>
+            </a:r>
+            <a:r>
+              <a:rPr lang="en-US" dirty="0" err="1">
+                <a:solidFill>
+                  <a:schemeClr val="accent1">
+                    <a:lumMod val="50000"/>
+                  </a:schemeClr>
+                </a:solidFill>
+              </a:rPr>
+              <a:t>maven.compiler.source</a:t>
+            </a:r>
+            <a:r>
+              <a:rPr lang="en-US" dirty="0">
+                <a:solidFill>
+                  <a:schemeClr val="accent1">
+                    <a:lumMod val="50000"/>
+                  </a:schemeClr>
+                </a:solidFill>
+              </a:rPr>
+              <a:t>&gt;1.8&lt;/</a:t>
+            </a:r>
+            <a:r>
+              <a:rPr lang="en-US" dirty="0" err="1">
+                <a:solidFill>
+                  <a:schemeClr val="accent1">
+                    <a:lumMod val="50000"/>
+                  </a:schemeClr>
+                </a:solidFill>
+              </a:rPr>
+              <a:t>maven.compiler.source</a:t>
+            </a:r>
+            <a:r>
+              <a:rPr lang="en-US" dirty="0">
+                <a:solidFill>
+                  <a:schemeClr val="accent1">
+                    <a:lumMod val="50000"/>
+                  </a:schemeClr>
+                </a:solidFill>
+              </a:rPr>
+              <a:t>&gt;</a:t>
+            </a:r>
+          </a:p>
+          <a:p>
+            <a:r>
+              <a:rPr lang="en-US" dirty="0">
+                <a:solidFill>
+                  <a:schemeClr val="accent1">
+                    <a:lumMod val="50000"/>
+                  </a:schemeClr>
+                </a:solidFill>
+              </a:rPr>
+              <a:t>&lt;</a:t>
+            </a:r>
+            <a:r>
+              <a:rPr lang="en-US" dirty="0" err="1">
+                <a:solidFill>
+                  <a:schemeClr val="accent1">
+                    <a:lumMod val="50000"/>
+                  </a:schemeClr>
+                </a:solidFill>
+              </a:rPr>
+              <a:t>maven.compiler.target</a:t>
+            </a:r>
+            <a:r>
+              <a:rPr lang="en-US" dirty="0">
+                <a:solidFill>
+                  <a:schemeClr val="accent1">
+                    <a:lumMod val="50000"/>
+                  </a:schemeClr>
+                </a:solidFill>
+              </a:rPr>
+              <a:t>&gt;1.8&lt;/</a:t>
+            </a:r>
+            <a:r>
+              <a:rPr lang="en-US" dirty="0" err="1">
+                <a:solidFill>
+                  <a:schemeClr val="accent1">
+                    <a:lumMod val="50000"/>
+                  </a:schemeClr>
+                </a:solidFill>
+              </a:rPr>
+              <a:t>maven.compiler.target</a:t>
+            </a:r>
+            <a:r>
+              <a:rPr lang="en-US" dirty="0" smtClean="0">
+                <a:solidFill>
+                  <a:schemeClr val="accent1">
+                    <a:lumMod val="50000"/>
+                  </a:schemeClr>
+                </a:solidFill>
+              </a:rPr>
+              <a:t>&gt;</a:t>
+            </a:r>
+            <a:endParaRPr lang="en-US" dirty="0">
+              <a:solidFill>
+                <a:schemeClr val="accent1">
+                  <a:lumMod val="50000"/>
+                </a:schemeClr>
+              </a:solidFill>
+            </a:endParaRPr>
+          </a:p>
+        </p:txBody>
+      </p:sp>
+    </p:spTree>
+    <p:extLst>
+      <p:ext uri="{BB962C8B-B14F-4D97-AF65-F5344CB8AC3E}">
+        <p14:creationId xmlns:p14="http://schemas.microsoft.com/office/powerpoint/2010/main" val="2029486214"/>
+      </p:ext>
+    </p:extLst>
+  </p:cSld>
+  <p:clrMapOvr>
+    <a:masterClrMapping/>
+  </p:clrMapOvr>
+  <p:transition/>
+  <p:timing>
+    <p:tnLst>
+      <p:par>
+        <p:cTn id="1" dur="indefinite" restart="never" nodeType="tmRoot"/>
+      </p:par>
+    </p:tnLst>
+  </p:timing>
+</p:sld>
+</file>
+
+<file path=ppt/slides/slide13.xml><?xml version="1.0" encoding="utf-8"?>
+<p:sld xmlns:a="http://schemas.openxmlformats.org/drawingml/2006/main" xmlns:r="http://schemas.openxmlformats.org/officeDocument/2006/relationships" xmlns:p="http://schemas.openxmlformats.org/presentationml/2006/main">
+  <p:cSld>
+    <p:spTree>
+      <p:nvGrpSpPr>
+        <p:cNvPr id="1" name=""/>
+        <p:cNvGrpSpPr/>
+        <p:nvPr/>
+      </p:nvGrpSpPr>
+      <p:grpSpPr>
+        <a:xfrm>
+          <a:off x="0" y="0"/>
+          <a:ext cx="0" cy="0"/>
+          <a:chOff x="0" y="0"/>
+          <a:chExt cx="0" cy="0"/>
+        </a:xfrm>
+      </p:grpSpPr>
+      <p:sp>
+        <p:nvSpPr>
+          <p:cNvPr id="2" name="Title 1"/>
+          <p:cNvSpPr>
+            <a:spLocks noGrp="1"/>
+          </p:cNvSpPr>
+          <p:nvPr>
+            <p:ph type="title"/>
+          </p:nvPr>
+        </p:nvSpPr>
+        <p:spPr/>
+        <p:txBody>
+          <a:bodyPr/>
+          <a:lstStyle/>
+          <a:p>
+            <a:r>
+              <a:rPr lang="en-US" dirty="0" smtClean="0"/>
+              <a:t>Demo </a:t>
+            </a:r>
+            <a:r>
+              <a:rPr lang="en-US" dirty="0" smtClean="0"/>
+              <a:t>1</a:t>
             </a:r>
             <a:endParaRPr lang="en-US" dirty="0"/>
           </a:p>
@@ -11166,7 +11321,7 @@
 </p:sld>
 </file>
 
-<file path=ppt/slides/slide13.xml><?xml version="1.0" encoding="utf-8"?>
+<file path=ppt/slides/slide14.xml><?xml version="1.0" encoding="utf-8"?>
 <p:sld xmlns:a="http://schemas.openxmlformats.org/drawingml/2006/main" xmlns:r="http://schemas.openxmlformats.org/officeDocument/2006/relationships" xmlns:p="http://schemas.openxmlformats.org/presentationml/2006/main">
   <p:cSld>
     <p:spTree>
@@ -11200,7 +11355,11 @@
           <a:p>
             <a:r>
               <a:rPr lang="en-US" dirty="0" smtClean="0"/>
-              <a:t>Demo 2</a:t>
+              <a:t>Demo </a:t>
+            </a:r>
+            <a:r>
+              <a:rPr lang="en-US" dirty="0" smtClean="0"/>
+              <a:t>1</a:t>
             </a:r>
             <a:endParaRPr lang="en-US" dirty="0"/>
           </a:p>
@@ -11335,7 +11494,7 @@
 </p:sld>
 </file>
 
-<file path=ppt/slides/slide14.xml><?xml version="1.0" encoding="utf-8"?>
+<file path=ppt/slides/slide15.xml><?xml version="1.0" encoding="utf-8"?>
 <p:sld xmlns:a="http://schemas.openxmlformats.org/drawingml/2006/main" xmlns:r="http://schemas.openxmlformats.org/officeDocument/2006/relationships" xmlns:p="http://schemas.openxmlformats.org/presentationml/2006/main">
   <p:cSld>
     <p:spTree>
@@ -11453,7 +11612,7 @@
 </p:sld>
 </file>
 
-<file path=ppt/slides/slide15.xml><?xml version="1.0" encoding="utf-8"?>
+<file path=ppt/slides/slide16.xml><?xml version="1.0" encoding="utf-8"?>
 <p:sld xmlns:a="http://schemas.openxmlformats.org/drawingml/2006/main" xmlns:r="http://schemas.openxmlformats.org/officeDocument/2006/relationships" xmlns:p="http://schemas.openxmlformats.org/presentationml/2006/main">
   <p:cSld>
     <p:spTree>
@@ -12872,286 +13031,6 @@
 </p:sld>
 </file>
 
-<file path=ppt/slides/slide16.xml><?xml version="1.0" encoding="utf-8"?>
-<p:sld xmlns:a="http://schemas.openxmlformats.org/drawingml/2006/main" xmlns:r="http://schemas.openxmlformats.org/officeDocument/2006/relationships" xmlns:p="http://schemas.openxmlformats.org/presentationml/2006/main">
-  <p:cSld>
-    <p:spTree>
-      <p:nvGrpSpPr>
-        <p:cNvPr id="1" name=""/>
-        <p:cNvGrpSpPr/>
-        <p:nvPr/>
-      </p:nvGrpSpPr>
-      <p:grpSpPr>
-        <a:xfrm>
-          <a:off x="0" y="0"/>
-          <a:ext cx="0" cy="0"/>
-          <a:chOff x="0" y="0"/>
-          <a:chExt cx="0" cy="0"/>
-        </a:xfrm>
-      </p:grpSpPr>
-      <p:sp>
-        <p:nvSpPr>
-          <p:cNvPr id="2" name="Title 1"/>
-          <p:cNvSpPr>
-            <a:spLocks noGrp="1"/>
-          </p:cNvSpPr>
-          <p:nvPr>
-            <p:ph type="title"/>
-          </p:nvPr>
-        </p:nvSpPr>
-        <p:spPr/>
-        <p:txBody>
-          <a:bodyPr/>
-          <a:lstStyle/>
-          <a:p>
-            <a:r>
-              <a:rPr lang="en-US" dirty="0" smtClean="0"/>
-              <a:t>Group Types</a:t>
-            </a:r>
-            <a:endParaRPr lang="en-US" dirty="0"/>
-          </a:p>
-        </p:txBody>
-      </p:sp>
-      <p:sp>
-        <p:nvSpPr>
-          <p:cNvPr id="3" name="Content Placeholder 2"/>
-          <p:cNvSpPr>
-            <a:spLocks noGrp="1"/>
-          </p:cNvSpPr>
-          <p:nvPr>
-            <p:ph idx="1"/>
-          </p:nvPr>
-        </p:nvSpPr>
-        <p:spPr/>
-        <p:txBody>
-          <a:bodyPr/>
-          <a:lstStyle/>
-          <a:p>
-            <a:pPr fontAlgn="auto">
-              <a:lnSpc>
-                <a:spcPct val="100000"/>
-              </a:lnSpc>
-              <a:spcBef>
-                <a:spcPts val="0"/>
-              </a:spcBef>
-              <a:spcAft>
-                <a:spcPts val="0"/>
-              </a:spcAft>
-              <a:buClrTx/>
-              <a:buSzTx/>
-            </a:pPr>
-            <a:r>
-              <a:rPr lang="en-US" dirty="0" err="1" smtClean="0"/>
-              <a:t>BioJava</a:t>
-            </a:r>
-            <a:r>
-              <a:rPr lang="en-US" dirty="0" smtClean="0"/>
-              <a:t> </a:t>
-            </a:r>
-            <a:r>
-              <a:rPr lang="en-US" b="0" dirty="0" smtClean="0"/>
-              <a:t>uses the </a:t>
-            </a:r>
-            <a:r>
-              <a:rPr lang="en-US" sz="2400" dirty="0" smtClean="0"/>
-              <a:t>Chemical </a:t>
-            </a:r>
-            <a:r>
-              <a:rPr lang="en-US" sz="2400" dirty="0"/>
-              <a:t>C</a:t>
-            </a:r>
-            <a:r>
-              <a:rPr lang="en-US" sz="2400" dirty="0" smtClean="0"/>
-              <a:t>omponent Dictionary </a:t>
-            </a:r>
-            <a:r>
-              <a:rPr lang="en-US" b="0" dirty="0" smtClean="0"/>
-              <a:t>to assign group types</a:t>
-            </a:r>
-          </a:p>
-          <a:p>
-            <a:pPr lvl="1" fontAlgn="auto">
-              <a:lnSpc>
-                <a:spcPct val="100000"/>
-              </a:lnSpc>
-              <a:spcBef>
-                <a:spcPts val="0"/>
-              </a:spcBef>
-              <a:spcAft>
-                <a:spcPts val="0"/>
-              </a:spcAft>
-              <a:buClrTx/>
-              <a:buSzTx/>
-            </a:pPr>
-            <a:endParaRPr lang="en-US" dirty="0" smtClean="0"/>
-          </a:p>
-          <a:p>
-            <a:pPr lvl="1" fontAlgn="auto">
-              <a:lnSpc>
-                <a:spcPct val="100000"/>
-              </a:lnSpc>
-              <a:spcBef>
-                <a:spcPts val="0"/>
-              </a:spcBef>
-              <a:spcAft>
-                <a:spcPts val="0"/>
-              </a:spcAft>
-              <a:buClrTx/>
-              <a:buSzTx/>
-            </a:pPr>
-            <a:r>
-              <a:rPr lang="en-US" dirty="0" smtClean="0"/>
-              <a:t>Amino Acid (L-peptides)</a:t>
-            </a:r>
-          </a:p>
-          <a:p>
-            <a:pPr lvl="1" fontAlgn="auto">
-              <a:lnSpc>
-                <a:spcPct val="100000"/>
-              </a:lnSpc>
-              <a:spcBef>
-                <a:spcPts val="0"/>
-              </a:spcBef>
-              <a:spcAft>
-                <a:spcPts val="0"/>
-              </a:spcAft>
-              <a:buClrTx/>
-              <a:buSzTx/>
-            </a:pPr>
-            <a:r>
-              <a:rPr lang="en-US" b="0" dirty="0" smtClean="0"/>
-              <a:t>Nucleotide (DNA or RNA)</a:t>
-            </a:r>
-          </a:p>
-          <a:p>
-            <a:pPr lvl="1" fontAlgn="auto">
-              <a:lnSpc>
-                <a:spcPct val="100000"/>
-              </a:lnSpc>
-              <a:spcBef>
-                <a:spcPts val="0"/>
-              </a:spcBef>
-              <a:spcAft>
-                <a:spcPts val="0"/>
-              </a:spcAft>
-              <a:buClrTx/>
-              <a:buSzTx/>
-            </a:pPr>
-            <a:r>
-              <a:rPr lang="en-US" dirty="0" smtClean="0"/>
-              <a:t>Waters</a:t>
-            </a:r>
-          </a:p>
-          <a:p>
-            <a:pPr lvl="1" fontAlgn="auto">
-              <a:lnSpc>
-                <a:spcPct val="100000"/>
-              </a:lnSpc>
-              <a:spcBef>
-                <a:spcPts val="0"/>
-              </a:spcBef>
-              <a:spcAft>
-                <a:spcPts val="0"/>
-              </a:spcAft>
-              <a:buClrTx/>
-              <a:buSzTx/>
-            </a:pPr>
-            <a:r>
-              <a:rPr lang="en-US" dirty="0" err="1" smtClean="0"/>
-              <a:t>Hetatoms</a:t>
-            </a:r>
-            <a:endParaRPr lang="en-US" dirty="0" smtClean="0"/>
-          </a:p>
-          <a:p>
-            <a:pPr lvl="1" fontAlgn="auto">
-              <a:lnSpc>
-                <a:spcPct val="100000"/>
-              </a:lnSpc>
-              <a:spcBef>
-                <a:spcPts val="0"/>
-              </a:spcBef>
-              <a:spcAft>
-                <a:spcPts val="0"/>
-              </a:spcAft>
-              <a:buClrTx/>
-              <a:buSzTx/>
-            </a:pPr>
-            <a:endParaRPr lang="en-US" dirty="0"/>
-          </a:p>
-          <a:p>
-            <a:pPr marL="0" indent="0" algn="ctr" fontAlgn="auto">
-              <a:lnSpc>
-                <a:spcPct val="100000"/>
-              </a:lnSpc>
-              <a:spcBef>
-                <a:spcPts val="0"/>
-              </a:spcBef>
-              <a:spcAft>
-                <a:spcPts val="0"/>
-              </a:spcAft>
-              <a:buClrTx/>
-              <a:buSzTx/>
-              <a:buNone/>
-            </a:pPr>
-            <a:r>
-              <a:rPr lang="en-US" sz="1800" b="0" dirty="0" smtClean="0">
-                <a:hlinkClick r:id="rId2"/>
-              </a:rPr>
-              <a:t>https</a:t>
-            </a:r>
-            <a:r>
-              <a:rPr lang="en-US" sz="1800" b="0" dirty="0">
-                <a:hlinkClick r:id="rId2"/>
-              </a:rPr>
-              <a:t>://</a:t>
-            </a:r>
-            <a:r>
-              <a:rPr lang="en-US" sz="1800" b="0" dirty="0" smtClean="0">
-                <a:hlinkClick r:id="rId2"/>
-              </a:rPr>
-              <a:t>github.com/biojava/biojava-tutorial/blob/master/structure/chemcomp.md</a:t>
-            </a:r>
-            <a:endParaRPr lang="en-US" sz="1800" b="0" dirty="0" smtClean="0"/>
-          </a:p>
-          <a:p>
-            <a:pPr fontAlgn="auto">
-              <a:lnSpc>
-                <a:spcPct val="100000"/>
-              </a:lnSpc>
-              <a:spcBef>
-                <a:spcPts val="0"/>
-              </a:spcBef>
-              <a:spcAft>
-                <a:spcPts val="0"/>
-              </a:spcAft>
-              <a:buClrTx/>
-              <a:buSzTx/>
-            </a:pPr>
-            <a:endParaRPr lang="en-US" b="0" dirty="0" smtClean="0"/>
-          </a:p>
-        </p:txBody>
-      </p:sp>
-    </p:spTree>
-    <p:extLst>
-      <p:ext uri="{BB962C8B-B14F-4D97-AF65-F5344CB8AC3E}">
-        <p14:creationId xmlns:p14="http://schemas.microsoft.com/office/powerpoint/2010/main" val="2093356016"/>
-      </p:ext>
-    </p:extLst>
-  </p:cSld>
-  <p:clrMapOvr>
-    <a:masterClrMapping/>
-  </p:clrMapOvr>
-  <p:transition/>
-  <p:timing>
-    <p:tnLst>
-      <p:par>
-        <p:cTn id="1" dur="indefinite" restart="never" nodeType="tmRoot"/>
-      </p:par>
-    </p:tnLst>
-  </p:timing>
-</p:sld>
-</file>
-
 <file path=ppt/slides/slide17.xml><?xml version="1.0" encoding="utf-8"?>
 <p:sld xmlns:a="http://schemas.openxmlformats.org/drawingml/2006/main" xmlns:r="http://schemas.openxmlformats.org/officeDocument/2006/relationships" xmlns:p="http://schemas.openxmlformats.org/presentationml/2006/main">
   <p:cSld>
@@ -13186,7 +13065,7 @@
           <a:p>
             <a:r>
               <a:rPr lang="en-US" dirty="0" smtClean="0"/>
-              <a:t>Loading Structure Objects</a:t>
+              <a:t>Group Types</a:t>
             </a:r>
             <a:endParaRPr lang="en-US" dirty="0"/>
           </a:p>
@@ -13207,63 +13086,214 @@
           <a:bodyPr/>
           <a:lstStyle/>
           <a:p>
-            <a:endParaRPr lang="en-US" sz="3200" dirty="0" smtClean="0"/>
-          </a:p>
-          <a:p>
-            <a:r>
-              <a:rPr lang="en-US" sz="3200" dirty="0" err="1" smtClean="0"/>
-              <a:t>AtomCache</a:t>
-            </a:r>
-            <a:endParaRPr lang="en-US" sz="3200" b="0" dirty="0" smtClean="0"/>
-          </a:p>
-          <a:p>
-            <a:pPr lvl="1"/>
-            <a:r>
-              <a:rPr lang="en-US" sz="2800" dirty="0" smtClean="0"/>
-              <a:t>PDB ids (2HHB)</a:t>
-            </a:r>
-          </a:p>
-          <a:p>
-            <a:pPr lvl="1"/>
-            <a:r>
-              <a:rPr lang="en-US" sz="2800" dirty="0"/>
-              <a:t>Structural ranges (2HHB.A:1-20</a:t>
-            </a:r>
-            <a:r>
-              <a:rPr lang="en-US" sz="2800" dirty="0" smtClean="0"/>
-              <a:t>)</a:t>
-            </a:r>
-          </a:p>
-          <a:p>
-            <a:pPr lvl="1"/>
-            <a:r>
-              <a:rPr lang="en-US" sz="2800" dirty="0" smtClean="0"/>
-              <a:t>SCOP, CATH &amp; ECOD ids (d2hhba_)</a:t>
-            </a:r>
-          </a:p>
-          <a:p>
-            <a:pPr lvl="1"/>
-            <a:r>
-              <a:rPr lang="en-US" sz="2800" dirty="0" smtClean="0"/>
-              <a:t>Many configuration options</a:t>
-            </a:r>
-          </a:p>
-          <a:p>
-            <a:endParaRPr lang="en-US" sz="3200" dirty="0" smtClean="0"/>
-          </a:p>
-          <a:p>
-            <a:r>
-              <a:rPr lang="en-US" sz="3200" dirty="0" err="1" smtClean="0"/>
-              <a:t>StructureIO</a:t>
-            </a:r>
-            <a:endParaRPr lang="en-US" sz="3200" dirty="0"/>
+            <a:pPr fontAlgn="auto">
+              <a:lnSpc>
+                <a:spcPct val="100000"/>
+              </a:lnSpc>
+              <a:spcBef>
+                <a:spcPts val="0"/>
+              </a:spcBef>
+              <a:spcAft>
+                <a:spcPts val="0"/>
+              </a:spcAft>
+              <a:buClrTx/>
+              <a:buSzTx/>
+            </a:pPr>
+            <a:r>
+              <a:rPr lang="en-US" dirty="0" err="1" smtClean="0"/>
+              <a:t>BioJava</a:t>
+            </a:r>
+            <a:r>
+              <a:rPr lang="en-US" dirty="0" smtClean="0"/>
+              <a:t> </a:t>
+            </a:r>
+            <a:r>
+              <a:rPr lang="en-US" b="0" dirty="0" smtClean="0"/>
+              <a:t>uses the </a:t>
+            </a:r>
+            <a:r>
+              <a:rPr lang="en-US" sz="2400" dirty="0" smtClean="0"/>
+              <a:t>Chemical </a:t>
+            </a:r>
+            <a:r>
+              <a:rPr lang="en-US" sz="2400" dirty="0"/>
+              <a:t>C</a:t>
+            </a:r>
+            <a:r>
+              <a:rPr lang="en-US" sz="2400" dirty="0" smtClean="0"/>
+              <a:t>omponent Dictionary </a:t>
+            </a:r>
+            <a:r>
+              <a:rPr lang="en-US" b="0" dirty="0" smtClean="0"/>
+              <a:t>to assign group types</a:t>
+            </a:r>
+          </a:p>
+          <a:p>
+            <a:pPr lvl="1" fontAlgn="auto">
+              <a:lnSpc>
+                <a:spcPct val="100000"/>
+              </a:lnSpc>
+              <a:spcBef>
+                <a:spcPts val="0"/>
+              </a:spcBef>
+              <a:spcAft>
+                <a:spcPts val="0"/>
+              </a:spcAft>
+              <a:buClrTx/>
+              <a:buSzTx/>
+            </a:pPr>
+            <a:endParaRPr lang="en-US" dirty="0" smtClean="0"/>
+          </a:p>
+          <a:p>
+            <a:pPr lvl="1" fontAlgn="auto">
+              <a:lnSpc>
+                <a:spcPct val="100000"/>
+              </a:lnSpc>
+              <a:spcBef>
+                <a:spcPts val="0"/>
+              </a:spcBef>
+              <a:spcAft>
+                <a:spcPts val="0"/>
+              </a:spcAft>
+              <a:buClrTx/>
+              <a:buSzTx/>
+            </a:pPr>
+            <a:r>
+              <a:rPr lang="en-US" dirty="0" smtClean="0"/>
+              <a:t>Amino Acid (L-peptides)</a:t>
+            </a:r>
+          </a:p>
+          <a:p>
+            <a:pPr lvl="1" fontAlgn="auto">
+              <a:lnSpc>
+                <a:spcPct val="100000"/>
+              </a:lnSpc>
+              <a:spcBef>
+                <a:spcPts val="0"/>
+              </a:spcBef>
+              <a:spcAft>
+                <a:spcPts val="0"/>
+              </a:spcAft>
+              <a:buClrTx/>
+              <a:buSzTx/>
+            </a:pPr>
+            <a:r>
+              <a:rPr lang="en-US" b="0" dirty="0" smtClean="0"/>
+              <a:t>Nucleotide (DNA or RNA)</a:t>
+            </a:r>
+          </a:p>
+          <a:p>
+            <a:pPr lvl="1" fontAlgn="auto">
+              <a:lnSpc>
+                <a:spcPct val="100000"/>
+              </a:lnSpc>
+              <a:spcBef>
+                <a:spcPts val="0"/>
+              </a:spcBef>
+              <a:spcAft>
+                <a:spcPts val="0"/>
+              </a:spcAft>
+              <a:buClrTx/>
+              <a:buSzTx/>
+            </a:pPr>
+            <a:r>
+              <a:rPr lang="en-US" dirty="0" smtClean="0"/>
+              <a:t>Waters</a:t>
+            </a:r>
+          </a:p>
+          <a:p>
+            <a:pPr lvl="1" fontAlgn="auto">
+              <a:lnSpc>
+                <a:spcPct val="100000"/>
+              </a:lnSpc>
+              <a:spcBef>
+                <a:spcPts val="0"/>
+              </a:spcBef>
+              <a:spcAft>
+                <a:spcPts val="0"/>
+              </a:spcAft>
+              <a:buClrTx/>
+              <a:buSzTx/>
+            </a:pPr>
+            <a:r>
+              <a:rPr lang="en-US" dirty="0" err="1" smtClean="0"/>
+              <a:t>Hetatoms</a:t>
+            </a:r>
+            <a:endParaRPr lang="en-US" dirty="0" smtClean="0"/>
+          </a:p>
+          <a:p>
+            <a:pPr lvl="1" fontAlgn="auto">
+              <a:lnSpc>
+                <a:spcPct val="100000"/>
+              </a:lnSpc>
+              <a:spcBef>
+                <a:spcPts val="0"/>
+              </a:spcBef>
+              <a:spcAft>
+                <a:spcPts val="0"/>
+              </a:spcAft>
+              <a:buClrTx/>
+              <a:buSzTx/>
+            </a:pPr>
+            <a:endParaRPr lang="en-US" dirty="0"/>
+          </a:p>
+          <a:p>
+            <a:pPr marL="0" indent="0" algn="ctr" fontAlgn="auto">
+              <a:lnSpc>
+                <a:spcPct val="100000"/>
+              </a:lnSpc>
+              <a:spcBef>
+                <a:spcPts val="0"/>
+              </a:spcBef>
+              <a:spcAft>
+                <a:spcPts val="0"/>
+              </a:spcAft>
+              <a:buClrTx/>
+              <a:buSzTx/>
+              <a:buNone/>
+            </a:pPr>
+            <a:r>
+              <a:rPr lang="en-US" sz="1800" b="0" dirty="0" smtClean="0">
+                <a:hlinkClick r:id="rId2"/>
+              </a:rPr>
+              <a:t>https</a:t>
+            </a:r>
+            <a:r>
+              <a:rPr lang="en-US" sz="1800" b="0" dirty="0">
+                <a:hlinkClick r:id="rId2"/>
+              </a:rPr>
+              <a:t>://</a:t>
+            </a:r>
+            <a:r>
+              <a:rPr lang="en-US" sz="1800" b="0" dirty="0" smtClean="0">
+                <a:hlinkClick r:id="rId2"/>
+              </a:rPr>
+              <a:t>github.com/biojava/biojava-tutorial/blob/master/structure/chemcomp.md</a:t>
+            </a:r>
+            <a:endParaRPr lang="en-US" sz="1800" b="0" dirty="0" smtClean="0"/>
+          </a:p>
+          <a:p>
+            <a:pPr fontAlgn="auto">
+              <a:lnSpc>
+                <a:spcPct val="100000"/>
+              </a:lnSpc>
+              <a:spcBef>
+                <a:spcPts val="0"/>
+              </a:spcBef>
+              <a:spcAft>
+                <a:spcPts val="0"/>
+              </a:spcAft>
+              <a:buClrTx/>
+              <a:buSzTx/>
+            </a:pPr>
+            <a:endParaRPr lang="en-US" b="0" dirty="0" smtClean="0"/>
           </a:p>
         </p:txBody>
       </p:sp>
     </p:spTree>
     <p:extLst>
       <p:ext uri="{BB962C8B-B14F-4D97-AF65-F5344CB8AC3E}">
-        <p14:creationId xmlns:p14="http://schemas.microsoft.com/office/powerpoint/2010/main" val="1070426280"/>
+        <p14:creationId xmlns:p14="http://schemas.microsoft.com/office/powerpoint/2010/main" val="2093356016"/>
       </p:ext>
     </p:extLst>
   </p:cSld>
@@ -13315,7 +13345,7 @@
           <a:p>
             <a:r>
               <a:rPr lang="en-US" dirty="0" smtClean="0"/>
-              <a:t>Demo 2</a:t>
+              <a:t>Loading Structure Objects</a:t>
             </a:r>
             <a:endParaRPr lang="en-US" dirty="0"/>
           </a:p>
@@ -13336,38 +13366,63 @@
           <a:bodyPr/>
           <a:lstStyle/>
           <a:p>
-            <a:endParaRPr lang="en-US" dirty="0" smtClean="0"/>
-          </a:p>
-          <a:p>
-            <a:r>
-              <a:rPr lang="en-US" dirty="0" smtClean="0"/>
-              <a:t>Load a structure in different formats</a:t>
-            </a:r>
-          </a:p>
-          <a:p>
-            <a:endParaRPr lang="en-US" dirty="0"/>
-          </a:p>
-          <a:p>
-            <a:r>
-              <a:rPr lang="en-US" dirty="0" smtClean="0"/>
-              <a:t>Write a structure from </a:t>
-            </a:r>
-            <a:r>
-              <a:rPr lang="en-US" dirty="0" err="1" smtClean="0"/>
-              <a:t>BioJava</a:t>
-            </a:r>
-            <a:r>
-              <a:rPr lang="en-US" dirty="0" smtClean="0"/>
-              <a:t> to a file</a:t>
-            </a:r>
-            <a:endParaRPr lang="en-US" dirty="0"/>
+            <a:endParaRPr lang="en-US" sz="3200" dirty="0" smtClean="0"/>
+          </a:p>
+          <a:p>
+            <a:r>
+              <a:rPr lang="en-US" sz="3200" dirty="0" err="1" smtClean="0"/>
+              <a:t>AtomCache</a:t>
+            </a:r>
+            <a:endParaRPr lang="en-US" sz="3200" b="0" dirty="0" smtClean="0"/>
+          </a:p>
+          <a:p>
+            <a:pPr lvl="1"/>
+            <a:r>
+              <a:rPr lang="en-US" sz="2800" dirty="0" smtClean="0"/>
+              <a:t>PDB ids (2HHB)</a:t>
+            </a:r>
+          </a:p>
+          <a:p>
+            <a:pPr lvl="1"/>
+            <a:r>
+              <a:rPr lang="en-US" sz="2800" dirty="0"/>
+              <a:t>Structural ranges (2HHB.A:1-20</a:t>
+            </a:r>
+            <a:r>
+              <a:rPr lang="en-US" sz="2800" dirty="0" smtClean="0"/>
+              <a:t>)</a:t>
+            </a:r>
+          </a:p>
+          <a:p>
+            <a:pPr lvl="1"/>
+            <a:r>
+              <a:rPr lang="en-US" sz="2800" dirty="0" smtClean="0"/>
+              <a:t>SCOP, CATH &amp; ECOD ids (d2hhba_)</a:t>
+            </a:r>
+          </a:p>
+          <a:p>
+            <a:pPr lvl="1"/>
+            <a:r>
+              <a:rPr lang="en-US" sz="2800" dirty="0" smtClean="0"/>
+              <a:t>Many configuration options</a:t>
+            </a:r>
+          </a:p>
+          <a:p>
+            <a:endParaRPr lang="en-US" sz="3200" dirty="0" smtClean="0"/>
+          </a:p>
+          <a:p>
+            <a:r>
+              <a:rPr lang="en-US" sz="3200" dirty="0" err="1" smtClean="0"/>
+              <a:t>StructureIO</a:t>
+            </a:r>
+            <a:endParaRPr lang="en-US" sz="3200" dirty="0"/>
           </a:p>
         </p:txBody>
       </p:sp>
     </p:spTree>
     <p:extLst>
       <p:ext uri="{BB962C8B-B14F-4D97-AF65-F5344CB8AC3E}">
-        <p14:creationId xmlns:p14="http://schemas.microsoft.com/office/powerpoint/2010/main" val="212512267"/>
+        <p14:creationId xmlns:p14="http://schemas.microsoft.com/office/powerpoint/2010/main" val="1070426280"/>
       </p:ext>
     </p:extLst>
   </p:cSld>
@@ -13419,7 +13474,7 @@
           <a:p>
             <a:r>
               <a:rPr lang="en-US" dirty="0" smtClean="0"/>
-              <a:t>Problem 2</a:t>
+              <a:t>Demo 2</a:t>
             </a:r>
             <a:endParaRPr lang="en-US" dirty="0"/>
           </a:p>
@@ -13440,140 +13495,38 @@
           <a:bodyPr/>
           <a:lstStyle/>
           <a:p>
-            <a:r>
-              <a:rPr lang="en-US" sz="2400" dirty="0" smtClean="0"/>
-              <a:t>Traverse </a:t>
-            </a:r>
-            <a:r>
-              <a:rPr lang="en-US" sz="2400" dirty="0" err="1" smtClean="0"/>
+            <a:endParaRPr lang="en-US" dirty="0" smtClean="0"/>
+          </a:p>
+          <a:p>
+            <a:r>
+              <a:rPr lang="en-US" dirty="0" smtClean="0"/>
+              <a:t>Load a structure in different formats</a:t>
+            </a:r>
+          </a:p>
+          <a:p>
+            <a:endParaRPr lang="en-US" dirty="0"/>
+          </a:p>
+          <a:p>
+            <a:r>
+              <a:rPr lang="en-US" dirty="0" smtClean="0"/>
+              <a:t>Write a structure from </a:t>
+            </a:r>
+            <a:r>
+              <a:rPr lang="en-US" dirty="0" err="1" smtClean="0"/>
               <a:t>BioJava</a:t>
             </a:r>
             <a:r>
-              <a:rPr lang="en-US" sz="2400" dirty="0" smtClean="0"/>
-              <a:t> structures</a:t>
-            </a:r>
-          </a:p>
-          <a:p>
-            <a:pPr lvl="1"/>
-            <a:endParaRPr lang="en-US" sz="2000" dirty="0" smtClean="0"/>
-          </a:p>
-          <a:p>
-            <a:pPr lvl="1"/>
-            <a:r>
-              <a:rPr lang="en-US" sz="2000" b="1" dirty="0" smtClean="0"/>
-              <a:t>Task 1</a:t>
-            </a:r>
-            <a:r>
-              <a:rPr lang="en-US" sz="2000" dirty="0" smtClean="0"/>
-              <a:t>: number of models. Hint: </a:t>
-            </a:r>
-            <a:r>
-              <a:rPr lang="en-US" sz="2000" i="1" dirty="0" err="1" smtClean="0"/>
-              <a:t>nrModels</a:t>
-            </a:r>
-            <a:endParaRPr lang="en-US" sz="2000" i="1" dirty="0" smtClean="0"/>
-          </a:p>
-          <a:p>
-            <a:pPr lvl="1"/>
-            <a:endParaRPr lang="en-US" sz="2000" i="1" dirty="0"/>
-          </a:p>
-          <a:p>
-            <a:pPr lvl="1"/>
-            <a:r>
-              <a:rPr lang="en-US" sz="2000" b="1" dirty="0" smtClean="0"/>
-              <a:t>Task 2</a:t>
-            </a:r>
-            <a:r>
-              <a:rPr lang="en-US" sz="2000" dirty="0" smtClean="0"/>
-              <a:t>: number of polymer chains. Hint: </a:t>
-            </a:r>
-            <a:r>
-              <a:rPr lang="en-US" sz="2000" i="1" dirty="0" err="1" smtClean="0"/>
-              <a:t>PolyChains</a:t>
-            </a:r>
-            <a:endParaRPr lang="en-US" sz="2000" dirty="0" smtClean="0"/>
-          </a:p>
-          <a:p>
-            <a:pPr lvl="1"/>
-            <a:endParaRPr lang="en-US" sz="2000" i="1" dirty="0" smtClean="0"/>
-          </a:p>
-          <a:p>
-            <a:pPr lvl="1"/>
-            <a:r>
-              <a:rPr lang="en-US" sz="2000" b="1" dirty="0" smtClean="0"/>
-              <a:t>Task 3</a:t>
-            </a:r>
-            <a:r>
-              <a:rPr lang="en-US" sz="2000" dirty="0" smtClean="0"/>
-              <a:t>: number of amino acids in a chain.</a:t>
-            </a:r>
-          </a:p>
-          <a:p>
-            <a:pPr lvl="2"/>
-            <a:r>
-              <a:rPr lang="en-US" sz="1600" dirty="0" smtClean="0"/>
-              <a:t>Take a look at the </a:t>
-            </a:r>
-            <a:r>
-              <a:rPr lang="en-US" sz="1600" i="1" dirty="0" err="1" smtClean="0"/>
-              <a:t>GroupType</a:t>
-            </a:r>
-            <a:r>
-              <a:rPr lang="en-US" sz="1600" dirty="0" smtClean="0"/>
-              <a:t> class first</a:t>
-            </a:r>
-          </a:p>
-          <a:p>
-            <a:pPr lvl="2"/>
-            <a:r>
-              <a:rPr lang="en-US" sz="1600" dirty="0" smtClean="0"/>
-              <a:t>Hint: use one method from the Chain object</a:t>
-            </a:r>
-          </a:p>
-          <a:p>
-            <a:pPr lvl="1"/>
-            <a:endParaRPr lang="en-US" sz="1600" dirty="0"/>
-          </a:p>
-          <a:p>
-            <a:pPr lvl="1"/>
-            <a:r>
-              <a:rPr lang="en-US" sz="2000" b="1" dirty="0" smtClean="0"/>
-              <a:t>Task 4</a:t>
-            </a:r>
-            <a:r>
-              <a:rPr lang="en-US" sz="2000" dirty="0" smtClean="0"/>
-              <a:t>: number of oxygens in the amino acids of a chain.</a:t>
-            </a:r>
-            <a:endParaRPr lang="en-US" sz="1800" dirty="0" smtClean="0"/>
-          </a:p>
-          <a:p>
-            <a:pPr lvl="2"/>
-            <a:r>
-              <a:rPr lang="en-US" sz="1800" dirty="0" smtClean="0"/>
-              <a:t>Take a look at the </a:t>
-            </a:r>
-            <a:r>
-              <a:rPr lang="en-US" sz="1800" i="1" dirty="0" smtClean="0"/>
-              <a:t>Element</a:t>
-            </a:r>
-            <a:r>
-              <a:rPr lang="en-US" sz="1800" dirty="0" smtClean="0"/>
-              <a:t> class</a:t>
-            </a:r>
-          </a:p>
-          <a:p>
-            <a:pPr lvl="2"/>
-            <a:r>
-              <a:rPr lang="en-US" sz="1800" dirty="0" smtClean="0"/>
-              <a:t>Hint: use a double loop iteration over List of Groups and Atoms</a:t>
-            </a:r>
+              <a:rPr lang="en-US" dirty="0" smtClean="0"/>
+              <a:t> to a file</a:t>
+            </a:r>
+            <a:endParaRPr lang="en-US" dirty="0"/>
           </a:p>
         </p:txBody>
       </p:sp>
     </p:spTree>
     <p:extLst>
       <p:ext uri="{BB962C8B-B14F-4D97-AF65-F5344CB8AC3E}">
-        <p14:creationId xmlns:p14="http://schemas.microsoft.com/office/powerpoint/2010/main" val="1355552254"/>
+        <p14:creationId xmlns:p14="http://schemas.microsoft.com/office/powerpoint/2010/main" val="212512267"/>
       </p:ext>
     </p:extLst>
   </p:cSld>
@@ -13581,6 +13534,13 @@
     <a:masterClrMapping/>
   </p:clrMapOvr>
   <p:transition/>
+  <p:timing>
+    <p:tnLst>
+      <p:par>
+        <p:cTn id="1" dur="indefinite" restart="never" nodeType="tmRoot"/>
+      </p:par>
+    </p:tnLst>
+  </p:timing>
 </p:sld>
 </file>
 
@@ -13721,7 +13681,7 @@
             <a:spLocks noGrp="1"/>
           </p:cNvSpPr>
           <p:nvPr>
-            <p:ph type="ctrTitle"/>
+            <p:ph type="title"/>
           </p:nvPr>
         </p:nvSpPr>
         <p:spPr/>
@@ -13730,32 +13690,21 @@
           <a:lstStyle/>
           <a:p>
             <a:r>
-              <a:rPr lang="en-US" b="0" dirty="0" smtClean="0"/>
-              <a:t>PART 3 </a:t>
-            </a:r>
-            <a:br>
-              <a:rPr lang="en-US" b="0" dirty="0" smtClean="0"/>
-            </a:br>
-            <a:r>
-              <a:rPr lang="en-US" sz="4800" dirty="0" err="1" smtClean="0"/>
-              <a:t>BioJava</a:t>
-            </a:r>
-            <a:r>
-              <a:rPr lang="en-US" sz="4800" dirty="0" smtClean="0"/>
-              <a:t> Applications</a:t>
-            </a:r>
-            <a:endParaRPr lang="en-US" sz="5400" dirty="0"/>
+              <a:rPr lang="en-US" dirty="0" smtClean="0"/>
+              <a:t>Problem 2</a:t>
+            </a:r>
+            <a:endParaRPr lang="en-US" dirty="0"/>
           </a:p>
         </p:txBody>
       </p:sp>
       <p:sp>
         <p:nvSpPr>
-          <p:cNvPr id="3" name="Subtitle 2"/>
+          <p:cNvPr id="3" name="Content Placeholder 2"/>
           <p:cNvSpPr>
             <a:spLocks noGrp="1"/>
           </p:cNvSpPr>
           <p:nvPr>
-            <p:ph type="subTitle" idx="1"/>
+            <p:ph idx="1"/>
           </p:nvPr>
         </p:nvSpPr>
         <p:spPr/>
@@ -13764,27 +13713,139 @@
           <a:lstStyle/>
           <a:p>
             <a:r>
-              <a:rPr lang="en-US" dirty="0" smtClean="0"/>
-              <a:t>Biological assemblies</a:t>
-            </a:r>
-          </a:p>
-          <a:p>
-            <a:r>
-              <a:rPr lang="en-US" dirty="0" smtClean="0"/>
-              <a:t>Visualization in </a:t>
-            </a:r>
-            <a:r>
-              <a:rPr lang="en-US" dirty="0" err="1" smtClean="0"/>
-              <a:t>Jmol</a:t>
-            </a:r>
-            <a:endParaRPr lang="en-US" dirty="0" smtClean="0"/>
+              <a:rPr lang="en-US" sz="2400" dirty="0" smtClean="0"/>
+              <a:t>Traverse </a:t>
+            </a:r>
+            <a:r>
+              <a:rPr lang="en-US" sz="2400" dirty="0" err="1" smtClean="0"/>
+              <a:t>BioJava</a:t>
+            </a:r>
+            <a:r>
+              <a:rPr lang="en-US" sz="2400" dirty="0" smtClean="0"/>
+              <a:t> structures</a:t>
+            </a:r>
+          </a:p>
+          <a:p>
+            <a:pPr lvl="1"/>
+            <a:endParaRPr lang="en-US" sz="2000" dirty="0" smtClean="0"/>
+          </a:p>
+          <a:p>
+            <a:pPr lvl="1"/>
+            <a:r>
+              <a:rPr lang="en-US" sz="2000" b="1" dirty="0" smtClean="0"/>
+              <a:t>Task 1</a:t>
+            </a:r>
+            <a:r>
+              <a:rPr lang="en-US" sz="2000" dirty="0" smtClean="0"/>
+              <a:t>: number of models. Hint: </a:t>
+            </a:r>
+            <a:r>
+              <a:rPr lang="en-US" sz="2000" i="1" dirty="0" err="1" smtClean="0"/>
+              <a:t>nrModels</a:t>
+            </a:r>
+            <a:endParaRPr lang="en-US" sz="2000" i="1" dirty="0" smtClean="0"/>
+          </a:p>
+          <a:p>
+            <a:pPr lvl="1"/>
+            <a:endParaRPr lang="en-US" sz="2000" i="1" dirty="0"/>
+          </a:p>
+          <a:p>
+            <a:pPr lvl="1"/>
+            <a:r>
+              <a:rPr lang="en-US" sz="2000" b="1" dirty="0" smtClean="0"/>
+              <a:t>Task 2</a:t>
+            </a:r>
+            <a:r>
+              <a:rPr lang="en-US" sz="2000" dirty="0" smtClean="0"/>
+              <a:t>: number of polymer chains. Hint: </a:t>
+            </a:r>
+            <a:r>
+              <a:rPr lang="en-US" sz="2000" i="1" dirty="0" err="1" smtClean="0"/>
+              <a:t>PolyChains</a:t>
+            </a:r>
+            <a:endParaRPr lang="en-US" sz="2000" dirty="0" smtClean="0"/>
+          </a:p>
+          <a:p>
+            <a:pPr lvl="1"/>
+            <a:endParaRPr lang="en-US" sz="2000" i="1" dirty="0" smtClean="0"/>
+          </a:p>
+          <a:p>
+            <a:pPr lvl="1"/>
+            <a:r>
+              <a:rPr lang="en-US" sz="2000" b="1" dirty="0" smtClean="0"/>
+              <a:t>Task 3</a:t>
+            </a:r>
+            <a:r>
+              <a:rPr lang="en-US" sz="2000" dirty="0" smtClean="0"/>
+              <a:t>: number of amino acids in a chain.</a:t>
+            </a:r>
+          </a:p>
+          <a:p>
+            <a:pPr lvl="2"/>
+            <a:r>
+              <a:rPr lang="en-US" sz="1600" dirty="0" smtClean="0"/>
+              <a:t>Take a look at the </a:t>
+            </a:r>
+            <a:r>
+              <a:rPr lang="en-US" sz="1600" i="1" dirty="0" err="1" smtClean="0"/>
+              <a:t>GroupType</a:t>
+            </a:r>
+            <a:r>
+              <a:rPr lang="en-US" sz="1600" dirty="0" smtClean="0"/>
+              <a:t> class first</a:t>
+            </a:r>
+          </a:p>
+          <a:p>
+            <a:pPr lvl="2"/>
+            <a:r>
+              <a:rPr lang="en-US" sz="1600" dirty="0" smtClean="0"/>
+              <a:t>Hint: use one method from the Chain object</a:t>
+            </a:r>
+          </a:p>
+          <a:p>
+            <a:pPr lvl="1"/>
+            <a:endParaRPr lang="en-US" sz="1600" dirty="0"/>
+          </a:p>
+          <a:p>
+            <a:pPr lvl="1"/>
+            <a:r>
+              <a:rPr lang="en-US" sz="2000" b="1" dirty="0" smtClean="0"/>
+              <a:t>Task 4</a:t>
+            </a:r>
+            <a:r>
+              <a:rPr lang="en-US" sz="2000" dirty="0" smtClean="0"/>
+              <a:t>: number of oxygens in the amino acids of a chain.</a:t>
+            </a:r>
+            <a:endParaRPr lang="en-US" sz="1800" dirty="0" smtClean="0"/>
+          </a:p>
+          <a:p>
+            <a:pPr lvl="2"/>
+            <a:r>
+              <a:rPr lang="en-US" sz="1800" dirty="0" smtClean="0"/>
+              <a:t>Take a look at the </a:t>
+            </a:r>
+            <a:r>
+              <a:rPr lang="en-US" sz="1800" i="1" dirty="0" smtClean="0"/>
+              <a:t>Element</a:t>
+            </a:r>
+            <a:r>
+              <a:rPr lang="en-US" sz="1800" dirty="0" smtClean="0"/>
+              <a:t> class</a:t>
+            </a:r>
+          </a:p>
+          <a:p>
+            <a:pPr lvl="2"/>
+            <a:r>
+              <a:rPr lang="en-US" sz="1800" dirty="0" smtClean="0"/>
+              <a:t>Hint: use a double loop iteration over List of Groups and Atoms</a:t>
+            </a:r>
           </a:p>
         </p:txBody>
       </p:sp>
     </p:spTree>
     <p:extLst>
       <p:ext uri="{BB962C8B-B14F-4D97-AF65-F5344CB8AC3E}">
-        <p14:creationId xmlns:p14="http://schemas.microsoft.com/office/powerpoint/2010/main" val="164927667"/>
+        <p14:creationId xmlns:p14="http://schemas.microsoft.com/office/powerpoint/2010/main" val="1355552254"/>
       </p:ext>
     </p:extLst>
   </p:cSld>
@@ -13819,7 +13880,7 @@
             <a:spLocks noGrp="1"/>
           </p:cNvSpPr>
           <p:nvPr>
-            <p:ph type="title"/>
+            <p:ph type="ctrTitle"/>
           </p:nvPr>
         </p:nvSpPr>
         <p:spPr/>
@@ -13828,21 +13889,32 @@
           <a:lstStyle/>
           <a:p>
             <a:r>
-              <a:rPr lang="en-US" dirty="0" smtClean="0"/>
-              <a:t>Biological Assemblies</a:t>
-            </a:r>
-            <a:endParaRPr lang="en-US" dirty="0"/>
+              <a:rPr lang="en-US" b="0" dirty="0" smtClean="0"/>
+              <a:t>PART 3 </a:t>
+            </a:r>
+            <a:br>
+              <a:rPr lang="en-US" b="0" dirty="0" smtClean="0"/>
+            </a:br>
+            <a:r>
+              <a:rPr lang="en-US" sz="4800" dirty="0" err="1" smtClean="0"/>
+              <a:t>BioJava</a:t>
+            </a:r>
+            <a:r>
+              <a:rPr lang="en-US" sz="4800" dirty="0" smtClean="0"/>
+              <a:t> Applications</a:t>
+            </a:r>
+            <a:endParaRPr lang="en-US" sz="5400" dirty="0"/>
           </a:p>
         </p:txBody>
       </p:sp>
       <p:sp>
         <p:nvSpPr>
-          <p:cNvPr id="3" name="Content Placeholder 2"/>
+          <p:cNvPr id="3" name="Subtitle 2"/>
           <p:cNvSpPr>
             <a:spLocks noGrp="1"/>
           </p:cNvSpPr>
           <p:nvPr>
-            <p:ph idx="1"/>
+            <p:ph type="subTitle" idx="1"/>
           </p:nvPr>
         </p:nvSpPr>
         <p:spPr/>
@@ -13850,65 +13922,28 @@
           <a:bodyPr/>
           <a:lstStyle/>
           <a:p>
+            <a:r>
+              <a:rPr lang="en-US" dirty="0" smtClean="0"/>
+              <a:t>Biological assemblies</a:t>
+            </a:r>
+          </a:p>
+          <a:p>
+            <a:r>
+              <a:rPr lang="en-US" dirty="0" smtClean="0"/>
+              <a:t>Visualization in </a:t>
+            </a:r>
+            <a:r>
+              <a:rPr lang="en-US" dirty="0" err="1" smtClean="0"/>
+              <a:t>Jmol</a:t>
+            </a:r>
             <a:endParaRPr lang="en-US" dirty="0" smtClean="0"/>
-          </a:p>
-          <a:p>
-            <a:r>
-              <a:rPr lang="en-US" dirty="0" smtClean="0"/>
-              <a:t>Important concepts</a:t>
-            </a:r>
-          </a:p>
-          <a:p>
-            <a:pPr lvl="1"/>
-            <a:r>
-              <a:rPr lang="en-US" dirty="0" smtClean="0"/>
-              <a:t>Asymmetric Unit (AU)</a:t>
-            </a:r>
-          </a:p>
-          <a:p>
-            <a:pPr lvl="1"/>
-            <a:r>
-              <a:rPr lang="en-US" dirty="0" smtClean="0"/>
-              <a:t>Unit cell</a:t>
-            </a:r>
-          </a:p>
-          <a:p>
-            <a:pPr lvl="1"/>
-            <a:r>
-              <a:rPr lang="en-US" dirty="0" smtClean="0"/>
-              <a:t>Crystal lattice</a:t>
-            </a:r>
-          </a:p>
-          <a:p>
-            <a:pPr lvl="1"/>
-            <a:endParaRPr lang="en-US" dirty="0"/>
-          </a:p>
-          <a:p>
-            <a:r>
-              <a:rPr lang="en-US" dirty="0" smtClean="0"/>
-              <a:t>Resource</a:t>
-            </a:r>
-            <a:r>
-              <a:rPr lang="en-US" sz="3200" dirty="0" smtClean="0"/>
-              <a:t>:</a:t>
-            </a:r>
-          </a:p>
-          <a:p>
-            <a:pPr lvl="1"/>
-            <a:r>
-              <a:rPr lang="en-US" dirty="0">
-                <a:hlinkClick r:id="rId2"/>
-              </a:rPr>
-              <a:t>https://pdb101.rcsb.org/learn/guide-to-understanding-pdb-data/biological-assemblies</a:t>
-            </a:r>
-            <a:endParaRPr lang="en-US" dirty="0"/>
           </a:p>
         </p:txBody>
       </p:sp>
     </p:spTree>
     <p:extLst>
       <p:ext uri="{BB962C8B-B14F-4D97-AF65-F5344CB8AC3E}">
-        <p14:creationId xmlns:p14="http://schemas.microsoft.com/office/powerpoint/2010/main" val="1685394639"/>
+        <p14:creationId xmlns:p14="http://schemas.microsoft.com/office/powerpoint/2010/main" val="164927667"/>
       </p:ext>
     </p:extLst>
   </p:cSld>
@@ -13974,35 +14009,66 @@
           <a:bodyPr/>
           <a:lstStyle/>
           <a:p>
-            <a:pPr fontAlgn="auto">
-              <a:lnSpc>
-                <a:spcPct val="100000"/>
-              </a:lnSpc>
-              <a:spcBef>
-                <a:spcPts val="0"/>
-              </a:spcBef>
-              <a:spcAft>
-                <a:spcPts val="0"/>
-              </a:spcAft>
-              <a:buClrTx/>
-              <a:buSzTx/>
-            </a:pPr>
             <a:r>
               <a:rPr lang="en-US" dirty="0" smtClean="0"/>
-              <a:t>Reconstructing the BA using </a:t>
-            </a:r>
-            <a:r>
-              <a:rPr lang="en-US" dirty="0" err="1" smtClean="0"/>
-              <a:t>BioJava</a:t>
-            </a:r>
-            <a:endParaRPr lang="en-US" dirty="0" smtClean="0"/>
+              <a:t>Important </a:t>
+            </a:r>
+            <a:r>
+              <a:rPr lang="en-US" dirty="0" smtClean="0"/>
+              <a:t>concepts</a:t>
+            </a:r>
+          </a:p>
+          <a:p>
+            <a:pPr lvl="1"/>
+            <a:r>
+              <a:rPr lang="en-US" dirty="0" smtClean="0"/>
+              <a:t>Asymmetric Unit (AU)</a:t>
+            </a:r>
+          </a:p>
+          <a:p>
+            <a:pPr lvl="1"/>
+            <a:r>
+              <a:rPr lang="en-US" dirty="0" smtClean="0"/>
+              <a:t>Unit cell</a:t>
+            </a:r>
+          </a:p>
+          <a:p>
+            <a:pPr lvl="1"/>
+            <a:r>
+              <a:rPr lang="en-US" dirty="0" smtClean="0"/>
+              <a:t>Crystal lattice</a:t>
+            </a:r>
+          </a:p>
+          <a:p>
+            <a:pPr lvl="1"/>
+            <a:endParaRPr lang="en-US" dirty="0"/>
+          </a:p>
+          <a:p>
+            <a:r>
+              <a:rPr lang="en-US" dirty="0" smtClean="0"/>
+              <a:t>Resource</a:t>
+            </a:r>
+            <a:r>
+              <a:rPr lang="en-US" sz="3200" dirty="0" smtClean="0"/>
+              <a:t>:</a:t>
+            </a:r>
+          </a:p>
+          <a:p>
+            <a:pPr lvl="1"/>
+            <a:r>
+              <a:rPr lang="en-US" dirty="0">
+                <a:hlinkClick r:id="rId2"/>
+              </a:rPr>
+              <a:t>https://pdb101.rcsb.org/learn/guide-to-understanding-pdb-data/biological-assemblies</a:t>
+            </a:r>
+            <a:endParaRPr lang="en-US" dirty="0"/>
           </a:p>
         </p:txBody>
       </p:sp>
     </p:spTree>
     <p:extLst>
       <p:ext uri="{BB962C8B-B14F-4D97-AF65-F5344CB8AC3E}">
-        <p14:creationId xmlns:p14="http://schemas.microsoft.com/office/powerpoint/2010/main" val="287879290"/>
+        <p14:creationId xmlns:p14="http://schemas.microsoft.com/office/powerpoint/2010/main" val="1685394639"/>
       </p:ext>
     </p:extLst>
   </p:cSld>
@@ -14010,6 +14076,13 @@
     <a:masterClrMapping/>
   </p:clrMapOvr>
   <p:transition/>
+  <p:timing>
+    <p:tnLst>
+      <p:par>
+        <p:cTn id="1" dur="indefinite" restart="never" nodeType="tmRoot"/>
+      </p:par>
+    </p:tnLst>
+  </p:timing>
 </p:sld>
 </file>
 
@@ -14047,7 +14120,11 @@
           <a:p>
             <a:r>
               <a:rPr lang="en-US" dirty="0" smtClean="0"/>
-              <a:t>Problem 3</a:t>
+              <a:t>Visualization in </a:t>
+            </a:r>
+            <a:r>
+              <a:rPr lang="en-US" dirty="0" err="1" smtClean="0"/>
+              <a:t>Jmol</a:t>
             </a:r>
             <a:endParaRPr lang="en-US" dirty="0"/>
           </a:p>
@@ -14063,113 +14140,228 @@
             <p:ph idx="1"/>
           </p:nvPr>
         </p:nvSpPr>
-        <p:spPr/>
+        <p:spPr>
+          <a:xfrm>
+            <a:off x="152399" y="1366108"/>
+            <a:ext cx="4791075" cy="4577492"/>
+          </a:xfrm>
+        </p:spPr>
         <p:txBody>
           <a:bodyPr/>
           <a:lstStyle/>
           <a:p>
+            <a:pPr fontAlgn="auto">
+              <a:lnSpc>
+                <a:spcPct val="100000"/>
+              </a:lnSpc>
+              <a:spcBef>
+                <a:spcPts val="0"/>
+              </a:spcBef>
+              <a:spcAft>
+                <a:spcPts val="0"/>
+              </a:spcAft>
+              <a:buClrTx/>
+              <a:buSzTx/>
+            </a:pPr>
+            <a:r>
+              <a:rPr lang="en-US" sz="2400" b="0" dirty="0"/>
+              <a:t>I</a:t>
+            </a:r>
+            <a:r>
+              <a:rPr lang="en-US" sz="2400" b="0" dirty="0" smtClean="0"/>
+              <a:t>nterface for </a:t>
+            </a:r>
             <a:r>
               <a:rPr lang="en-US" sz="2400" dirty="0" smtClean="0"/>
-              <a:t>Display the symmetry of a biological assembly</a:t>
-            </a:r>
-          </a:p>
-          <a:p>
-            <a:pPr lvl="1"/>
-            <a:endParaRPr lang="en-US" sz="2000" dirty="0" smtClean="0"/>
-          </a:p>
-          <a:p>
-            <a:pPr lvl="1"/>
-            <a:r>
-              <a:rPr lang="en-US" sz="2000" b="1" dirty="0" smtClean="0"/>
-              <a:t>Task 1</a:t>
-            </a:r>
-            <a:r>
-              <a:rPr lang="en-US" sz="2000" dirty="0" smtClean="0"/>
-              <a:t>: </a:t>
-            </a:r>
-            <a:r>
-              <a:rPr lang="en-US" sz="2000" dirty="0" smtClean="0"/>
-              <a:t>download a biological assembly.</a:t>
-            </a:r>
-            <a:endParaRPr lang="en-US" sz="2000" i="1" dirty="0" smtClean="0"/>
-          </a:p>
-          <a:p>
-            <a:pPr lvl="1"/>
-            <a:endParaRPr lang="en-US" sz="2000" i="1" dirty="0"/>
-          </a:p>
-          <a:p>
-            <a:pPr lvl="1"/>
-            <a:r>
-              <a:rPr lang="en-US" sz="2000" b="1" dirty="0" smtClean="0"/>
-              <a:t>Task 2</a:t>
-            </a:r>
-            <a:r>
-              <a:rPr lang="en-US" sz="2000" dirty="0" smtClean="0"/>
-              <a:t>: </a:t>
-            </a:r>
-            <a:r>
-              <a:rPr lang="en-US" sz="2000" dirty="0" smtClean="0"/>
-              <a:t>change the clustering parameters to set pseudo-symmetry. </a:t>
-            </a:r>
-          </a:p>
-          <a:p>
-            <a:pPr lvl="2"/>
+              <a:t>quick </a:t>
+            </a:r>
+            <a:r>
+              <a:rPr lang="en-US" sz="2400" b="0" dirty="0" smtClean="0"/>
+              <a:t>and </a:t>
+            </a:r>
+            <a:r>
+              <a:rPr lang="en-US" sz="2400" dirty="0" smtClean="0"/>
+              <a:t>simple</a:t>
+            </a:r>
+            <a:r>
+              <a:rPr lang="en-US" sz="2400" b="0" dirty="0" smtClean="0"/>
+              <a:t> visualization of structures in </a:t>
+            </a:r>
+            <a:r>
+              <a:rPr lang="en-US" sz="2400" dirty="0" err="1" smtClean="0"/>
+              <a:t>Jmol</a:t>
+            </a:r>
+            <a:endParaRPr lang="en-US" sz="2400" dirty="0" smtClean="0"/>
+          </a:p>
+          <a:p>
+            <a:pPr fontAlgn="auto">
+              <a:lnSpc>
+                <a:spcPct val="100000"/>
+              </a:lnSpc>
+              <a:spcBef>
+                <a:spcPts val="0"/>
+              </a:spcBef>
+              <a:spcAft>
+                <a:spcPts val="0"/>
+              </a:spcAft>
+              <a:buClrTx/>
+              <a:buSzTx/>
+            </a:pPr>
+            <a:endParaRPr lang="en-US" sz="2400" b="0" dirty="0" smtClean="0"/>
+          </a:p>
+          <a:p>
+            <a:pPr marL="857250" lvl="1" indent="-457200" fontAlgn="auto">
+              <a:lnSpc>
+                <a:spcPct val="100000"/>
+              </a:lnSpc>
+              <a:spcBef>
+                <a:spcPts val="0"/>
+              </a:spcBef>
+              <a:spcAft>
+                <a:spcPts val="0"/>
+              </a:spcAft>
+              <a:buClrTx/>
+              <a:buSzTx/>
+              <a:buFont typeface="+mj-lt"/>
+              <a:buAutoNum type="arabicPeriod"/>
+            </a:pPr>
+            <a:r>
+              <a:rPr lang="en-US" sz="1800" b="0" dirty="0" smtClean="0"/>
+              <a:t>Start a </a:t>
+            </a:r>
+            <a:r>
+              <a:rPr lang="en-US" sz="1800" b="1" dirty="0" err="1" smtClean="0"/>
+              <a:t>JFrame</a:t>
+            </a:r>
+            <a:endParaRPr lang="en-US" sz="1800" b="1" dirty="0" smtClean="0"/>
+          </a:p>
+          <a:p>
+            <a:pPr marL="857250" lvl="1" indent="-457200" fontAlgn="auto">
+              <a:lnSpc>
+                <a:spcPct val="100000"/>
+              </a:lnSpc>
+              <a:spcBef>
+                <a:spcPts val="0"/>
+              </a:spcBef>
+              <a:spcAft>
+                <a:spcPts val="0"/>
+              </a:spcAft>
+              <a:buClrTx/>
+              <a:buSzTx/>
+              <a:buFont typeface="+mj-lt"/>
+              <a:buAutoNum type="arabicPeriod"/>
+            </a:pPr>
+            <a:r>
+              <a:rPr lang="en-US" sz="1800" b="0" dirty="0" smtClean="0"/>
+              <a:t>Insert a </a:t>
+            </a:r>
+            <a:r>
+              <a:rPr lang="en-US" sz="1800" b="1" dirty="0" err="1" smtClean="0"/>
+              <a:t>Jmol</a:t>
+            </a:r>
+            <a:r>
+              <a:rPr lang="en-US" sz="1800" b="0" dirty="0" smtClean="0"/>
+              <a:t> panel</a:t>
+            </a:r>
+          </a:p>
+          <a:p>
+            <a:pPr marL="857250" lvl="1" indent="-457200" fontAlgn="auto">
+              <a:lnSpc>
+                <a:spcPct val="100000"/>
+              </a:lnSpc>
+              <a:spcBef>
+                <a:spcPts val="0"/>
+              </a:spcBef>
+              <a:spcAft>
+                <a:spcPts val="0"/>
+              </a:spcAft>
+              <a:buClrTx/>
+              <a:buSzTx/>
+              <a:buFont typeface="+mj-lt"/>
+              <a:buAutoNum type="arabicPeriod"/>
+            </a:pPr>
+            <a:r>
+              <a:rPr lang="en-US" sz="1800" b="0" dirty="0" smtClean="0"/>
+              <a:t>Convert the </a:t>
+            </a:r>
+            <a:r>
+              <a:rPr lang="en-US" sz="1800" b="1" dirty="0" err="1" smtClean="0"/>
+              <a:t>BioJava</a:t>
+            </a:r>
+            <a:r>
+              <a:rPr lang="en-US" sz="1800" b="0" dirty="0" smtClean="0"/>
+              <a:t> structure to a structure file (PDB, MMTF)</a:t>
+            </a:r>
+          </a:p>
+          <a:p>
+            <a:pPr marL="857250" lvl="1" indent="-457200" fontAlgn="auto">
+              <a:lnSpc>
+                <a:spcPct val="100000"/>
+              </a:lnSpc>
+              <a:spcBef>
+                <a:spcPts val="0"/>
+              </a:spcBef>
+              <a:spcAft>
+                <a:spcPts val="0"/>
+              </a:spcAft>
+              <a:buClrTx/>
+              <a:buSzTx/>
+              <a:buFont typeface="+mj-lt"/>
+              <a:buAutoNum type="arabicPeriod"/>
+            </a:pPr>
+            <a:r>
+              <a:rPr lang="en-US" sz="1800" b="0" dirty="0" smtClean="0"/>
+              <a:t>Send the structure file to the </a:t>
+            </a:r>
+            <a:r>
+              <a:rPr lang="en-US" sz="1800" b="1" dirty="0" err="1" smtClean="0"/>
+              <a:t>Jmol</a:t>
+            </a:r>
+            <a:r>
+              <a:rPr lang="en-US" sz="1800" b="1" dirty="0" smtClean="0"/>
+              <a:t> </a:t>
+            </a:r>
             <a:r>
               <a:rPr lang="en-US" sz="1800" dirty="0" smtClean="0"/>
-              <a:t>Hint: structural clustering instead of sequence</a:t>
-            </a:r>
-            <a:r>
-              <a:rPr lang="en-US" sz="1600" dirty="0" smtClean="0"/>
-              <a:t>.</a:t>
-            </a:r>
-            <a:endParaRPr lang="en-US" sz="1600" dirty="0" smtClean="0"/>
-          </a:p>
-          <a:p>
-            <a:pPr lvl="1"/>
-            <a:endParaRPr lang="en-US" sz="2000" i="1" dirty="0" smtClean="0"/>
-          </a:p>
-          <a:p>
-            <a:pPr lvl="1"/>
-            <a:r>
-              <a:rPr lang="en-US" sz="2000" b="1" dirty="0" smtClean="0"/>
-              <a:t>Task 3</a:t>
-            </a:r>
-            <a:r>
-              <a:rPr lang="en-US" sz="2000" dirty="0" smtClean="0"/>
-              <a:t>: </a:t>
-            </a:r>
-            <a:r>
-              <a:rPr lang="en-US" sz="2000" dirty="0" smtClean="0"/>
-              <a:t>obtain the symmetry and stoichiometry from the result</a:t>
-            </a:r>
-            <a:r>
-              <a:rPr lang="en-US" sz="2000" dirty="0" smtClean="0"/>
-              <a:t>.</a:t>
-            </a:r>
-            <a:endParaRPr lang="en-US" sz="2000" dirty="0" smtClean="0"/>
-          </a:p>
-          <a:p>
-            <a:pPr lvl="2"/>
-            <a:r>
-              <a:rPr lang="en-US" sz="1800" dirty="0" smtClean="0"/>
-              <a:t>Hint</a:t>
-            </a:r>
-            <a:r>
-              <a:rPr lang="en-US" sz="1800" dirty="0" smtClean="0"/>
-              <a:t>: use </a:t>
-            </a:r>
-            <a:r>
-              <a:rPr lang="en-US" sz="1800" dirty="0" smtClean="0"/>
-              <a:t>getter methods.</a:t>
-            </a:r>
-            <a:endParaRPr lang="en-US" sz="1800" dirty="0" smtClean="0"/>
+              <a:t>panel</a:t>
+            </a:r>
           </a:p>
         </p:txBody>
       </p:sp>
+      <p:pic>
+        <p:nvPicPr>
+          <p:cNvPr id="4" name="Picture 3"/>
+          <p:cNvPicPr>
+            <a:picLocks noChangeAspect="1"/>
+          </p:cNvPicPr>
+          <p:nvPr/>
+        </p:nvPicPr>
+        <p:blipFill>
+          <a:blip r:embed="rId2">
+            <a:extLst>
+              <a:ext uri="{28A0092B-C50C-407E-A947-70E740481C1C}">
+                <a14:useLocalDpi xmlns:a14="http://schemas.microsoft.com/office/drawing/2010/main" val="0"/>
+              </a:ext>
+            </a:extLst>
+          </a:blip>
+          <a:stretch>
+            <a:fillRect/>
+          </a:stretch>
+        </p:blipFill>
+        <p:spPr>
+          <a:xfrm>
+            <a:off x="4893823" y="1087501"/>
+            <a:ext cx="4097777" cy="5134705"/>
+          </a:xfrm>
+          <a:prstGeom prst="rect">
+            <a:avLst/>
+          </a:prstGeom>
+        </p:spPr>
+      </p:pic>
     </p:spTree>
     <p:extLst>
       <p:ext uri="{BB962C8B-B14F-4D97-AF65-F5344CB8AC3E}">
-        <p14:creationId xmlns:p14="http://schemas.microsoft.com/office/powerpoint/2010/main" val="327756293"/>
+        <p14:creationId xmlns:p14="http://schemas.microsoft.com/office/powerpoint/2010/main" val="287879290"/>
       </p:ext>
     </p:extLst>
   </p:cSld>
@@ -14211,7 +14403,7 @@
             <a:spLocks noGrp="1"/>
           </p:cNvSpPr>
           <p:nvPr>
-            <p:ph type="ctrTitle"/>
+            <p:ph type="title"/>
           </p:nvPr>
         </p:nvSpPr>
         <p:spPr/>
@@ -14220,17 +14412,157 @@
           <a:lstStyle/>
           <a:p>
             <a:r>
-              <a:rPr lang="en-US" b="0" dirty="0" smtClean="0"/>
-              <a:t>Thank you!</a:t>
-            </a:r>
-            <a:endParaRPr lang="en-US" sz="5400" dirty="0"/>
+              <a:rPr lang="en-US" dirty="0" smtClean="0"/>
+              <a:t>Problem 3</a:t>
+            </a:r>
+            <a:endParaRPr lang="en-US" dirty="0"/>
+          </a:p>
+        </p:txBody>
+      </p:sp>
+      <p:sp>
+        <p:nvSpPr>
+          <p:cNvPr id="3" name="Content Placeholder 2"/>
+          <p:cNvSpPr>
+            <a:spLocks noGrp="1"/>
+          </p:cNvSpPr>
+          <p:nvPr>
+            <p:ph idx="1"/>
+          </p:nvPr>
+        </p:nvSpPr>
+        <p:spPr/>
+        <p:txBody>
+          <a:bodyPr/>
+          <a:lstStyle/>
+          <a:p>
+            <a:r>
+              <a:rPr lang="en-US" sz="2400" dirty="0" smtClean="0"/>
+              <a:t>Display the symmetry of a biological assembly</a:t>
+            </a:r>
+          </a:p>
+          <a:p>
+            <a:pPr lvl="1"/>
+            <a:endParaRPr lang="en-US" sz="2000" dirty="0" smtClean="0"/>
+          </a:p>
+          <a:p>
+            <a:pPr lvl="1"/>
+            <a:r>
+              <a:rPr lang="en-US" sz="2000" b="1" dirty="0" smtClean="0"/>
+              <a:t>Task 1</a:t>
+            </a:r>
+            <a:r>
+              <a:rPr lang="en-US" sz="2000" dirty="0" smtClean="0"/>
+              <a:t>: download a biological assembly.</a:t>
+            </a:r>
+          </a:p>
+          <a:p>
+            <a:pPr lvl="2"/>
+            <a:r>
+              <a:rPr lang="en-US" sz="1800" dirty="0" smtClean="0"/>
+              <a:t>Hint: use the </a:t>
+            </a:r>
+            <a:r>
+              <a:rPr lang="en-US" sz="1800" dirty="0" err="1" smtClean="0"/>
+              <a:t>StructureIO</a:t>
+            </a:r>
+            <a:r>
+              <a:rPr lang="en-US" sz="1800" dirty="0" smtClean="0"/>
+              <a:t> class directly.</a:t>
+            </a:r>
+          </a:p>
+          <a:p>
+            <a:pPr lvl="2"/>
+            <a:r>
+              <a:rPr lang="en-US" sz="1800" dirty="0" smtClean="0">
+                <a:solidFill>
+                  <a:srgbClr val="FF0000"/>
+                </a:solidFill>
+              </a:rPr>
+              <a:t>Warning</a:t>
+            </a:r>
+            <a:r>
+              <a:rPr lang="en-US" sz="1800" dirty="0" smtClean="0"/>
+              <a:t>: set the </a:t>
+            </a:r>
+            <a:r>
+              <a:rPr lang="en-US" sz="1800" dirty="0" err="1" smtClean="0"/>
+              <a:t>multiModel</a:t>
+            </a:r>
+            <a:r>
+              <a:rPr lang="en-US" sz="1800" dirty="0" smtClean="0"/>
+              <a:t> option to </a:t>
+            </a:r>
+            <a:r>
+              <a:rPr lang="en-US" sz="1800" dirty="0" smtClean="0">
+                <a:solidFill>
+                  <a:schemeClr val="accent2"/>
+                </a:solidFill>
+              </a:rPr>
+              <a:t>true</a:t>
+            </a:r>
+            <a:r>
+              <a:rPr lang="en-US" sz="1800" dirty="0" smtClean="0"/>
+              <a:t> (false is default) to be able to visualize the results (due to limitation of single letter chains in PDB format)</a:t>
+            </a:r>
+          </a:p>
+          <a:p>
+            <a:pPr lvl="1"/>
+            <a:endParaRPr lang="en-US" sz="2000" i="1" dirty="0"/>
+          </a:p>
+          <a:p>
+            <a:pPr lvl="1"/>
+            <a:r>
+              <a:rPr lang="en-US" sz="2000" b="1" dirty="0" smtClean="0"/>
+              <a:t>Task 2</a:t>
+            </a:r>
+            <a:r>
+              <a:rPr lang="en-US" sz="2000" dirty="0" smtClean="0"/>
+              <a:t>: change the </a:t>
+            </a:r>
+            <a:r>
+              <a:rPr lang="en-US" sz="2000" dirty="0" smtClean="0"/>
+              <a:t>parameters for pseudo-symmetry analysis. </a:t>
+            </a:r>
+            <a:endParaRPr lang="en-US" sz="2000" dirty="0" smtClean="0"/>
+          </a:p>
+          <a:p>
+            <a:pPr lvl="2"/>
+            <a:r>
+              <a:rPr lang="en-US" sz="1800" dirty="0" smtClean="0"/>
+              <a:t>Hint: structural clustering instead of sequence</a:t>
+            </a:r>
+            <a:r>
+              <a:rPr lang="en-US" sz="1600" dirty="0" smtClean="0"/>
+              <a:t>.</a:t>
+            </a:r>
+          </a:p>
+          <a:p>
+            <a:pPr lvl="1"/>
+            <a:endParaRPr lang="en-US" sz="2000" i="1" dirty="0" smtClean="0"/>
+          </a:p>
+          <a:p>
+            <a:pPr lvl="1"/>
+            <a:r>
+              <a:rPr lang="en-US" sz="2000" b="1" dirty="0" smtClean="0"/>
+              <a:t>Task 3</a:t>
+            </a:r>
+            <a:r>
+              <a:rPr lang="en-US" sz="2000" dirty="0" smtClean="0"/>
+              <a:t>: obtain the symmetry and stoichiometry from the result.</a:t>
+            </a:r>
+          </a:p>
+          <a:p>
+            <a:pPr lvl="2"/>
+            <a:r>
+              <a:rPr lang="en-US" sz="1800" dirty="0" smtClean="0"/>
+              <a:t>Hint: use getter methods.</a:t>
+            </a:r>
           </a:p>
         </p:txBody>
       </p:sp>
     </p:spTree>
     <p:extLst>
       <p:ext uri="{BB962C8B-B14F-4D97-AF65-F5344CB8AC3E}">
-        <p14:creationId xmlns:p14="http://schemas.microsoft.com/office/powerpoint/2010/main" val="1209054186"/>
+        <p14:creationId xmlns:p14="http://schemas.microsoft.com/office/powerpoint/2010/main" val="327756293"/>
       </p:ext>
     </p:extLst>
   </p:cSld>
@@ -14272,6 +14604,97 @@
             <a:spLocks noGrp="1"/>
           </p:cNvSpPr>
           <p:nvPr>
+            <p:ph type="ctrTitle"/>
+          </p:nvPr>
+        </p:nvSpPr>
+        <p:spPr/>
+        <p:txBody>
+          <a:bodyPr/>
+          <a:lstStyle/>
+          <a:p>
+            <a:r>
+              <a:rPr lang="en-US" b="0" dirty="0" smtClean="0"/>
+              <a:t>Thank you!</a:t>
+            </a:r>
+            <a:endParaRPr lang="en-US" sz="5400" dirty="0"/>
+          </a:p>
+        </p:txBody>
+      </p:sp>
+      <p:pic>
+        <p:nvPicPr>
+          <p:cNvPr id="3" name="Picture 2"/>
+          <p:cNvPicPr>
+            <a:picLocks noChangeAspect="1"/>
+          </p:cNvPicPr>
+          <p:nvPr/>
+        </p:nvPicPr>
+        <p:blipFill>
+          <a:blip r:embed="rId2">
+            <a:extLst>
+              <a:ext uri="{28A0092B-C50C-407E-A947-70E740481C1C}">
+                <a14:useLocalDpi xmlns:a14="http://schemas.microsoft.com/office/drawing/2010/main" val="0"/>
+              </a:ext>
+            </a:extLst>
+          </a:blip>
+          <a:stretch>
+            <a:fillRect/>
+          </a:stretch>
+        </p:blipFill>
+        <p:spPr>
+          <a:xfrm>
+            <a:off x="6734174" y="5324475"/>
+            <a:ext cx="2155826" cy="436867"/>
+          </a:xfrm>
+          <a:prstGeom prst="rect">
+            <a:avLst/>
+          </a:prstGeom>
+        </p:spPr>
+      </p:pic>
+    </p:spTree>
+    <p:extLst>
+      <p:ext uri="{BB962C8B-B14F-4D97-AF65-F5344CB8AC3E}">
+        <p14:creationId xmlns:p14="http://schemas.microsoft.com/office/powerpoint/2010/main" val="1209054186"/>
+      </p:ext>
+    </p:extLst>
+  </p:cSld>
+  <p:clrMapOvr>
+    <a:masterClrMapping/>
+  </p:clrMapOvr>
+  <p:transition/>
+  <p:timing>
+    <p:tnLst>
+      <p:par>
+        <p:cTn id="1" dur="indefinite" restart="never" nodeType="tmRoot"/>
+      </p:par>
+    </p:tnLst>
+  </p:timing>
+</p:sld>
+</file>
+
+<file path=ppt/slides/slide26.xml><?xml version="1.0" encoding="utf-8"?>
+<p:sld xmlns:a="http://schemas.openxmlformats.org/drawingml/2006/main" xmlns:r="http://schemas.openxmlformats.org/officeDocument/2006/relationships" xmlns:p="http://schemas.openxmlformats.org/presentationml/2006/main">
+  <p:cSld>
+    <p:spTree>
+      <p:nvGrpSpPr>
+        <p:cNvPr id="1" name=""/>
+        <p:cNvGrpSpPr/>
+        <p:nvPr/>
+      </p:nvGrpSpPr>
+      <p:grpSpPr>
+        <a:xfrm>
+          <a:off x="0" y="0"/>
+          <a:ext cx="0" cy="0"/>
+          <a:chOff x="0" y="0"/>
+          <a:chExt cx="0" cy="0"/>
+        </a:xfrm>
+      </p:grpSpPr>
+      <p:sp>
+        <p:nvSpPr>
+          <p:cNvPr id="2" name="Title 1"/>
+          <p:cNvSpPr>
+            <a:spLocks noGrp="1"/>
+          </p:cNvSpPr>
+          <p:nvPr>
             <p:ph type="title"/>
           </p:nvPr>
         </p:nvSpPr>
@@ -14305,7 +14728,7 @@
           <a:p>
             <a:pPr fontAlgn="auto">
               <a:lnSpc>
-                <a:spcPct val="100000"/>
+                <a:spcPct val="150000"/>
               </a:lnSpc>
               <a:spcBef>
                 <a:spcPts val="0"/>
@@ -14332,7 +14755,7 @@
           <a:p>
             <a:pPr fontAlgn="auto">
               <a:lnSpc>
-                <a:spcPct val="100000"/>
+                <a:spcPct val="150000"/>
               </a:lnSpc>
               <a:spcBef>
                 <a:spcPts val="0"/>
@@ -14351,7 +14774,7 @@
           <a:p>
             <a:pPr fontAlgn="auto">
               <a:lnSpc>
-                <a:spcPct val="100000"/>
+                <a:spcPct val="150000"/>
               </a:lnSpc>
               <a:spcBef>
                 <a:spcPts val="0"/>
@@ -14417,13 +14840,22 @@
               <a:buSzTx/>
             </a:pPr>
             <a:r>
-              <a:rPr lang="en-US" dirty="0" err="1"/>
-              <a:t>Github</a:t>
-            </a:r>
-            <a:r>
-              <a:rPr lang="en-US" dirty="0" smtClean="0"/>
-              <a:t>:</a:t>
-            </a:r>
+              <a:rPr lang="en-US" dirty="0"/>
+              <a:t>GitHub issues: </a:t>
+            </a:r>
+            <a:r>
+              <a:rPr lang="en-US" dirty="0">
+                <a:hlinkClick r:id="rId2"/>
+              </a:rPr>
+              <a:t>https://</a:t>
+            </a:r>
+            <a:r>
+              <a:rPr lang="en-US" dirty="0" smtClean="0">
+                <a:hlinkClick r:id="rId2"/>
+              </a:rPr>
+              <a:t>github.com/biojava/biojava/issues</a:t>
+            </a:r>
+            <a:endParaRPr lang="en-US" dirty="0" smtClean="0"/>
           </a:p>
           <a:p>
             <a:pPr lvl="1" fontAlgn="auto">
@@ -14441,8 +14873,25 @@
             </a:pPr>
             <a:r>
               <a:rPr lang="en-US" dirty="0" smtClean="0"/>
-              <a:t>Mailing list:</a:t>
-            </a:r>
+              <a:t>Mailing list</a:t>
+            </a:r>
+            <a:r>
+              <a:rPr lang="en-US" dirty="0"/>
+              <a:t>: </a:t>
+            </a:r>
+            <a:r>
+              <a:rPr lang="en-US" dirty="0">
+                <a:hlinkClick r:id="rId3"/>
+              </a:rPr>
+              <a:t>http://</a:t>
+            </a:r>
+            <a:r>
+              <a:rPr lang="en-US" dirty="0" smtClean="0">
+                <a:hlinkClick r:id="rId3"/>
+              </a:rPr>
+              <a:t>biojava.org/wiki/BioJava%3AMailingLists</a:t>
+            </a:r>
+            <a:endParaRPr lang="en-US" dirty="0" smtClean="0"/>
           </a:p>
           <a:p>
             <a:pPr lvl="1" fontAlgn="auto">
@@ -14463,9 +14912,22 @@
               <a:t>Gitter</a:t>
             </a:r>
             <a:r>
-              <a:rPr lang="en-US" dirty="0" smtClean="0"/>
-              <a:t>:</a:t>
-            </a:r>
+              <a:rPr lang="en-US" dirty="0"/>
+              <a:t>: </a:t>
+            </a:r>
+            <a:r>
+              <a:rPr lang="en-US" dirty="0">
+                <a:hlinkClick r:id="rId4"/>
+              </a:rPr>
+              <a:t>https://</a:t>
+            </a:r>
+            <a:r>
+              <a:rPr lang="en-US" dirty="0" smtClean="0">
+                <a:hlinkClick r:id="rId4"/>
+              </a:rPr>
+              <a:t>gitter.im/biojava/biojava</a:t>
+            </a:r>
+            <a:endParaRPr lang="en-US" dirty="0" smtClean="0"/>
           </a:p>
         </p:txBody>
       </p:sp>
@@ -14478,7 +14940,7 @@
           <p:nvPr/>
         </p:nvPicPr>
         <p:blipFill>
-          <a:blip r:embed="rId2">
+          <a:blip r:embed="rId5">
             <a:extLst>
               <a:ext uri="{28A0092B-C50C-407E-A947-70E740481C1C}">
                 <a14:useLocalDpi xmlns:a14="http://schemas.microsoft.com/office/drawing/2010/main" val="0"/>
@@ -16280,9 +16742,12 @@
             </a:r>
             <a:r>
               <a:rPr lang="en-US" sz="1800" dirty="0" smtClean="0"/>
-              <a:t> 5</a:t>
-            </a:r>
-            <a:endParaRPr lang="en-US" sz="1800" dirty="0"/>
+              <a:t> </a:t>
+            </a:r>
+            <a:r>
+              <a:rPr lang="en-US" sz="1800" dirty="0" smtClean="0"/>
+              <a:t>5</a:t>
+            </a:r>
           </a:p>
         </p:txBody>
       </p:sp>
@@ -17843,7 +18308,11 @@
           <a:p>
             <a:r>
               <a:rPr lang="en-US" dirty="0" smtClean="0"/>
-              <a:t>Demo 1</a:t>
+              <a:t>Setting up </a:t>
+            </a:r>
+            <a:r>
+              <a:rPr lang="en-US" dirty="0" err="1" smtClean="0"/>
+              <a:t>BioJava</a:t>
             </a:r>
             <a:endParaRPr lang="en-US" dirty="0"/>
           </a:p>
@@ -17865,12 +18334,862 @@
           <a:lstStyle/>
           <a:p>
             <a:r>
+              <a:rPr lang="en-US" dirty="0" err="1" smtClean="0"/>
+              <a:t>BioJava</a:t>
+            </a:r>
+            <a:r>
               <a:rPr lang="en-US" dirty="0" smtClean="0"/>
-              <a:t>Create a new Maven repository in Eclipse</a:t>
+              <a:t> modules</a:t>
             </a:r>
           </a:p>
         </p:txBody>
       </p:sp>
+      <p:sp>
+        <p:nvSpPr>
+          <p:cNvPr id="5" name="Rounded Rectangle 4"/>
+          <p:cNvSpPr/>
+          <p:nvPr/>
+        </p:nvSpPr>
+        <p:spPr bwMode="auto">
+          <a:xfrm>
+            <a:off x="266700" y="3564320"/>
+            <a:ext cx="1879600" cy="693355"/>
+          </a:xfrm>
+          <a:prstGeom prst="roundRect">
+            <a:avLst/>
+          </a:prstGeom>
+          <a:solidFill>
+            <a:schemeClr val="accent1"/>
+          </a:solidFill>
+          <a:ln w="9525" cap="flat" cmpd="sng" algn="ctr">
+            <a:solidFill>
+              <a:schemeClr val="tx1"/>
+            </a:solidFill>
+            <a:prstDash val="solid"/>
+            <a:round/>
+            <a:headEnd type="none" w="med" len="med"/>
+            <a:tailEnd type="none" w="med" len="med"/>
+          </a:ln>
+          <a:effectLst/>
+          <a:extLst>
+            <a:ext uri="{AF507438-7753-43e0-B8FC-AC1667EBCBE1}">
+              <a14:hiddenEffects xmlns:a14="http://schemas.microsoft.com/office/drawing/2010/main" xmlns="">
+                <a:effectLst>
+                  <a:outerShdw dist="17961" dir="2700000" algn="ctr" rotWithShape="0">
+                    <a:schemeClr val="bg2"/>
+                  </a:outerShdw>
+                </a:effectLst>
+              </a14:hiddenEffects>
+            </a:ext>
+          </a:extLst>
+        </p:spPr>
+        <p:txBody>
+          <a:bodyPr vert="horz" wrap="none" lIns="91440" tIns="45720" rIns="91440" bIns="45720" numCol="1" rtlCol="0" anchor="ctr" anchorCtr="0" compatLnSpc="1">
+            <a:prstTxWarp prst="textNoShape">
+              <a:avLst/>
+            </a:prstTxWarp>
+          </a:bodyPr>
+          <a:lstStyle/>
+          <a:p>
+            <a:pPr marL="0" marR="0" indent="0" algn="ctr" defTabSz="914400" rtl="0" eaLnBrk="0" fontAlgn="base" latinLnBrk="0" hangingPunct="0">
+              <a:lnSpc>
+                <a:spcPct val="100000"/>
+              </a:lnSpc>
+              <a:spcBef>
+                <a:spcPct val="0"/>
+              </a:spcBef>
+              <a:spcAft>
+                <a:spcPct val="0"/>
+              </a:spcAft>
+              <a:buClrTx/>
+              <a:buSzTx/>
+              <a:buFontTx/>
+              <a:buNone/>
+              <a:tabLst/>
+            </a:pPr>
+            <a:r>
+              <a:rPr kumimoji="0" lang="en-US" sz="2400" b="0" i="1" u="none" strike="noStrike" cap="none" normalizeH="0" baseline="0" dirty="0" smtClean="0">
+                <a:ln>
+                  <a:noFill/>
+                </a:ln>
+                <a:solidFill>
+                  <a:schemeClr val="tx1"/>
+                </a:solidFill>
+                <a:effectLst/>
+                <a:latin typeface="Helvetica" panose="020B0604020202020204" pitchFamily="34" charset="0"/>
+              </a:rPr>
+              <a:t>core</a:t>
+            </a:r>
+          </a:p>
+        </p:txBody>
+      </p:sp>
+      <p:sp>
+        <p:nvSpPr>
+          <p:cNvPr id="6" name="Rounded Rectangle 5"/>
+          <p:cNvSpPr/>
+          <p:nvPr/>
+        </p:nvSpPr>
+        <p:spPr bwMode="auto">
+          <a:xfrm>
+            <a:off x="2552700" y="2266093"/>
+            <a:ext cx="1752600" cy="744920"/>
+          </a:xfrm>
+          <a:prstGeom prst="roundRect">
+            <a:avLst/>
+          </a:prstGeom>
+          <a:solidFill>
+            <a:schemeClr val="accent1"/>
+          </a:solidFill>
+          <a:ln w="9525" cap="flat" cmpd="sng" algn="ctr">
+            <a:solidFill>
+              <a:schemeClr val="tx1"/>
+            </a:solidFill>
+            <a:prstDash val="solid"/>
+            <a:round/>
+            <a:headEnd type="none" w="med" len="med"/>
+            <a:tailEnd type="none" w="med" len="med"/>
+          </a:ln>
+          <a:effectLst/>
+          <a:extLst>
+            <a:ext uri="{AF507438-7753-43e0-B8FC-AC1667EBCBE1}">
+              <a14:hiddenEffects xmlns:a14="http://schemas.microsoft.com/office/drawing/2010/main" xmlns="">
+                <a:effectLst>
+                  <a:outerShdw dist="17961" dir="2700000" algn="ctr" rotWithShape="0">
+                    <a:schemeClr val="bg2"/>
+                  </a:outerShdw>
+                </a:effectLst>
+              </a14:hiddenEffects>
+            </a:ext>
+          </a:extLst>
+        </p:spPr>
+        <p:txBody>
+          <a:bodyPr vert="horz" wrap="none" lIns="91440" tIns="45720" rIns="91440" bIns="45720" numCol="1" rtlCol="0" anchor="ctr" anchorCtr="0" compatLnSpc="1">
+            <a:prstTxWarp prst="textNoShape">
+              <a:avLst/>
+            </a:prstTxWarp>
+          </a:bodyPr>
+          <a:lstStyle/>
+          <a:p>
+            <a:pPr marL="0" marR="0" indent="0" algn="ctr" defTabSz="914400" rtl="0" eaLnBrk="0" fontAlgn="base" latinLnBrk="0" hangingPunct="0">
+              <a:lnSpc>
+                <a:spcPct val="100000"/>
+              </a:lnSpc>
+              <a:spcBef>
+                <a:spcPct val="0"/>
+              </a:spcBef>
+              <a:spcAft>
+                <a:spcPct val="0"/>
+              </a:spcAft>
+              <a:buClrTx/>
+              <a:buSzTx/>
+              <a:buFontTx/>
+              <a:buNone/>
+              <a:tabLst/>
+            </a:pPr>
+            <a:r>
+              <a:rPr lang="en-US" sz="2400" dirty="0" smtClean="0"/>
+              <a:t>alignment</a:t>
+            </a:r>
+            <a:endParaRPr kumimoji="0" lang="en-US" sz="2400" b="0" i="1" u="none" strike="noStrike" cap="none" normalizeH="0" baseline="0" dirty="0" smtClean="0">
+              <a:ln>
+                <a:noFill/>
+              </a:ln>
+              <a:solidFill>
+                <a:schemeClr val="tx1"/>
+              </a:solidFill>
+              <a:effectLst/>
+              <a:latin typeface="Helvetica" panose="020B0604020202020204" pitchFamily="34" charset="0"/>
+            </a:endParaRPr>
+          </a:p>
+        </p:txBody>
+      </p:sp>
+      <p:sp>
+        <p:nvSpPr>
+          <p:cNvPr id="7" name="Rounded Rectangle 6"/>
+          <p:cNvSpPr/>
+          <p:nvPr/>
+        </p:nvSpPr>
+        <p:spPr bwMode="auto">
+          <a:xfrm>
+            <a:off x="4953000" y="2155953"/>
+            <a:ext cx="1698625" cy="965200"/>
+          </a:xfrm>
+          <a:prstGeom prst="roundRect">
+            <a:avLst/>
+          </a:prstGeom>
+          <a:solidFill>
+            <a:schemeClr val="accent2">
+              <a:lumMod val="75000"/>
+            </a:schemeClr>
+          </a:solidFill>
+          <a:ln w="9525" cap="flat" cmpd="sng" algn="ctr">
+            <a:solidFill>
+              <a:schemeClr val="tx1"/>
+            </a:solidFill>
+            <a:prstDash val="solid"/>
+            <a:round/>
+            <a:headEnd type="none" w="med" len="med"/>
+            <a:tailEnd type="none" w="med" len="med"/>
+          </a:ln>
+          <a:effectLst/>
+          <a:extLst>
+            <a:ext uri="{AF507438-7753-43e0-B8FC-AC1667EBCBE1}">
+              <a14:hiddenEffects xmlns:a14="http://schemas.microsoft.com/office/drawing/2010/main" xmlns="">
+                <a:effectLst>
+                  <a:outerShdw dist="17961" dir="2700000" algn="ctr" rotWithShape="0">
+                    <a:schemeClr val="bg2"/>
+                  </a:outerShdw>
+                </a:effectLst>
+              </a14:hiddenEffects>
+            </a:ext>
+          </a:extLst>
+        </p:spPr>
+        <p:txBody>
+          <a:bodyPr vert="horz" wrap="none" lIns="91440" tIns="45720" rIns="91440" bIns="45720" numCol="1" rtlCol="0" anchor="ctr" anchorCtr="0" compatLnSpc="1">
+            <a:prstTxWarp prst="textNoShape">
+              <a:avLst/>
+            </a:prstTxWarp>
+          </a:bodyPr>
+          <a:lstStyle/>
+          <a:p>
+            <a:pPr marL="0" marR="0" indent="0" algn="ctr" defTabSz="914400" rtl="0" eaLnBrk="0" fontAlgn="base" latinLnBrk="0" hangingPunct="0">
+              <a:lnSpc>
+                <a:spcPct val="100000"/>
+              </a:lnSpc>
+              <a:spcBef>
+                <a:spcPct val="0"/>
+              </a:spcBef>
+              <a:spcAft>
+                <a:spcPct val="0"/>
+              </a:spcAft>
+              <a:buClrTx/>
+              <a:buSzTx/>
+              <a:buFontTx/>
+              <a:buNone/>
+              <a:tabLst/>
+            </a:pPr>
+            <a:r>
+              <a:rPr lang="en-US" sz="2400" dirty="0" smtClean="0"/>
+              <a:t>structure</a:t>
+            </a:r>
+            <a:endParaRPr kumimoji="0" lang="en-US" sz="2400" b="0" i="1" u="none" strike="noStrike" cap="none" normalizeH="0" baseline="0" dirty="0" smtClean="0">
+              <a:ln>
+                <a:noFill/>
+              </a:ln>
+              <a:solidFill>
+                <a:schemeClr val="tx1"/>
+              </a:solidFill>
+              <a:effectLst/>
+              <a:latin typeface="Helvetica" panose="020B0604020202020204" pitchFamily="34" charset="0"/>
+            </a:endParaRPr>
+          </a:p>
+        </p:txBody>
+      </p:sp>
+      <p:sp>
+        <p:nvSpPr>
+          <p:cNvPr id="8" name="Rounded Rectangle 7"/>
+          <p:cNvSpPr/>
+          <p:nvPr/>
+        </p:nvSpPr>
+        <p:spPr bwMode="auto">
+          <a:xfrm>
+            <a:off x="7112000" y="2155953"/>
+            <a:ext cx="1879600" cy="965200"/>
+          </a:xfrm>
+          <a:prstGeom prst="roundRect">
+            <a:avLst/>
+          </a:prstGeom>
+          <a:solidFill>
+            <a:schemeClr val="accent2">
+              <a:lumMod val="75000"/>
+            </a:schemeClr>
+          </a:solidFill>
+          <a:ln w="9525" cap="flat" cmpd="sng" algn="ctr">
+            <a:solidFill>
+              <a:schemeClr val="tx1"/>
+            </a:solidFill>
+            <a:prstDash val="solid"/>
+            <a:round/>
+            <a:headEnd type="none" w="med" len="med"/>
+            <a:tailEnd type="none" w="med" len="med"/>
+          </a:ln>
+          <a:effectLst/>
+          <a:extLst>
+            <a:ext uri="{AF507438-7753-43e0-B8FC-AC1667EBCBE1}">
+              <a14:hiddenEffects xmlns:a14="http://schemas.microsoft.com/office/drawing/2010/main" xmlns="">
+                <a:effectLst>
+                  <a:outerShdw dist="17961" dir="2700000" algn="ctr" rotWithShape="0">
+                    <a:schemeClr val="bg2"/>
+                  </a:outerShdw>
+                </a:effectLst>
+              </a14:hiddenEffects>
+            </a:ext>
+          </a:extLst>
+        </p:spPr>
+        <p:txBody>
+          <a:bodyPr vert="horz" wrap="none" lIns="91440" tIns="45720" rIns="91440" bIns="45720" numCol="1" rtlCol="0" anchor="ctr" anchorCtr="0" compatLnSpc="1">
+            <a:prstTxWarp prst="textNoShape">
+              <a:avLst/>
+            </a:prstTxWarp>
+          </a:bodyPr>
+          <a:lstStyle/>
+          <a:p>
+            <a:pPr marL="0" marR="0" indent="0" algn="ctr" defTabSz="914400" rtl="0" eaLnBrk="0" fontAlgn="base" latinLnBrk="0" hangingPunct="0">
+              <a:lnSpc>
+                <a:spcPct val="100000"/>
+              </a:lnSpc>
+              <a:spcBef>
+                <a:spcPct val="0"/>
+              </a:spcBef>
+              <a:spcAft>
+                <a:spcPct val="0"/>
+              </a:spcAft>
+              <a:buClrTx/>
+              <a:buSzTx/>
+              <a:buFontTx/>
+              <a:buNone/>
+              <a:tabLst/>
+            </a:pPr>
+            <a:r>
+              <a:rPr lang="en-US" sz="2400" dirty="0" smtClean="0"/>
+              <a:t>structure-</a:t>
+            </a:r>
+            <a:r>
+              <a:rPr lang="en-US" sz="2400" dirty="0" err="1" smtClean="0"/>
+              <a:t>gui</a:t>
+            </a:r>
+            <a:endParaRPr kumimoji="0" lang="en-US" sz="2400" b="0" i="1" u="none" strike="noStrike" cap="none" normalizeH="0" baseline="0" dirty="0" smtClean="0">
+              <a:ln>
+                <a:noFill/>
+              </a:ln>
+              <a:solidFill>
+                <a:schemeClr val="tx1"/>
+              </a:solidFill>
+              <a:effectLst/>
+              <a:latin typeface="Helvetica" panose="020B0604020202020204" pitchFamily="34" charset="0"/>
+            </a:endParaRPr>
+          </a:p>
+        </p:txBody>
+      </p:sp>
+      <p:sp>
+        <p:nvSpPr>
+          <p:cNvPr id="9" name="Rounded Rectangle 8"/>
+          <p:cNvSpPr/>
+          <p:nvPr/>
+        </p:nvSpPr>
+        <p:spPr bwMode="auto">
+          <a:xfrm>
+            <a:off x="4957761" y="3527935"/>
+            <a:ext cx="1698625" cy="965200"/>
+          </a:xfrm>
+          <a:prstGeom prst="roundRect">
+            <a:avLst/>
+          </a:prstGeom>
+          <a:solidFill>
+            <a:schemeClr val="accent1"/>
+          </a:solidFill>
+          <a:ln w="9525" cap="flat" cmpd="sng" algn="ctr">
+            <a:solidFill>
+              <a:schemeClr val="tx1"/>
+            </a:solidFill>
+            <a:prstDash val="solid"/>
+            <a:round/>
+            <a:headEnd type="none" w="med" len="med"/>
+            <a:tailEnd type="none" w="med" len="med"/>
+          </a:ln>
+          <a:effectLst/>
+          <a:extLst>
+            <a:ext uri="{AF507438-7753-43e0-B8FC-AC1667EBCBE1}">
+              <a14:hiddenEffects xmlns:a14="http://schemas.microsoft.com/office/drawing/2010/main" xmlns="">
+                <a:effectLst>
+                  <a:outerShdw dist="17961" dir="2700000" algn="ctr" rotWithShape="0">
+                    <a:schemeClr val="bg2"/>
+                  </a:outerShdw>
+                </a:effectLst>
+              </a14:hiddenEffects>
+            </a:ext>
+          </a:extLst>
+        </p:spPr>
+        <p:txBody>
+          <a:bodyPr vert="horz" wrap="none" lIns="91440" tIns="45720" rIns="91440" bIns="45720" numCol="1" rtlCol="0" anchor="ctr" anchorCtr="0" compatLnSpc="1">
+            <a:prstTxWarp prst="textNoShape">
+              <a:avLst/>
+            </a:prstTxWarp>
+          </a:bodyPr>
+          <a:lstStyle/>
+          <a:p>
+            <a:pPr marL="0" marR="0" indent="0" algn="ctr" defTabSz="914400" rtl="0" eaLnBrk="0" fontAlgn="base" latinLnBrk="0" hangingPunct="0">
+              <a:lnSpc>
+                <a:spcPct val="100000"/>
+              </a:lnSpc>
+              <a:spcBef>
+                <a:spcPct val="0"/>
+              </a:spcBef>
+              <a:spcAft>
+                <a:spcPct val="0"/>
+              </a:spcAft>
+              <a:buClrTx/>
+              <a:buSzTx/>
+              <a:buFontTx/>
+              <a:buNone/>
+              <a:tabLst/>
+            </a:pPr>
+            <a:r>
+              <a:rPr lang="en-US" sz="2400" dirty="0" smtClean="0"/>
+              <a:t>genome</a:t>
+            </a:r>
+            <a:endParaRPr kumimoji="0" lang="en-US" sz="2400" b="0" i="1" u="none" strike="noStrike" cap="none" normalizeH="0" baseline="0" dirty="0" smtClean="0">
+              <a:ln>
+                <a:noFill/>
+              </a:ln>
+              <a:solidFill>
+                <a:schemeClr val="tx1"/>
+              </a:solidFill>
+              <a:effectLst/>
+              <a:latin typeface="Helvetica" panose="020B0604020202020204" pitchFamily="34" charset="0"/>
+            </a:endParaRPr>
+          </a:p>
+        </p:txBody>
+      </p:sp>
+      <p:sp>
+        <p:nvSpPr>
+          <p:cNvPr id="10" name="Rounded Rectangle 9"/>
+          <p:cNvSpPr/>
+          <p:nvPr/>
+        </p:nvSpPr>
+        <p:spPr bwMode="auto">
+          <a:xfrm>
+            <a:off x="2552700" y="3498835"/>
+            <a:ext cx="1752600" cy="824324"/>
+          </a:xfrm>
+          <a:prstGeom prst="roundRect">
+            <a:avLst/>
+          </a:prstGeom>
+          <a:solidFill>
+            <a:schemeClr val="accent1"/>
+          </a:solidFill>
+          <a:ln w="9525" cap="flat" cmpd="sng" algn="ctr">
+            <a:solidFill>
+              <a:schemeClr val="tx1"/>
+            </a:solidFill>
+            <a:prstDash val="solid"/>
+            <a:round/>
+            <a:headEnd type="none" w="med" len="med"/>
+            <a:tailEnd type="none" w="med" len="med"/>
+          </a:ln>
+          <a:effectLst/>
+          <a:extLst>
+            <a:ext uri="{AF507438-7753-43e0-B8FC-AC1667EBCBE1}">
+              <a14:hiddenEffects xmlns:a14="http://schemas.microsoft.com/office/drawing/2010/main" xmlns="">
+                <a:effectLst>
+                  <a:outerShdw dist="17961" dir="2700000" algn="ctr" rotWithShape="0">
+                    <a:schemeClr val="bg2"/>
+                  </a:outerShdw>
+                </a:effectLst>
+              </a14:hiddenEffects>
+            </a:ext>
+          </a:extLst>
+        </p:spPr>
+        <p:txBody>
+          <a:bodyPr vert="horz" wrap="none" lIns="91440" tIns="45720" rIns="91440" bIns="45720" numCol="1" rtlCol="0" anchor="ctr" anchorCtr="0" compatLnSpc="1">
+            <a:prstTxWarp prst="textNoShape">
+              <a:avLst/>
+            </a:prstTxWarp>
+          </a:bodyPr>
+          <a:lstStyle/>
+          <a:p>
+            <a:pPr marL="0" marR="0" indent="0" algn="ctr" defTabSz="914400" rtl="0" eaLnBrk="0" fontAlgn="base" latinLnBrk="0" hangingPunct="0">
+              <a:lnSpc>
+                <a:spcPct val="100000"/>
+              </a:lnSpc>
+              <a:spcBef>
+                <a:spcPct val="0"/>
+              </a:spcBef>
+              <a:spcAft>
+                <a:spcPct val="0"/>
+              </a:spcAft>
+              <a:buClrTx/>
+              <a:buSzTx/>
+              <a:buFontTx/>
+              <a:buNone/>
+              <a:tabLst/>
+            </a:pPr>
+            <a:r>
+              <a:rPr lang="en-US" sz="2400" smtClean="0"/>
+              <a:t>protein-</a:t>
+            </a:r>
+          </a:p>
+          <a:p>
+            <a:pPr marL="0" marR="0" indent="0" algn="ctr" defTabSz="914400" rtl="0" eaLnBrk="0" fontAlgn="base" latinLnBrk="0" hangingPunct="0">
+              <a:lnSpc>
+                <a:spcPct val="100000"/>
+              </a:lnSpc>
+              <a:spcBef>
+                <a:spcPct val="0"/>
+              </a:spcBef>
+              <a:spcAft>
+                <a:spcPct val="0"/>
+              </a:spcAft>
+              <a:buClrTx/>
+              <a:buSzTx/>
+              <a:buFontTx/>
+              <a:buNone/>
+              <a:tabLst/>
+            </a:pPr>
+            <a:r>
+              <a:rPr lang="en-US" sz="2400" dirty="0" smtClean="0"/>
+              <a:t>disorder</a:t>
+            </a:r>
+            <a:endParaRPr kumimoji="0" lang="en-US" sz="2400" b="0" i="1" u="none" strike="noStrike" cap="none" normalizeH="0" baseline="0" dirty="0" smtClean="0">
+              <a:ln>
+                <a:noFill/>
+              </a:ln>
+              <a:solidFill>
+                <a:schemeClr val="tx1"/>
+              </a:solidFill>
+              <a:effectLst/>
+            </a:endParaRPr>
+          </a:p>
+        </p:txBody>
+      </p:sp>
+      <p:sp>
+        <p:nvSpPr>
+          <p:cNvPr id="11" name="Rounded Rectangle 10"/>
+          <p:cNvSpPr/>
+          <p:nvPr/>
+        </p:nvSpPr>
+        <p:spPr bwMode="auto">
+          <a:xfrm>
+            <a:off x="2552700" y="4807998"/>
+            <a:ext cx="1752600" cy="750888"/>
+          </a:xfrm>
+          <a:prstGeom prst="roundRect">
+            <a:avLst/>
+          </a:prstGeom>
+          <a:solidFill>
+            <a:schemeClr val="accent1"/>
+          </a:solidFill>
+          <a:ln w="9525" cap="flat" cmpd="sng" algn="ctr">
+            <a:solidFill>
+              <a:schemeClr val="tx1"/>
+            </a:solidFill>
+            <a:prstDash val="solid"/>
+            <a:round/>
+            <a:headEnd type="none" w="med" len="med"/>
+            <a:tailEnd type="none" w="med" len="med"/>
+          </a:ln>
+          <a:effectLst/>
+          <a:extLst>
+            <a:ext uri="{AF507438-7753-43e0-B8FC-AC1667EBCBE1}">
+              <a14:hiddenEffects xmlns:a14="http://schemas.microsoft.com/office/drawing/2010/main" xmlns="">
+                <a:effectLst>
+                  <a:outerShdw dist="17961" dir="2700000" algn="ctr" rotWithShape="0">
+                    <a:schemeClr val="bg2"/>
+                  </a:outerShdw>
+                </a:effectLst>
+              </a14:hiddenEffects>
+            </a:ext>
+          </a:extLst>
+        </p:spPr>
+        <p:txBody>
+          <a:bodyPr vert="horz" wrap="none" lIns="91440" tIns="45720" rIns="91440" bIns="45720" numCol="1" rtlCol="0" anchor="ctr" anchorCtr="0" compatLnSpc="1">
+            <a:prstTxWarp prst="textNoShape">
+              <a:avLst/>
+            </a:prstTxWarp>
+          </a:bodyPr>
+          <a:lstStyle/>
+          <a:p>
+            <a:pPr marL="0" marR="0" indent="0" algn="ctr" defTabSz="914400" rtl="0" eaLnBrk="0" fontAlgn="base" latinLnBrk="0" hangingPunct="0">
+              <a:lnSpc>
+                <a:spcPct val="100000"/>
+              </a:lnSpc>
+              <a:spcBef>
+                <a:spcPct val="0"/>
+              </a:spcBef>
+              <a:spcAft>
+                <a:spcPct val="0"/>
+              </a:spcAft>
+              <a:buClrTx/>
+              <a:buSzTx/>
+              <a:buFontTx/>
+              <a:buNone/>
+              <a:tabLst/>
+            </a:pPr>
+            <a:r>
+              <a:rPr lang="en-US" sz="2400" smtClean="0"/>
+              <a:t>sequencing</a:t>
+            </a:r>
+            <a:endParaRPr kumimoji="0" lang="en-US" sz="2400" b="0" i="1" u="none" strike="noStrike" cap="none" normalizeH="0" baseline="0" dirty="0" smtClean="0">
+              <a:ln>
+                <a:noFill/>
+              </a:ln>
+              <a:solidFill>
+                <a:schemeClr val="tx1"/>
+              </a:solidFill>
+              <a:effectLst/>
+              <a:latin typeface="Helvetica" panose="020B0604020202020204" pitchFamily="34" charset="0"/>
+            </a:endParaRPr>
+          </a:p>
+        </p:txBody>
+      </p:sp>
+      <p:cxnSp>
+        <p:nvCxnSpPr>
+          <p:cNvPr id="13" name="Straight Arrow Connector 12"/>
+          <p:cNvCxnSpPr>
+            <a:stCxn id="5" idx="3"/>
+            <a:endCxn id="6" idx="1"/>
+          </p:cNvCxnSpPr>
+          <p:nvPr/>
+        </p:nvCxnSpPr>
+        <p:spPr bwMode="auto">
+          <a:xfrm flipV="1">
+            <a:off x="2146300" y="2638553"/>
+            <a:ext cx="406400" cy="1272445"/>
+          </a:xfrm>
+          <a:prstGeom prst="straightConnector1">
+            <a:avLst/>
+          </a:prstGeom>
+          <a:solidFill>
+            <a:schemeClr val="accent1"/>
+          </a:solidFill>
+          <a:ln w="9525" cap="flat" cmpd="sng" algn="ctr">
+            <a:solidFill>
+              <a:schemeClr val="tx1"/>
+            </a:solidFill>
+            <a:prstDash val="solid"/>
+            <a:round/>
+            <a:headEnd type="none" w="med" len="med"/>
+            <a:tailEnd type="triangle"/>
+          </a:ln>
+          <a:effectLst/>
+          <a:extLst>
+            <a:ext uri="{AF507438-7753-43e0-B8FC-AC1667EBCBE1}">
+              <a14:hiddenEffects xmlns:a14="http://schemas.microsoft.com/office/drawing/2010/main" xmlns="">
+                <a:effectLst>
+                  <a:outerShdw dist="17961" dir="2700000" algn="ctr" rotWithShape="0">
+                    <a:schemeClr val="bg2"/>
+                  </a:outerShdw>
+                </a:effectLst>
+              </a14:hiddenEffects>
+            </a:ext>
+          </a:extLst>
+        </p:spPr>
+      </p:cxnSp>
+      <p:cxnSp>
+        <p:nvCxnSpPr>
+          <p:cNvPr id="15" name="Straight Arrow Connector 14"/>
+          <p:cNvCxnSpPr>
+            <a:stCxn id="5" idx="3"/>
+            <a:endCxn id="10" idx="1"/>
+          </p:cNvCxnSpPr>
+          <p:nvPr/>
+        </p:nvCxnSpPr>
+        <p:spPr bwMode="auto">
+          <a:xfrm flipV="1">
+            <a:off x="2146300" y="3910997"/>
+            <a:ext cx="406400" cy="1"/>
+          </a:xfrm>
+          <a:prstGeom prst="straightConnector1">
+            <a:avLst/>
+          </a:prstGeom>
+          <a:solidFill>
+            <a:schemeClr val="accent1"/>
+          </a:solidFill>
+          <a:ln w="9525" cap="flat" cmpd="sng" algn="ctr">
+            <a:solidFill>
+              <a:schemeClr val="tx1"/>
+            </a:solidFill>
+            <a:prstDash val="solid"/>
+            <a:round/>
+            <a:headEnd type="none" w="med" len="med"/>
+            <a:tailEnd type="triangle"/>
+          </a:ln>
+          <a:effectLst/>
+          <a:extLst>
+            <a:ext uri="{AF507438-7753-43e0-B8FC-AC1667EBCBE1}">
+              <a14:hiddenEffects xmlns:a14="http://schemas.microsoft.com/office/drawing/2010/main" xmlns="">
+                <a:effectLst>
+                  <a:outerShdw dist="17961" dir="2700000" algn="ctr" rotWithShape="0">
+                    <a:schemeClr val="bg2"/>
+                  </a:outerShdw>
+                </a:effectLst>
+              </a14:hiddenEffects>
+            </a:ext>
+          </a:extLst>
+        </p:spPr>
+      </p:cxnSp>
+      <p:cxnSp>
+        <p:nvCxnSpPr>
+          <p:cNvPr id="17" name="Straight Arrow Connector 16"/>
+          <p:cNvCxnSpPr>
+            <a:stCxn id="5" idx="3"/>
+            <a:endCxn id="11" idx="1"/>
+          </p:cNvCxnSpPr>
+          <p:nvPr/>
+        </p:nvCxnSpPr>
+        <p:spPr bwMode="auto">
+          <a:xfrm>
+            <a:off x="2146300" y="3910998"/>
+            <a:ext cx="406400" cy="1272444"/>
+          </a:xfrm>
+          <a:prstGeom prst="straightConnector1">
+            <a:avLst/>
+          </a:prstGeom>
+          <a:solidFill>
+            <a:schemeClr val="accent1"/>
+          </a:solidFill>
+          <a:ln w="9525" cap="flat" cmpd="sng" algn="ctr">
+            <a:solidFill>
+              <a:schemeClr val="tx1"/>
+            </a:solidFill>
+            <a:prstDash val="solid"/>
+            <a:round/>
+            <a:headEnd type="none" w="med" len="med"/>
+            <a:tailEnd type="triangle"/>
+          </a:ln>
+          <a:effectLst/>
+          <a:extLst>
+            <a:ext uri="{AF507438-7753-43e0-B8FC-AC1667EBCBE1}">
+              <a14:hiddenEffects xmlns:a14="http://schemas.microsoft.com/office/drawing/2010/main" xmlns="">
+                <a:effectLst>
+                  <a:outerShdw dist="17961" dir="2700000" algn="ctr" rotWithShape="0">
+                    <a:schemeClr val="bg2"/>
+                  </a:outerShdw>
+                </a:effectLst>
+              </a14:hiddenEffects>
+            </a:ext>
+          </a:extLst>
+        </p:spPr>
+      </p:cxnSp>
+      <p:cxnSp>
+        <p:nvCxnSpPr>
+          <p:cNvPr id="19" name="Straight Arrow Connector 18"/>
+          <p:cNvCxnSpPr>
+            <a:stCxn id="6" idx="3"/>
+            <a:endCxn id="7" idx="1"/>
+          </p:cNvCxnSpPr>
+          <p:nvPr/>
+        </p:nvCxnSpPr>
+        <p:spPr bwMode="auto">
+          <a:xfrm>
+            <a:off x="4305300" y="2638553"/>
+            <a:ext cx="647700" cy="0"/>
+          </a:xfrm>
+          <a:prstGeom prst="straightConnector1">
+            <a:avLst/>
+          </a:prstGeom>
+          <a:solidFill>
+            <a:schemeClr val="accent1"/>
+          </a:solidFill>
+          <a:ln w="9525" cap="flat" cmpd="sng" algn="ctr">
+            <a:solidFill>
+              <a:schemeClr val="tx1"/>
+            </a:solidFill>
+            <a:prstDash val="solid"/>
+            <a:round/>
+            <a:headEnd type="none" w="med" len="med"/>
+            <a:tailEnd type="triangle"/>
+          </a:ln>
+          <a:effectLst/>
+          <a:extLst>
+            <a:ext uri="{AF507438-7753-43e0-B8FC-AC1667EBCBE1}">
+              <a14:hiddenEffects xmlns:a14="http://schemas.microsoft.com/office/drawing/2010/main" xmlns="">
+                <a:effectLst>
+                  <a:outerShdw dist="17961" dir="2700000" algn="ctr" rotWithShape="0">
+                    <a:schemeClr val="bg2"/>
+                  </a:outerShdw>
+                </a:effectLst>
+              </a14:hiddenEffects>
+            </a:ext>
+          </a:extLst>
+        </p:spPr>
+      </p:cxnSp>
+      <p:cxnSp>
+        <p:nvCxnSpPr>
+          <p:cNvPr id="21" name="Straight Arrow Connector 20"/>
+          <p:cNvCxnSpPr>
+            <a:stCxn id="6" idx="3"/>
+            <a:endCxn id="9" idx="1"/>
+          </p:cNvCxnSpPr>
+          <p:nvPr/>
+        </p:nvCxnSpPr>
+        <p:spPr bwMode="auto">
+          <a:xfrm>
+            <a:off x="4305300" y="2638553"/>
+            <a:ext cx="652461" cy="1371982"/>
+          </a:xfrm>
+          <a:prstGeom prst="straightConnector1">
+            <a:avLst/>
+          </a:prstGeom>
+          <a:solidFill>
+            <a:schemeClr val="accent1"/>
+          </a:solidFill>
+          <a:ln w="9525" cap="flat" cmpd="sng" algn="ctr">
+            <a:solidFill>
+              <a:schemeClr val="tx1"/>
+            </a:solidFill>
+            <a:prstDash val="solid"/>
+            <a:round/>
+            <a:headEnd type="none" w="med" len="med"/>
+            <a:tailEnd type="triangle"/>
+          </a:ln>
+          <a:effectLst/>
+          <a:extLst>
+            <a:ext uri="{AF507438-7753-43e0-B8FC-AC1667EBCBE1}">
+              <a14:hiddenEffects xmlns:a14="http://schemas.microsoft.com/office/drawing/2010/main" xmlns="">
+                <a:effectLst>
+                  <a:outerShdw dist="17961" dir="2700000" algn="ctr" rotWithShape="0">
+                    <a:schemeClr val="bg2"/>
+                  </a:outerShdw>
+                </a:effectLst>
+              </a14:hiddenEffects>
+            </a:ext>
+          </a:extLst>
+        </p:spPr>
+      </p:cxnSp>
+      <p:cxnSp>
+        <p:nvCxnSpPr>
+          <p:cNvPr id="23" name="Straight Arrow Connector 22"/>
+          <p:cNvCxnSpPr>
+            <a:stCxn id="7" idx="3"/>
+            <a:endCxn id="8" idx="1"/>
+          </p:cNvCxnSpPr>
+          <p:nvPr/>
+        </p:nvCxnSpPr>
+        <p:spPr bwMode="auto">
+          <a:xfrm>
+            <a:off x="6651625" y="2638553"/>
+            <a:ext cx="460375" cy="0"/>
+          </a:xfrm>
+          <a:prstGeom prst="straightConnector1">
+            <a:avLst/>
+          </a:prstGeom>
+          <a:solidFill>
+            <a:schemeClr val="accent1"/>
+          </a:solidFill>
+          <a:ln w="9525" cap="flat" cmpd="sng" algn="ctr">
+            <a:solidFill>
+              <a:schemeClr val="tx1"/>
+            </a:solidFill>
+            <a:prstDash val="solid"/>
+            <a:round/>
+            <a:headEnd type="none" w="med" len="med"/>
+            <a:tailEnd type="triangle"/>
+          </a:ln>
+          <a:effectLst/>
+          <a:extLst>
+            <a:ext uri="{AF507438-7753-43e0-B8FC-AC1667EBCBE1}">
+              <a14:hiddenEffects xmlns:a14="http://schemas.microsoft.com/office/drawing/2010/main" xmlns="">
+                <a:effectLst>
+                  <a:outerShdw dist="17961" dir="2700000" algn="ctr" rotWithShape="0">
+                    <a:schemeClr val="bg2"/>
+                  </a:outerShdw>
+                </a:effectLst>
+              </a14:hiddenEffects>
+            </a:ext>
+          </a:extLst>
+        </p:spPr>
+      </p:cxnSp>
     </p:spTree>
     <p:extLst>
       <p:ext uri="{BB962C8B-B14F-4D97-AF65-F5344CB8AC3E}">
@@ -17952,63 +19271,12 @@
               <a:t>Create a new Maven repository in Eclipse</a:t>
             </a:r>
           </a:p>
-          <a:p>
-            <a:pPr marL="914400" lvl="1" indent="-457200">
-              <a:buFont typeface="+mj-lt"/>
-              <a:buAutoNum type="arabicPeriod"/>
-            </a:pPr>
-            <a:r>
-              <a:rPr lang="en-US" dirty="0" smtClean="0"/>
-              <a:t>File &gt; New &gt; Project</a:t>
-            </a:r>
-          </a:p>
-          <a:p>
-            <a:pPr marL="914400" lvl="1" indent="-457200">
-              <a:buFont typeface="+mj-lt"/>
-              <a:buAutoNum type="arabicPeriod"/>
-            </a:pPr>
-            <a:r>
-              <a:rPr lang="en-US" dirty="0" smtClean="0"/>
-              <a:t>Maven Project</a:t>
-            </a:r>
-            <a:endParaRPr lang="en-US" dirty="0"/>
-          </a:p>
         </p:txBody>
       </p:sp>
-      <p:pic>
-        <p:nvPicPr>
-          <p:cNvPr id="4" name="Picture 3"/>
-          <p:cNvPicPr>
-            <a:picLocks noChangeAspect="1"/>
-          </p:cNvPicPr>
-          <p:nvPr/>
-        </p:nvPicPr>
-        <p:blipFill>
-          <a:blip r:embed="rId2">
-            <a:extLst>
-              <a:ext uri="{28A0092B-C50C-407E-A947-70E740481C1C}">
-                <a14:useLocalDpi xmlns:a14="http://schemas.microsoft.com/office/drawing/2010/main" val="0"/>
-              </a:ext>
-            </a:extLst>
-          </a:blip>
-          <a:stretch>
-            <a:fillRect/>
-          </a:stretch>
-        </p:blipFill>
-        <p:spPr>
-          <a:xfrm>
-            <a:off x="4216400" y="1895957"/>
-            <a:ext cx="4470400" cy="4286886"/>
-          </a:xfrm>
-          <a:prstGeom prst="rect">
-            <a:avLst/>
-          </a:prstGeom>
-        </p:spPr>
-      </p:pic>
     </p:spTree>
     <p:extLst>
       <p:ext uri="{BB962C8B-B14F-4D97-AF65-F5344CB8AC3E}">
-        <p14:creationId xmlns:p14="http://schemas.microsoft.com/office/powerpoint/2010/main" val="703086882"/>
+        <p14:creationId xmlns:p14="http://schemas.microsoft.com/office/powerpoint/2010/main" val="305092192"/>
       </p:ext>
     </p:extLst>
   </p:cSld>
@@ -18102,32 +19370,16 @@
               <a:buAutoNum type="arabicPeriod"/>
             </a:pPr>
             <a:r>
-              <a:rPr lang="en-US" dirty="0"/>
+              <a:rPr lang="en-US" dirty="0" smtClean="0"/>
               <a:t>Maven Project</a:t>
             </a:r>
-          </a:p>
-          <a:p>
-            <a:pPr marL="914400" lvl="1" indent="-457200">
-              <a:buFont typeface="+mj-lt"/>
-              <a:buAutoNum type="arabicPeriod"/>
-            </a:pPr>
-            <a:r>
-              <a:rPr lang="en-US" dirty="0" smtClean="0"/>
-              <a:t>Use defaults</a:t>
-            </a:r>
-          </a:p>
-          <a:p>
-            <a:pPr marL="914400" lvl="1" indent="-457200">
-              <a:buFont typeface="+mj-lt"/>
-              <a:buAutoNum type="arabicPeriod"/>
-            </a:pPr>
             <a:endParaRPr lang="en-US" dirty="0"/>
           </a:p>
         </p:txBody>
       </p:sp>
       <p:pic>
         <p:nvPicPr>
-          <p:cNvPr id="5" name="Picture 4"/>
+          <p:cNvPr id="4" name="Picture 3"/>
           <p:cNvPicPr>
             <a:picLocks noChangeAspect="1"/>
           </p:cNvPicPr>
@@ -18147,8 +19399,8 @@
         </p:blipFill>
         <p:spPr>
           <a:xfrm>
-            <a:off x="3528760" y="2231046"/>
-            <a:ext cx="5272339" cy="3862897"/>
+            <a:off x="4216400" y="1895957"/>
+            <a:ext cx="4470400" cy="4286886"/>
           </a:xfrm>
           <a:prstGeom prst="rect">
             <a:avLst/>
@@ -18158,7 +19410,7 @@
     </p:spTree>
     <p:extLst>
       <p:ext uri="{BB962C8B-B14F-4D97-AF65-F5344CB8AC3E}">
-        <p14:creationId xmlns:p14="http://schemas.microsoft.com/office/powerpoint/2010/main" val="959775454"/>
+        <p14:creationId xmlns:p14="http://schemas.microsoft.com/office/powerpoint/2010/main" val="703086882"/>
       </p:ext>
     </p:extLst>
   </p:cSld>

</xml_diff>